<commit_message>
Update of mock ppt to per dicsussion 6 April 2020
</commit_message>
<xml_diff>
--- a/design/RepositoryStructure.pptx
+++ b/design/RepositoryStructure.pptx
@@ -4,6 +4,9 @@
   <p:sldMasterIdLst>
     <p:sldMasterId id="2147483648" r:id="rId1"/>
   </p:sldMasterIdLst>
+  <p:notesMasterIdLst>
+    <p:notesMasterId r:id="rId24"/>
+  </p:notesMasterIdLst>
   <p:sldIdLst>
     <p:sldId id="274" r:id="rId2"/>
     <p:sldId id="256" r:id="rId3"/>
@@ -144,6 +147,355 @@
 </p:presentation>
 </file>
 
+<file path=ppt/notesMasters/notesMaster1.xml><?xml version="1.0" encoding="utf-8"?>
+<p:notesMaster xmlns:a="http://schemas.openxmlformats.org/drawingml/2006/main" xmlns:r="http://schemas.openxmlformats.org/officeDocument/2006/relationships" xmlns:p="http://schemas.openxmlformats.org/presentationml/2006/main">
+  <p:cSld>
+    <p:bg>
+      <p:bgRef idx="1001">
+        <a:schemeClr val="bg1"/>
+      </p:bgRef>
+    </p:bg>
+    <p:spTree>
+      <p:nvGrpSpPr>
+        <p:cNvPr id="1" name=""/>
+        <p:cNvGrpSpPr/>
+        <p:nvPr/>
+      </p:nvGrpSpPr>
+      <p:grpSpPr>
+        <a:xfrm>
+          <a:off x="0" y="0"/>
+          <a:ext cx="0" cy="0"/>
+          <a:chOff x="0" y="0"/>
+          <a:chExt cx="0" cy="0"/>
+        </a:xfrm>
+      </p:grpSpPr>
+      <p:sp>
+        <p:nvSpPr>
+          <p:cNvPr id="2" name="Header Placeholder 1"/>
+          <p:cNvSpPr>
+            <a:spLocks noGrp="1"/>
+          </p:cNvSpPr>
+          <p:nvPr>
+            <p:ph type="hdr" sz="quarter"/>
+          </p:nvPr>
+        </p:nvSpPr>
+        <p:spPr>
+          <a:xfrm>
+            <a:off x="0" y="0"/>
+            <a:ext cx="2971800" cy="458788"/>
+          </a:xfrm>
+          <a:prstGeom prst="rect">
+            <a:avLst/>
+          </a:prstGeom>
+        </p:spPr>
+        <p:txBody>
+          <a:bodyPr vert="horz" lIns="91440" tIns="45720" rIns="91440" bIns="45720" rtlCol="0"/>
+          <a:lstStyle>
+            <a:lvl1pPr algn="l">
+              <a:defRPr sz="1200"/>
+            </a:lvl1pPr>
+          </a:lstStyle>
+          <a:p>
+            <a:endParaRPr lang="en-US"/>
+          </a:p>
+        </p:txBody>
+      </p:sp>
+      <p:sp>
+        <p:nvSpPr>
+          <p:cNvPr id="3" name="Date Placeholder 2"/>
+          <p:cNvSpPr>
+            <a:spLocks noGrp="1"/>
+          </p:cNvSpPr>
+          <p:nvPr>
+            <p:ph type="dt" idx="1"/>
+          </p:nvPr>
+        </p:nvSpPr>
+        <p:spPr>
+          <a:xfrm>
+            <a:off x="3884613" y="0"/>
+            <a:ext cx="2971800" cy="458788"/>
+          </a:xfrm>
+          <a:prstGeom prst="rect">
+            <a:avLst/>
+          </a:prstGeom>
+        </p:spPr>
+        <p:txBody>
+          <a:bodyPr vert="horz" lIns="91440" tIns="45720" rIns="91440" bIns="45720" rtlCol="0"/>
+          <a:lstStyle>
+            <a:lvl1pPr algn="r">
+              <a:defRPr sz="1200"/>
+            </a:lvl1pPr>
+          </a:lstStyle>
+          <a:p>
+            <a:fld id="{C29F78B0-A34D-4E1F-90F0-EA59C04644F7}" type="datetimeFigureOut">
+              <a:rPr lang="en-US" smtClean="0"/>
+              <a:t>4/6/2020</a:t>
+            </a:fld>
+            <a:endParaRPr lang="en-US"/>
+          </a:p>
+        </p:txBody>
+      </p:sp>
+      <p:sp>
+        <p:nvSpPr>
+          <p:cNvPr id="4" name="Slide Image Placeholder 3"/>
+          <p:cNvSpPr>
+            <a:spLocks noGrp="1" noRot="1" noChangeAspect="1"/>
+          </p:cNvSpPr>
+          <p:nvPr>
+            <p:ph type="sldImg" idx="2"/>
+          </p:nvPr>
+        </p:nvSpPr>
+        <p:spPr>
+          <a:xfrm>
+            <a:off x="685800" y="1143000"/>
+            <a:ext cx="5486400" cy="3086100"/>
+          </a:xfrm>
+          <a:prstGeom prst="rect">
+            <a:avLst/>
+          </a:prstGeom>
+          <a:noFill/>
+          <a:ln w="12700">
+            <a:solidFill>
+              <a:prstClr val="black"/>
+            </a:solidFill>
+          </a:ln>
+        </p:spPr>
+        <p:txBody>
+          <a:bodyPr vert="horz" lIns="91440" tIns="45720" rIns="91440" bIns="45720" rtlCol="0" anchor="ctr"/>
+          <a:lstStyle/>
+          <a:p>
+            <a:endParaRPr lang="en-US"/>
+          </a:p>
+        </p:txBody>
+      </p:sp>
+      <p:sp>
+        <p:nvSpPr>
+          <p:cNvPr id="5" name="Notes Placeholder 4"/>
+          <p:cNvSpPr>
+            <a:spLocks noGrp="1"/>
+          </p:cNvSpPr>
+          <p:nvPr>
+            <p:ph type="body" sz="quarter" idx="3"/>
+          </p:nvPr>
+        </p:nvSpPr>
+        <p:spPr>
+          <a:xfrm>
+            <a:off x="685800" y="4400550"/>
+            <a:ext cx="5486400" cy="3600450"/>
+          </a:xfrm>
+          <a:prstGeom prst="rect">
+            <a:avLst/>
+          </a:prstGeom>
+        </p:spPr>
+        <p:txBody>
+          <a:bodyPr vert="horz" lIns="91440" tIns="45720" rIns="91440" bIns="45720" rtlCol="0"/>
+          <a:lstStyle/>
+          <a:p>
+            <a:pPr lvl="0"/>
+            <a:r>
+              <a:rPr lang="en-US"/>
+              <a:t>Click to edit Master text styles</a:t>
+            </a:r>
+          </a:p>
+          <a:p>
+            <a:pPr lvl="1"/>
+            <a:r>
+              <a:rPr lang="en-US"/>
+              <a:t>Second level</a:t>
+            </a:r>
+          </a:p>
+          <a:p>
+            <a:pPr lvl="2"/>
+            <a:r>
+              <a:rPr lang="en-US"/>
+              <a:t>Third level</a:t>
+            </a:r>
+          </a:p>
+          <a:p>
+            <a:pPr lvl="3"/>
+            <a:r>
+              <a:rPr lang="en-US"/>
+              <a:t>Fourth level</a:t>
+            </a:r>
+          </a:p>
+          <a:p>
+            <a:pPr lvl="4"/>
+            <a:r>
+              <a:rPr lang="en-US"/>
+              <a:t>Fifth level</a:t>
+            </a:r>
+          </a:p>
+        </p:txBody>
+      </p:sp>
+      <p:sp>
+        <p:nvSpPr>
+          <p:cNvPr id="6" name="Footer Placeholder 5"/>
+          <p:cNvSpPr>
+            <a:spLocks noGrp="1"/>
+          </p:cNvSpPr>
+          <p:nvPr>
+            <p:ph type="ftr" sz="quarter" idx="4"/>
+          </p:nvPr>
+        </p:nvSpPr>
+        <p:spPr>
+          <a:xfrm>
+            <a:off x="0" y="8685213"/>
+            <a:ext cx="2971800" cy="458787"/>
+          </a:xfrm>
+          <a:prstGeom prst="rect">
+            <a:avLst/>
+          </a:prstGeom>
+        </p:spPr>
+        <p:txBody>
+          <a:bodyPr vert="horz" lIns="91440" tIns="45720" rIns="91440" bIns="45720" rtlCol="0" anchor="b"/>
+          <a:lstStyle>
+            <a:lvl1pPr algn="l">
+              <a:defRPr sz="1200"/>
+            </a:lvl1pPr>
+          </a:lstStyle>
+          <a:p>
+            <a:endParaRPr lang="en-US"/>
+          </a:p>
+        </p:txBody>
+      </p:sp>
+      <p:sp>
+        <p:nvSpPr>
+          <p:cNvPr id="7" name="Slide Number Placeholder 6"/>
+          <p:cNvSpPr>
+            <a:spLocks noGrp="1"/>
+          </p:cNvSpPr>
+          <p:nvPr>
+            <p:ph type="sldNum" sz="quarter" idx="5"/>
+          </p:nvPr>
+        </p:nvSpPr>
+        <p:spPr>
+          <a:xfrm>
+            <a:off x="3884613" y="8685213"/>
+            <a:ext cx="2971800" cy="458787"/>
+          </a:xfrm>
+          <a:prstGeom prst="rect">
+            <a:avLst/>
+          </a:prstGeom>
+        </p:spPr>
+        <p:txBody>
+          <a:bodyPr vert="horz" lIns="91440" tIns="45720" rIns="91440" bIns="45720" rtlCol="0" anchor="b"/>
+          <a:lstStyle>
+            <a:lvl1pPr algn="r">
+              <a:defRPr sz="1200"/>
+            </a:lvl1pPr>
+          </a:lstStyle>
+          <a:p>
+            <a:fld id="{298F0EA5-9842-4083-B3A4-66437744046E}" type="slidenum">
+              <a:rPr lang="en-US" smtClean="0"/>
+              <a:t>‹#›</a:t>
+            </a:fld>
+            <a:endParaRPr lang="en-US"/>
+          </a:p>
+        </p:txBody>
+      </p:sp>
+    </p:spTree>
+    <p:extLst>
+      <p:ext uri="{BB962C8B-B14F-4D97-AF65-F5344CB8AC3E}">
+        <p14:creationId xmlns:p14="http://schemas.microsoft.com/office/powerpoint/2010/main" val="2666674290"/>
+      </p:ext>
+    </p:extLst>
+  </p:cSld>
+  <p:clrMap bg1="lt1" tx1="dk1" bg2="lt2" tx2="dk2" accent1="accent1" accent2="accent2" accent3="accent3" accent4="accent4" accent5="accent5" accent6="accent6" hlink="hlink" folHlink="folHlink"/>
+  <p:notesStyle>
+    <a:lvl1pPr marL="0" algn="l" defTabSz="914400" rtl="0" eaLnBrk="1" latinLnBrk="0" hangingPunct="1">
+      <a:defRPr sz="1200" kern="1200">
+        <a:solidFill>
+          <a:schemeClr val="tx1"/>
+        </a:solidFill>
+        <a:latin typeface="+mn-lt"/>
+        <a:ea typeface="+mn-ea"/>
+        <a:cs typeface="+mn-cs"/>
+      </a:defRPr>
+    </a:lvl1pPr>
+    <a:lvl2pPr marL="457200" algn="l" defTabSz="914400" rtl="0" eaLnBrk="1" latinLnBrk="0" hangingPunct="1">
+      <a:defRPr sz="1200" kern="1200">
+        <a:solidFill>
+          <a:schemeClr val="tx1"/>
+        </a:solidFill>
+        <a:latin typeface="+mn-lt"/>
+        <a:ea typeface="+mn-ea"/>
+        <a:cs typeface="+mn-cs"/>
+      </a:defRPr>
+    </a:lvl2pPr>
+    <a:lvl3pPr marL="914400" algn="l" defTabSz="914400" rtl="0" eaLnBrk="1" latinLnBrk="0" hangingPunct="1">
+      <a:defRPr sz="1200" kern="1200">
+        <a:solidFill>
+          <a:schemeClr val="tx1"/>
+        </a:solidFill>
+        <a:latin typeface="+mn-lt"/>
+        <a:ea typeface="+mn-ea"/>
+        <a:cs typeface="+mn-cs"/>
+      </a:defRPr>
+    </a:lvl3pPr>
+    <a:lvl4pPr marL="1371600" algn="l" defTabSz="914400" rtl="0" eaLnBrk="1" latinLnBrk="0" hangingPunct="1">
+      <a:defRPr sz="1200" kern="1200">
+        <a:solidFill>
+          <a:schemeClr val="tx1"/>
+        </a:solidFill>
+        <a:latin typeface="+mn-lt"/>
+        <a:ea typeface="+mn-ea"/>
+        <a:cs typeface="+mn-cs"/>
+      </a:defRPr>
+    </a:lvl4pPr>
+    <a:lvl5pPr marL="1828800" algn="l" defTabSz="914400" rtl="0" eaLnBrk="1" latinLnBrk="0" hangingPunct="1">
+      <a:defRPr sz="1200" kern="1200">
+        <a:solidFill>
+          <a:schemeClr val="tx1"/>
+        </a:solidFill>
+        <a:latin typeface="+mn-lt"/>
+        <a:ea typeface="+mn-ea"/>
+        <a:cs typeface="+mn-cs"/>
+      </a:defRPr>
+    </a:lvl5pPr>
+    <a:lvl6pPr marL="2286000" algn="l" defTabSz="914400" rtl="0" eaLnBrk="1" latinLnBrk="0" hangingPunct="1">
+      <a:defRPr sz="1200" kern="1200">
+        <a:solidFill>
+          <a:schemeClr val="tx1"/>
+        </a:solidFill>
+        <a:latin typeface="+mn-lt"/>
+        <a:ea typeface="+mn-ea"/>
+        <a:cs typeface="+mn-cs"/>
+      </a:defRPr>
+    </a:lvl6pPr>
+    <a:lvl7pPr marL="2743200" algn="l" defTabSz="914400" rtl="0" eaLnBrk="1" latinLnBrk="0" hangingPunct="1">
+      <a:defRPr sz="1200" kern="1200">
+        <a:solidFill>
+          <a:schemeClr val="tx1"/>
+        </a:solidFill>
+        <a:latin typeface="+mn-lt"/>
+        <a:ea typeface="+mn-ea"/>
+        <a:cs typeface="+mn-cs"/>
+      </a:defRPr>
+    </a:lvl7pPr>
+    <a:lvl8pPr marL="3200400" algn="l" defTabSz="914400" rtl="0" eaLnBrk="1" latinLnBrk="0" hangingPunct="1">
+      <a:defRPr sz="1200" kern="1200">
+        <a:solidFill>
+          <a:schemeClr val="tx1"/>
+        </a:solidFill>
+        <a:latin typeface="+mn-lt"/>
+        <a:ea typeface="+mn-ea"/>
+        <a:cs typeface="+mn-cs"/>
+      </a:defRPr>
+    </a:lvl8pPr>
+    <a:lvl9pPr marL="3657600" algn="l" defTabSz="914400" rtl="0" eaLnBrk="1" latinLnBrk="0" hangingPunct="1">
+      <a:defRPr sz="1200" kern="1200">
+        <a:solidFill>
+          <a:schemeClr val="tx1"/>
+        </a:solidFill>
+        <a:latin typeface="+mn-lt"/>
+        <a:ea typeface="+mn-ea"/>
+        <a:cs typeface="+mn-cs"/>
+      </a:defRPr>
+    </a:lvl9pPr>
+  </p:notesStyle>
+</p:notesMaster>
+</file>
+
 <file path=ppt/slideLayouts/slideLayout1.xml><?xml version="1.0" encoding="utf-8"?>
 <p:sldLayout xmlns:a="http://schemas.openxmlformats.org/drawingml/2006/main" xmlns:r="http://schemas.openxmlformats.org/officeDocument/2006/relationships" xmlns:p="http://schemas.openxmlformats.org/presentationml/2006/main" type="title" preserve="1">
   <p:cSld name="Title Slide">
@@ -291,9 +643,9 @@
           <a:bodyPr/>
           <a:lstStyle/>
           <a:p>
-            <a:fld id="{BCAF0A95-D8F2-F44A-ADA5-4A6276384FC8}" type="datetimeFigureOut">
+            <a:fld id="{15EF66EA-7CC5-477B-80F1-8AB2601F1F88}" type="datetime1">
               <a:rPr lang="de-DE" smtClean="0"/>
-              <a:t>05.04.2020</a:t>
+              <a:t>06.04.2020</a:t>
             </a:fld>
             <a:endParaRPr lang="de-DE"/>
           </a:p>
@@ -491,9 +843,9 @@
           <a:bodyPr/>
           <a:lstStyle/>
           <a:p>
-            <a:fld id="{BCAF0A95-D8F2-F44A-ADA5-4A6276384FC8}" type="datetimeFigureOut">
+            <a:fld id="{8094D0AD-818A-484C-988E-733D7CBF505E}" type="datetime1">
               <a:rPr lang="de-DE" smtClean="0"/>
-              <a:t>05.04.2020</a:t>
+              <a:t>06.04.2020</a:t>
             </a:fld>
             <a:endParaRPr lang="de-DE"/>
           </a:p>
@@ -701,9 +1053,9 @@
           <a:bodyPr/>
           <a:lstStyle/>
           <a:p>
-            <a:fld id="{BCAF0A95-D8F2-F44A-ADA5-4A6276384FC8}" type="datetimeFigureOut">
+            <a:fld id="{6A2CDEE2-3947-4BBE-A32B-315C6EE14044}" type="datetime1">
               <a:rPr lang="de-DE" smtClean="0"/>
-              <a:t>05.04.2020</a:t>
+              <a:t>06.04.2020</a:t>
             </a:fld>
             <a:endParaRPr lang="de-DE"/>
           </a:p>
@@ -901,9 +1253,9 @@
           <a:bodyPr/>
           <a:lstStyle/>
           <a:p>
-            <a:fld id="{BCAF0A95-D8F2-F44A-ADA5-4A6276384FC8}" type="datetimeFigureOut">
+            <a:fld id="{1678A154-33EF-426C-A151-2F0AD3EBCF76}" type="datetime1">
               <a:rPr lang="de-DE" smtClean="0"/>
-              <a:t>05.04.2020</a:t>
+              <a:t>06.04.2020</a:t>
             </a:fld>
             <a:endParaRPr lang="de-DE"/>
           </a:p>
@@ -1177,9 +1529,9 @@
           <a:bodyPr/>
           <a:lstStyle/>
           <a:p>
-            <a:fld id="{BCAF0A95-D8F2-F44A-ADA5-4A6276384FC8}" type="datetimeFigureOut">
+            <a:fld id="{CEB4F9E4-4360-499B-B36F-BA55A8609F7B}" type="datetime1">
               <a:rPr lang="de-DE" smtClean="0"/>
-              <a:t>05.04.2020</a:t>
+              <a:t>06.04.2020</a:t>
             </a:fld>
             <a:endParaRPr lang="de-DE"/>
           </a:p>
@@ -1445,9 +1797,9 @@
           <a:bodyPr/>
           <a:lstStyle/>
           <a:p>
-            <a:fld id="{BCAF0A95-D8F2-F44A-ADA5-4A6276384FC8}" type="datetimeFigureOut">
+            <a:fld id="{F7547C07-CFC3-4E8E-9E85-228C8B488CD1}" type="datetime1">
               <a:rPr lang="de-DE" smtClean="0"/>
-              <a:t>05.04.2020</a:t>
+              <a:t>06.04.2020</a:t>
             </a:fld>
             <a:endParaRPr lang="de-DE"/>
           </a:p>
@@ -1860,9 +2212,9 @@
           <a:bodyPr/>
           <a:lstStyle/>
           <a:p>
-            <a:fld id="{BCAF0A95-D8F2-F44A-ADA5-4A6276384FC8}" type="datetimeFigureOut">
+            <a:fld id="{2215A030-BE9E-4DE4-821A-774F8CE2C808}" type="datetime1">
               <a:rPr lang="de-DE" smtClean="0"/>
-              <a:t>05.04.2020</a:t>
+              <a:t>06.04.2020</a:t>
             </a:fld>
             <a:endParaRPr lang="de-DE"/>
           </a:p>
@@ -2002,9 +2354,9 @@
           <a:bodyPr/>
           <a:lstStyle/>
           <a:p>
-            <a:fld id="{BCAF0A95-D8F2-F44A-ADA5-4A6276384FC8}" type="datetimeFigureOut">
+            <a:fld id="{1A0D111F-BD68-4F89-8423-E603AA9DA81C}" type="datetime1">
               <a:rPr lang="de-DE" smtClean="0"/>
-              <a:t>05.04.2020</a:t>
+              <a:t>06.04.2020</a:t>
             </a:fld>
             <a:endParaRPr lang="de-DE"/>
           </a:p>
@@ -2115,9 +2467,9 @@
           <a:bodyPr/>
           <a:lstStyle/>
           <a:p>
-            <a:fld id="{BCAF0A95-D8F2-F44A-ADA5-4A6276384FC8}" type="datetimeFigureOut">
+            <a:fld id="{2C7F27B1-BBA1-4C27-8A2F-E01354487744}" type="datetime1">
               <a:rPr lang="de-DE" smtClean="0"/>
-              <a:t>05.04.2020</a:t>
+              <a:t>06.04.2020</a:t>
             </a:fld>
             <a:endParaRPr lang="de-DE"/>
           </a:p>
@@ -2428,9 +2780,9 @@
           <a:bodyPr/>
           <a:lstStyle/>
           <a:p>
-            <a:fld id="{BCAF0A95-D8F2-F44A-ADA5-4A6276384FC8}" type="datetimeFigureOut">
+            <a:fld id="{2DFEE806-30D6-4F43-9FE9-861479A06D54}" type="datetime1">
               <a:rPr lang="de-DE" smtClean="0"/>
-              <a:t>05.04.2020</a:t>
+              <a:t>06.04.2020</a:t>
             </a:fld>
             <a:endParaRPr lang="de-DE"/>
           </a:p>
@@ -2717,9 +3069,9 @@
           <a:bodyPr/>
           <a:lstStyle/>
           <a:p>
-            <a:fld id="{BCAF0A95-D8F2-F44A-ADA5-4A6276384FC8}" type="datetimeFigureOut">
+            <a:fld id="{A80003E5-ADE2-4F53-A13C-C278FC0E33C9}" type="datetime1">
               <a:rPr lang="de-DE" smtClean="0"/>
-              <a:t>05.04.2020</a:t>
+              <a:t>06.04.2020</a:t>
             </a:fld>
             <a:endParaRPr lang="de-DE"/>
           </a:p>
@@ -2960,9 +3312,9 @@
             </a:lvl1pPr>
           </a:lstStyle>
           <a:p>
-            <a:fld id="{BCAF0A95-D8F2-F44A-ADA5-4A6276384FC8}" type="datetimeFigureOut">
+            <a:fld id="{DA156BB2-7B28-4BCB-B93F-B194B319E782}" type="datetime1">
               <a:rPr lang="de-DE" smtClean="0"/>
-              <a:t>05.04.2020</a:t>
+              <a:t>06.04.2020</a:t>
             </a:fld>
             <a:endParaRPr lang="de-DE"/>
           </a:p>
@@ -3079,6 +3431,7 @@
     <p:sldLayoutId id="2147483658" r:id="rId10"/>
     <p:sldLayoutId id="2147483659" r:id="rId11"/>
   </p:sldLayoutIdLst>
+  <p:hf hdr="0" ftr="0"/>
   <p:txStyles>
     <p:titleStyle>
       <a:lvl1pPr algn="l" defTabSz="914400" rtl="0" eaLnBrk="1" latinLnBrk="0" hangingPunct="1">
@@ -3423,30 +3776,110 @@
             <p:ph type="subTitle" idx="1"/>
           </p:nvPr>
         </p:nvSpPr>
+        <p:spPr>
+          <a:xfrm>
+            <a:off x="1524000" y="3602038"/>
+            <a:ext cx="9144000" cy="2798762"/>
+          </a:xfrm>
+        </p:spPr>
+        <p:txBody>
+          <a:bodyPr>
+            <a:normAutofit/>
+          </a:bodyPr>
+          <a:lstStyle/>
+          <a:p>
+            <a:r>
+              <a:rPr lang="en-US" dirty="0"/>
+              <a:t>K. Schopmeyer, A. Maier</a:t>
+            </a:r>
+          </a:p>
+          <a:p>
+            <a:r>
+              <a:rPr lang="en-US" dirty="0"/>
+              <a:t>Original Jan 2020</a:t>
+            </a:r>
+          </a:p>
+          <a:p>
+            <a:r>
+              <a:rPr lang="en-US" dirty="0"/>
+              <a:t>Updated Discussion 15 Jan 2020</a:t>
+            </a:r>
+          </a:p>
+          <a:p>
+            <a:r>
+              <a:rPr lang="en-US" dirty="0"/>
+              <a:t>Update Feb 2020 to reflect design of data store and object store</a:t>
+            </a:r>
+          </a:p>
+          <a:p>
+            <a:r>
+              <a:rPr lang="en-US" dirty="0"/>
+              <a:t>Update 6 April 2020 to reflect design of providers. See page</a:t>
+            </a:r>
+          </a:p>
+          <a:p>
+            <a:endParaRPr lang="en-US" dirty="0"/>
+          </a:p>
+          <a:p>
+            <a:endParaRPr lang="en-US" dirty="0"/>
+          </a:p>
+        </p:txBody>
+      </p:sp>
+      <p:sp>
+        <p:nvSpPr>
+          <p:cNvPr id="4" name="Date Placeholder 3">
+            <a:extLst>
+              <a:ext uri="{FF2B5EF4-FFF2-40B4-BE49-F238E27FC236}">
+                <a16:creationId xmlns:a16="http://schemas.microsoft.com/office/drawing/2014/main" id="{41677750-C8D0-476E-9314-BEB7E21A2FB5}"/>
+              </a:ext>
+            </a:extLst>
+          </p:cNvPr>
+          <p:cNvSpPr>
+            <a:spLocks noGrp="1"/>
+          </p:cNvSpPr>
+          <p:nvPr>
+            <p:ph type="dt" sz="half" idx="10"/>
+          </p:nvPr>
+        </p:nvSpPr>
         <p:spPr/>
         <p:txBody>
           <a:bodyPr/>
           <a:lstStyle/>
           <a:p>
-            <a:r>
-              <a:rPr lang="en-US" dirty="0"/>
-              <a:t>K. Schopmeyer, A. Maier</a:t>
-            </a:r>
-          </a:p>
-          <a:p>
-            <a:r>
-              <a:rPr lang="en-US" dirty="0"/>
-              <a:t>Original Jan 2020</a:t>
-            </a:r>
-          </a:p>
-          <a:p>
-            <a:r>
-              <a:rPr lang="en-US" dirty="0"/>
-              <a:t>Updated Discussion 15 Jan 2020</a:t>
-            </a:r>
-          </a:p>
-          <a:p>
-            <a:endParaRPr lang="en-US" dirty="0"/>
+            <a:fld id="{78AD0F07-AB73-42FB-9EB9-C011C90D146D}" type="datetime1">
+              <a:rPr lang="de-DE" smtClean="0"/>
+              <a:t>06.04.2020</a:t>
+            </a:fld>
+            <a:endParaRPr lang="de-DE"/>
+          </a:p>
+        </p:txBody>
+      </p:sp>
+      <p:sp>
+        <p:nvSpPr>
+          <p:cNvPr id="5" name="Slide Number Placeholder 4">
+            <a:extLst>
+              <a:ext uri="{FF2B5EF4-FFF2-40B4-BE49-F238E27FC236}">
+                <a16:creationId xmlns:a16="http://schemas.microsoft.com/office/drawing/2014/main" id="{F5C0D5AC-AAED-4F1B-BAB9-AA649ECBB44B}"/>
+              </a:ext>
+            </a:extLst>
+          </p:cNvPr>
+          <p:cNvSpPr>
+            <a:spLocks noGrp="1"/>
+          </p:cNvSpPr>
+          <p:nvPr>
+            <p:ph type="sldNum" sz="quarter" idx="12"/>
+          </p:nvPr>
+        </p:nvSpPr>
+        <p:spPr/>
+        <p:txBody>
+          <a:bodyPr/>
+          <a:lstStyle/>
+          <a:p>
+            <a:fld id="{266A34EE-793E-EA45-A2C1-765A5FA2B1F8}" type="slidenum">
+              <a:rPr lang="de-DE" smtClean="0"/>
+              <a:t>1</a:t>
+            </a:fld>
+            <a:endParaRPr lang="de-DE"/>
           </a:p>
         </p:txBody>
       </p:sp>
@@ -5018,6 +5451,64 @@
           </a:fontRef>
         </p:style>
       </p:cxnSp>
+      <p:sp>
+        <p:nvSpPr>
+          <p:cNvPr id="3" name="Date Placeholder 2">
+            <a:extLst>
+              <a:ext uri="{FF2B5EF4-FFF2-40B4-BE49-F238E27FC236}">
+                <a16:creationId xmlns:a16="http://schemas.microsoft.com/office/drawing/2014/main" id="{383AF862-83BA-486F-9623-827681F3CF9B}"/>
+              </a:ext>
+            </a:extLst>
+          </p:cNvPr>
+          <p:cNvSpPr>
+            <a:spLocks noGrp="1"/>
+          </p:cNvSpPr>
+          <p:nvPr>
+            <p:ph type="dt" sz="half" idx="10"/>
+          </p:nvPr>
+        </p:nvSpPr>
+        <p:spPr/>
+        <p:txBody>
+          <a:bodyPr/>
+          <a:lstStyle/>
+          <a:p>
+            <a:fld id="{798672D8-65DF-499B-A842-51542A7E172D}" type="datetime1">
+              <a:rPr lang="de-DE" smtClean="0"/>
+              <a:t>06.04.2020</a:t>
+            </a:fld>
+            <a:endParaRPr lang="de-DE"/>
+          </a:p>
+        </p:txBody>
+      </p:sp>
+      <p:sp>
+        <p:nvSpPr>
+          <p:cNvPr id="4" name="Slide Number Placeholder 3">
+            <a:extLst>
+              <a:ext uri="{FF2B5EF4-FFF2-40B4-BE49-F238E27FC236}">
+                <a16:creationId xmlns:a16="http://schemas.microsoft.com/office/drawing/2014/main" id="{ED4F01C7-19DD-4130-BBCB-D4B202850302}"/>
+              </a:ext>
+            </a:extLst>
+          </p:cNvPr>
+          <p:cNvSpPr>
+            <a:spLocks noGrp="1"/>
+          </p:cNvSpPr>
+          <p:nvPr>
+            <p:ph type="sldNum" sz="quarter" idx="12"/>
+          </p:nvPr>
+        </p:nvSpPr>
+        <p:spPr/>
+        <p:txBody>
+          <a:bodyPr/>
+          <a:lstStyle/>
+          <a:p>
+            <a:fld id="{266A34EE-793E-EA45-A2C1-765A5FA2B1F8}" type="slidenum">
+              <a:rPr lang="de-DE" smtClean="0"/>
+              <a:t>10</a:t>
+            </a:fld>
+            <a:endParaRPr lang="de-DE"/>
+          </a:p>
+        </p:txBody>
+      </p:sp>
     </p:spTree>
     <p:extLst>
       <p:ext uri="{BB962C8B-B14F-4D97-AF65-F5344CB8AC3E}">
@@ -6617,6 +7108,64 @@
           </a:fontRef>
         </p:style>
       </p:cxnSp>
+      <p:sp>
+        <p:nvSpPr>
+          <p:cNvPr id="3" name="Date Placeholder 2">
+            <a:extLst>
+              <a:ext uri="{FF2B5EF4-FFF2-40B4-BE49-F238E27FC236}">
+                <a16:creationId xmlns:a16="http://schemas.microsoft.com/office/drawing/2014/main" id="{9F0FAA60-BC92-4089-8FF2-1114660F7B88}"/>
+              </a:ext>
+            </a:extLst>
+          </p:cNvPr>
+          <p:cNvSpPr>
+            <a:spLocks noGrp="1"/>
+          </p:cNvSpPr>
+          <p:nvPr>
+            <p:ph type="dt" sz="half" idx="10"/>
+          </p:nvPr>
+        </p:nvSpPr>
+        <p:spPr/>
+        <p:txBody>
+          <a:bodyPr/>
+          <a:lstStyle/>
+          <a:p>
+            <a:fld id="{8BA880BD-A575-42CB-9D5B-E3294FC391E7}" type="datetime1">
+              <a:rPr lang="de-DE" smtClean="0"/>
+              <a:t>06.04.2020</a:t>
+            </a:fld>
+            <a:endParaRPr lang="de-DE"/>
+          </a:p>
+        </p:txBody>
+      </p:sp>
+      <p:sp>
+        <p:nvSpPr>
+          <p:cNvPr id="4" name="Slide Number Placeholder 3">
+            <a:extLst>
+              <a:ext uri="{FF2B5EF4-FFF2-40B4-BE49-F238E27FC236}">
+                <a16:creationId xmlns:a16="http://schemas.microsoft.com/office/drawing/2014/main" id="{005C404F-24C5-4F84-AAE8-BDDE7ADC3AC8}"/>
+              </a:ext>
+            </a:extLst>
+          </p:cNvPr>
+          <p:cNvSpPr>
+            <a:spLocks noGrp="1"/>
+          </p:cNvSpPr>
+          <p:nvPr>
+            <p:ph type="sldNum" sz="quarter" idx="12"/>
+          </p:nvPr>
+        </p:nvSpPr>
+        <p:spPr/>
+        <p:txBody>
+          <a:bodyPr/>
+          <a:lstStyle/>
+          <a:p>
+            <a:fld id="{266A34EE-793E-EA45-A2C1-765A5FA2B1F8}" type="slidenum">
+              <a:rPr lang="de-DE" smtClean="0"/>
+              <a:t>11</a:t>
+            </a:fld>
+            <a:endParaRPr lang="de-DE"/>
+          </a:p>
+        </p:txBody>
+      </p:sp>
     </p:spTree>
     <p:extLst>
       <p:ext uri="{BB962C8B-B14F-4D97-AF65-F5344CB8AC3E}">
@@ -6858,6 +7407,64 @@
           </a:p>
         </p:txBody>
       </p:sp>
+      <p:sp>
+        <p:nvSpPr>
+          <p:cNvPr id="4" name="Date Placeholder 3">
+            <a:extLst>
+              <a:ext uri="{FF2B5EF4-FFF2-40B4-BE49-F238E27FC236}">
+                <a16:creationId xmlns:a16="http://schemas.microsoft.com/office/drawing/2014/main" id="{CD18B6C2-D7A7-41FA-A10C-E17AFE6FD8FC}"/>
+              </a:ext>
+            </a:extLst>
+          </p:cNvPr>
+          <p:cNvSpPr>
+            <a:spLocks noGrp="1"/>
+          </p:cNvSpPr>
+          <p:nvPr>
+            <p:ph type="dt" sz="half" idx="10"/>
+          </p:nvPr>
+        </p:nvSpPr>
+        <p:spPr/>
+        <p:txBody>
+          <a:bodyPr/>
+          <a:lstStyle/>
+          <a:p>
+            <a:fld id="{94E6E5F9-FA2C-486F-B41C-DBCB0089CD52}" type="datetime1">
+              <a:rPr lang="de-DE" smtClean="0"/>
+              <a:t>06.04.2020</a:t>
+            </a:fld>
+            <a:endParaRPr lang="de-DE"/>
+          </a:p>
+        </p:txBody>
+      </p:sp>
+      <p:sp>
+        <p:nvSpPr>
+          <p:cNvPr id="5" name="Slide Number Placeholder 4">
+            <a:extLst>
+              <a:ext uri="{FF2B5EF4-FFF2-40B4-BE49-F238E27FC236}">
+                <a16:creationId xmlns:a16="http://schemas.microsoft.com/office/drawing/2014/main" id="{7FCDBB4A-943D-4397-BCB4-4B8538BC99E0}"/>
+              </a:ext>
+            </a:extLst>
+          </p:cNvPr>
+          <p:cNvSpPr>
+            <a:spLocks noGrp="1"/>
+          </p:cNvSpPr>
+          <p:nvPr>
+            <p:ph type="sldNum" sz="quarter" idx="12"/>
+          </p:nvPr>
+        </p:nvSpPr>
+        <p:spPr/>
+        <p:txBody>
+          <a:bodyPr/>
+          <a:lstStyle/>
+          <a:p>
+            <a:fld id="{266A34EE-793E-EA45-A2C1-765A5FA2B1F8}" type="slidenum">
+              <a:rPr lang="de-DE" smtClean="0"/>
+              <a:t>12</a:t>
+            </a:fld>
+            <a:endParaRPr lang="de-DE"/>
+          </a:p>
+        </p:txBody>
+      </p:sp>
     </p:spTree>
     <p:extLst>
       <p:ext uri="{BB962C8B-B14F-4D97-AF65-F5344CB8AC3E}">
@@ -7121,6 +7728,64 @@
           </a:p>
         </p:txBody>
       </p:sp>
+      <p:sp>
+        <p:nvSpPr>
+          <p:cNvPr id="5" name="Date Placeholder 4">
+            <a:extLst>
+              <a:ext uri="{FF2B5EF4-FFF2-40B4-BE49-F238E27FC236}">
+                <a16:creationId xmlns:a16="http://schemas.microsoft.com/office/drawing/2014/main" id="{EC8EFCBD-1C9B-4D40-BFC0-846DB4523FF4}"/>
+              </a:ext>
+            </a:extLst>
+          </p:cNvPr>
+          <p:cNvSpPr>
+            <a:spLocks noGrp="1"/>
+          </p:cNvSpPr>
+          <p:nvPr>
+            <p:ph type="dt" sz="half" idx="10"/>
+          </p:nvPr>
+        </p:nvSpPr>
+        <p:spPr/>
+        <p:txBody>
+          <a:bodyPr/>
+          <a:lstStyle/>
+          <a:p>
+            <a:fld id="{85740ED1-8AA2-4092-B43C-438AE914F9A2}" type="datetime1">
+              <a:rPr lang="de-DE" smtClean="0"/>
+              <a:t>06.04.2020</a:t>
+            </a:fld>
+            <a:endParaRPr lang="de-DE"/>
+          </a:p>
+        </p:txBody>
+      </p:sp>
+      <p:sp>
+        <p:nvSpPr>
+          <p:cNvPr id="6" name="Slide Number Placeholder 5">
+            <a:extLst>
+              <a:ext uri="{FF2B5EF4-FFF2-40B4-BE49-F238E27FC236}">
+                <a16:creationId xmlns:a16="http://schemas.microsoft.com/office/drawing/2014/main" id="{8E95AC00-5C31-419A-9DF8-4B5AAF74BBD8}"/>
+              </a:ext>
+            </a:extLst>
+          </p:cNvPr>
+          <p:cNvSpPr>
+            <a:spLocks noGrp="1"/>
+          </p:cNvSpPr>
+          <p:nvPr>
+            <p:ph type="sldNum" sz="quarter" idx="12"/>
+          </p:nvPr>
+        </p:nvSpPr>
+        <p:spPr/>
+        <p:txBody>
+          <a:bodyPr/>
+          <a:lstStyle/>
+          <a:p>
+            <a:fld id="{266A34EE-793E-EA45-A2C1-765A5FA2B1F8}" type="slidenum">
+              <a:rPr lang="de-DE" smtClean="0"/>
+              <a:t>13</a:t>
+            </a:fld>
+            <a:endParaRPr lang="de-DE"/>
+          </a:p>
+        </p:txBody>
+      </p:sp>
     </p:spTree>
     <p:extLst>
       <p:ext uri="{BB962C8B-B14F-4D97-AF65-F5344CB8AC3E}">
@@ -7247,6 +7912,64 @@
           </a:p>
         </p:txBody>
       </p:sp>
+      <p:sp>
+        <p:nvSpPr>
+          <p:cNvPr id="4" name="Date Placeholder 3">
+            <a:extLst>
+              <a:ext uri="{FF2B5EF4-FFF2-40B4-BE49-F238E27FC236}">
+                <a16:creationId xmlns:a16="http://schemas.microsoft.com/office/drawing/2014/main" id="{98CDCF70-8B93-4BD3-94D5-F8F86D5FFFF5}"/>
+              </a:ext>
+            </a:extLst>
+          </p:cNvPr>
+          <p:cNvSpPr>
+            <a:spLocks noGrp="1"/>
+          </p:cNvSpPr>
+          <p:nvPr>
+            <p:ph type="dt" sz="half" idx="10"/>
+          </p:nvPr>
+        </p:nvSpPr>
+        <p:spPr/>
+        <p:txBody>
+          <a:bodyPr/>
+          <a:lstStyle/>
+          <a:p>
+            <a:fld id="{FAA3CCC0-E02E-4FC1-BAC8-67AF25AE7EDE}" type="datetime1">
+              <a:rPr lang="de-DE" smtClean="0"/>
+              <a:t>06.04.2020</a:t>
+            </a:fld>
+            <a:endParaRPr lang="de-DE"/>
+          </a:p>
+        </p:txBody>
+      </p:sp>
+      <p:sp>
+        <p:nvSpPr>
+          <p:cNvPr id="5" name="Slide Number Placeholder 4">
+            <a:extLst>
+              <a:ext uri="{FF2B5EF4-FFF2-40B4-BE49-F238E27FC236}">
+                <a16:creationId xmlns:a16="http://schemas.microsoft.com/office/drawing/2014/main" id="{A5D1CF48-18A4-4B53-849C-AF4DB845063F}"/>
+              </a:ext>
+            </a:extLst>
+          </p:cNvPr>
+          <p:cNvSpPr>
+            <a:spLocks noGrp="1"/>
+          </p:cNvSpPr>
+          <p:nvPr>
+            <p:ph type="sldNum" sz="quarter" idx="12"/>
+          </p:nvPr>
+        </p:nvSpPr>
+        <p:spPr/>
+        <p:txBody>
+          <a:bodyPr/>
+          <a:lstStyle/>
+          <a:p>
+            <a:fld id="{266A34EE-793E-EA45-A2C1-765A5FA2B1F8}" type="slidenum">
+              <a:rPr lang="de-DE" smtClean="0"/>
+              <a:t>14</a:t>
+            </a:fld>
+            <a:endParaRPr lang="de-DE"/>
+          </a:p>
+        </p:txBody>
+      </p:sp>
     </p:spTree>
     <p:extLst>
       <p:ext uri="{BB962C8B-B14F-4D97-AF65-F5344CB8AC3E}">
@@ -7670,6 +8393,64 @@
           </a:p>
         </p:txBody>
       </p:sp>
+      <p:sp>
+        <p:nvSpPr>
+          <p:cNvPr id="4" name="Date Placeholder 3">
+            <a:extLst>
+              <a:ext uri="{FF2B5EF4-FFF2-40B4-BE49-F238E27FC236}">
+                <a16:creationId xmlns:a16="http://schemas.microsoft.com/office/drawing/2014/main" id="{EFE08A5C-C53A-49DE-B30F-7CBFC195C296}"/>
+              </a:ext>
+            </a:extLst>
+          </p:cNvPr>
+          <p:cNvSpPr>
+            <a:spLocks noGrp="1"/>
+          </p:cNvSpPr>
+          <p:nvPr>
+            <p:ph type="dt" sz="half" idx="10"/>
+          </p:nvPr>
+        </p:nvSpPr>
+        <p:spPr/>
+        <p:txBody>
+          <a:bodyPr/>
+          <a:lstStyle/>
+          <a:p>
+            <a:fld id="{9AAF2DF6-6D7F-4302-BF40-84F958537A75}" type="datetime1">
+              <a:rPr lang="de-DE" smtClean="0"/>
+              <a:t>06.04.2020</a:t>
+            </a:fld>
+            <a:endParaRPr lang="de-DE"/>
+          </a:p>
+        </p:txBody>
+      </p:sp>
+      <p:sp>
+        <p:nvSpPr>
+          <p:cNvPr id="5" name="Slide Number Placeholder 4">
+            <a:extLst>
+              <a:ext uri="{FF2B5EF4-FFF2-40B4-BE49-F238E27FC236}">
+                <a16:creationId xmlns:a16="http://schemas.microsoft.com/office/drawing/2014/main" id="{3C9BEDBD-78C6-4DC4-9762-572826779454}"/>
+              </a:ext>
+            </a:extLst>
+          </p:cNvPr>
+          <p:cNvSpPr>
+            <a:spLocks noGrp="1"/>
+          </p:cNvSpPr>
+          <p:nvPr>
+            <p:ph type="sldNum" sz="quarter" idx="12"/>
+          </p:nvPr>
+        </p:nvSpPr>
+        <p:spPr/>
+        <p:txBody>
+          <a:bodyPr/>
+          <a:lstStyle/>
+          <a:p>
+            <a:fld id="{266A34EE-793E-EA45-A2C1-765A5FA2B1F8}" type="slidenum">
+              <a:rPr lang="de-DE" smtClean="0"/>
+              <a:t>15</a:t>
+            </a:fld>
+            <a:endParaRPr lang="de-DE"/>
+          </a:p>
+        </p:txBody>
+      </p:sp>
     </p:spTree>
     <p:extLst>
       <p:ext uri="{BB962C8B-B14F-4D97-AF65-F5344CB8AC3E}">
@@ -7959,6 +8740,64 @@
           </a:p>
         </p:txBody>
       </p:sp>
+      <p:sp>
+        <p:nvSpPr>
+          <p:cNvPr id="4" name="Date Placeholder 3">
+            <a:extLst>
+              <a:ext uri="{FF2B5EF4-FFF2-40B4-BE49-F238E27FC236}">
+                <a16:creationId xmlns:a16="http://schemas.microsoft.com/office/drawing/2014/main" id="{98A8C78F-D314-4B4A-8CAB-AE75FF47E192}"/>
+              </a:ext>
+            </a:extLst>
+          </p:cNvPr>
+          <p:cNvSpPr>
+            <a:spLocks noGrp="1"/>
+          </p:cNvSpPr>
+          <p:nvPr>
+            <p:ph type="dt" sz="half" idx="10"/>
+          </p:nvPr>
+        </p:nvSpPr>
+        <p:spPr/>
+        <p:txBody>
+          <a:bodyPr/>
+          <a:lstStyle/>
+          <a:p>
+            <a:fld id="{C626F4F1-8903-476E-BAA6-D8F2BAFA8AB3}" type="datetime1">
+              <a:rPr lang="de-DE" smtClean="0"/>
+              <a:t>06.04.2020</a:t>
+            </a:fld>
+            <a:endParaRPr lang="de-DE"/>
+          </a:p>
+        </p:txBody>
+      </p:sp>
+      <p:sp>
+        <p:nvSpPr>
+          <p:cNvPr id="5" name="Slide Number Placeholder 4">
+            <a:extLst>
+              <a:ext uri="{FF2B5EF4-FFF2-40B4-BE49-F238E27FC236}">
+                <a16:creationId xmlns:a16="http://schemas.microsoft.com/office/drawing/2014/main" id="{24C18CCF-5592-4227-B484-BA58F0571B77}"/>
+              </a:ext>
+            </a:extLst>
+          </p:cNvPr>
+          <p:cNvSpPr>
+            <a:spLocks noGrp="1"/>
+          </p:cNvSpPr>
+          <p:nvPr>
+            <p:ph type="sldNum" sz="quarter" idx="12"/>
+          </p:nvPr>
+        </p:nvSpPr>
+        <p:spPr/>
+        <p:txBody>
+          <a:bodyPr/>
+          <a:lstStyle/>
+          <a:p>
+            <a:fld id="{266A34EE-793E-EA45-A2C1-765A5FA2B1F8}" type="slidenum">
+              <a:rPr lang="de-DE" smtClean="0"/>
+              <a:t>16</a:t>
+            </a:fld>
+            <a:endParaRPr lang="de-DE"/>
+          </a:p>
+        </p:txBody>
+      </p:sp>
     </p:spTree>
     <p:extLst>
       <p:ext uri="{BB962C8B-B14F-4D97-AF65-F5344CB8AC3E}">
@@ -8403,6 +9242,64 @@
           </a:p>
         </p:txBody>
       </p:sp>
+      <p:sp>
+        <p:nvSpPr>
+          <p:cNvPr id="3" name="Date Placeholder 2">
+            <a:extLst>
+              <a:ext uri="{FF2B5EF4-FFF2-40B4-BE49-F238E27FC236}">
+                <a16:creationId xmlns:a16="http://schemas.microsoft.com/office/drawing/2014/main" id="{0F3DD97F-57BA-4ECF-B03E-17F37F2A9F8D}"/>
+              </a:ext>
+            </a:extLst>
+          </p:cNvPr>
+          <p:cNvSpPr>
+            <a:spLocks noGrp="1"/>
+          </p:cNvSpPr>
+          <p:nvPr>
+            <p:ph type="dt" sz="half" idx="10"/>
+          </p:nvPr>
+        </p:nvSpPr>
+        <p:spPr/>
+        <p:txBody>
+          <a:bodyPr/>
+          <a:lstStyle/>
+          <a:p>
+            <a:fld id="{F8E8CA9D-7C99-4CD8-BBEB-B81CE0B4E5CB}" type="datetime1">
+              <a:rPr lang="de-DE" smtClean="0"/>
+              <a:t>06.04.2020</a:t>
+            </a:fld>
+            <a:endParaRPr lang="de-DE"/>
+          </a:p>
+        </p:txBody>
+      </p:sp>
+      <p:sp>
+        <p:nvSpPr>
+          <p:cNvPr id="5" name="Slide Number Placeholder 4">
+            <a:extLst>
+              <a:ext uri="{FF2B5EF4-FFF2-40B4-BE49-F238E27FC236}">
+                <a16:creationId xmlns:a16="http://schemas.microsoft.com/office/drawing/2014/main" id="{64CED22A-D49F-4320-817B-C0B17BFB325A}"/>
+              </a:ext>
+            </a:extLst>
+          </p:cNvPr>
+          <p:cNvSpPr>
+            <a:spLocks noGrp="1"/>
+          </p:cNvSpPr>
+          <p:nvPr>
+            <p:ph type="sldNum" sz="quarter" idx="12"/>
+          </p:nvPr>
+        </p:nvSpPr>
+        <p:spPr/>
+        <p:txBody>
+          <a:bodyPr/>
+          <a:lstStyle/>
+          <a:p>
+            <a:fld id="{266A34EE-793E-EA45-A2C1-765A5FA2B1F8}" type="slidenum">
+              <a:rPr lang="de-DE" smtClean="0"/>
+              <a:t>17</a:t>
+            </a:fld>
+            <a:endParaRPr lang="de-DE"/>
+          </a:p>
+        </p:txBody>
+      </p:sp>
     </p:spTree>
     <p:extLst>
       <p:ext uri="{BB962C8B-B14F-4D97-AF65-F5344CB8AC3E}">
@@ -8630,6 +9527,64 @@
           </a:p>
         </p:txBody>
       </p:sp>
+      <p:sp>
+        <p:nvSpPr>
+          <p:cNvPr id="5" name="Date Placeholder 4">
+            <a:extLst>
+              <a:ext uri="{FF2B5EF4-FFF2-40B4-BE49-F238E27FC236}">
+                <a16:creationId xmlns:a16="http://schemas.microsoft.com/office/drawing/2014/main" id="{8162B632-01B8-47CF-94A1-BC4B19191257}"/>
+              </a:ext>
+            </a:extLst>
+          </p:cNvPr>
+          <p:cNvSpPr>
+            <a:spLocks noGrp="1"/>
+          </p:cNvSpPr>
+          <p:nvPr>
+            <p:ph type="dt" sz="half" idx="10"/>
+          </p:nvPr>
+        </p:nvSpPr>
+        <p:spPr/>
+        <p:txBody>
+          <a:bodyPr/>
+          <a:lstStyle/>
+          <a:p>
+            <a:fld id="{38351A54-3C04-4A7D-A7C6-1B9B9491F3FA}" type="datetime1">
+              <a:rPr lang="de-DE" smtClean="0"/>
+              <a:t>06.04.2020</a:t>
+            </a:fld>
+            <a:endParaRPr lang="de-DE"/>
+          </a:p>
+        </p:txBody>
+      </p:sp>
+      <p:sp>
+        <p:nvSpPr>
+          <p:cNvPr id="6" name="Slide Number Placeholder 5">
+            <a:extLst>
+              <a:ext uri="{FF2B5EF4-FFF2-40B4-BE49-F238E27FC236}">
+                <a16:creationId xmlns:a16="http://schemas.microsoft.com/office/drawing/2014/main" id="{71F43A0A-819B-4FEB-91EF-5C5719B8300C}"/>
+              </a:ext>
+            </a:extLst>
+          </p:cNvPr>
+          <p:cNvSpPr>
+            <a:spLocks noGrp="1"/>
+          </p:cNvSpPr>
+          <p:nvPr>
+            <p:ph type="sldNum" sz="quarter" idx="12"/>
+          </p:nvPr>
+        </p:nvSpPr>
+        <p:spPr/>
+        <p:txBody>
+          <a:bodyPr/>
+          <a:lstStyle/>
+          <a:p>
+            <a:fld id="{266A34EE-793E-EA45-A2C1-765A5FA2B1F8}" type="slidenum">
+              <a:rPr lang="de-DE" smtClean="0"/>
+              <a:t>18</a:t>
+            </a:fld>
+            <a:endParaRPr lang="de-DE"/>
+          </a:p>
+        </p:txBody>
+      </p:sp>
     </p:spTree>
     <p:extLst>
       <p:ext uri="{BB962C8B-B14F-4D97-AF65-F5344CB8AC3E}">
@@ -8889,6 +9844,64 @@
           </a:p>
         </p:txBody>
       </p:sp>
+      <p:sp>
+        <p:nvSpPr>
+          <p:cNvPr id="5" name="Date Placeholder 4">
+            <a:extLst>
+              <a:ext uri="{FF2B5EF4-FFF2-40B4-BE49-F238E27FC236}">
+                <a16:creationId xmlns:a16="http://schemas.microsoft.com/office/drawing/2014/main" id="{7CC18F55-C321-408D-B229-B1025ABDB4E1}"/>
+              </a:ext>
+            </a:extLst>
+          </p:cNvPr>
+          <p:cNvSpPr>
+            <a:spLocks noGrp="1"/>
+          </p:cNvSpPr>
+          <p:nvPr>
+            <p:ph type="dt" sz="half" idx="10"/>
+          </p:nvPr>
+        </p:nvSpPr>
+        <p:spPr/>
+        <p:txBody>
+          <a:bodyPr/>
+          <a:lstStyle/>
+          <a:p>
+            <a:fld id="{813B736A-4E39-4977-A524-D0A6922AA63C}" type="datetime1">
+              <a:rPr lang="de-DE" smtClean="0"/>
+              <a:t>06.04.2020</a:t>
+            </a:fld>
+            <a:endParaRPr lang="de-DE"/>
+          </a:p>
+        </p:txBody>
+      </p:sp>
+      <p:sp>
+        <p:nvSpPr>
+          <p:cNvPr id="6" name="Slide Number Placeholder 5">
+            <a:extLst>
+              <a:ext uri="{FF2B5EF4-FFF2-40B4-BE49-F238E27FC236}">
+                <a16:creationId xmlns:a16="http://schemas.microsoft.com/office/drawing/2014/main" id="{C3CC3386-4B70-43F9-9D9D-A15E802990DA}"/>
+              </a:ext>
+            </a:extLst>
+          </p:cNvPr>
+          <p:cNvSpPr>
+            <a:spLocks noGrp="1"/>
+          </p:cNvSpPr>
+          <p:nvPr>
+            <p:ph type="sldNum" sz="quarter" idx="12"/>
+          </p:nvPr>
+        </p:nvSpPr>
+        <p:spPr/>
+        <p:txBody>
+          <a:bodyPr/>
+          <a:lstStyle/>
+          <a:p>
+            <a:fld id="{266A34EE-793E-EA45-A2C1-765A5FA2B1F8}" type="slidenum">
+              <a:rPr lang="de-DE" smtClean="0"/>
+              <a:t>19</a:t>
+            </a:fld>
+            <a:endParaRPr lang="de-DE"/>
+          </a:p>
+        </p:txBody>
+      </p:sp>
     </p:spTree>
     <p:extLst>
       <p:ext uri="{BB962C8B-B14F-4D97-AF65-F5344CB8AC3E}">
@@ -9823,6 +10836,64 @@
           </a:p>
         </p:txBody>
       </p:sp>
+      <p:sp>
+        <p:nvSpPr>
+          <p:cNvPr id="2" name="Date Placeholder 1">
+            <a:extLst>
+              <a:ext uri="{FF2B5EF4-FFF2-40B4-BE49-F238E27FC236}">
+                <a16:creationId xmlns:a16="http://schemas.microsoft.com/office/drawing/2014/main" id="{7875D995-15DA-40D6-9D31-75AE7DCD72C1}"/>
+              </a:ext>
+            </a:extLst>
+          </p:cNvPr>
+          <p:cNvSpPr>
+            <a:spLocks noGrp="1"/>
+          </p:cNvSpPr>
+          <p:nvPr>
+            <p:ph type="dt" sz="half" idx="10"/>
+          </p:nvPr>
+        </p:nvSpPr>
+        <p:spPr/>
+        <p:txBody>
+          <a:bodyPr/>
+          <a:lstStyle/>
+          <a:p>
+            <a:fld id="{C90D6DFB-C1E8-440F-9CCD-E471E1166D94}" type="datetime1">
+              <a:rPr lang="de-DE" smtClean="0"/>
+              <a:t>06.04.2020</a:t>
+            </a:fld>
+            <a:endParaRPr lang="de-DE"/>
+          </a:p>
+        </p:txBody>
+      </p:sp>
+      <p:sp>
+        <p:nvSpPr>
+          <p:cNvPr id="3" name="Slide Number Placeholder 2">
+            <a:extLst>
+              <a:ext uri="{FF2B5EF4-FFF2-40B4-BE49-F238E27FC236}">
+                <a16:creationId xmlns:a16="http://schemas.microsoft.com/office/drawing/2014/main" id="{D0D3EFFA-FB3E-422F-9591-2B32DE4F5AF0}"/>
+              </a:ext>
+            </a:extLst>
+          </p:cNvPr>
+          <p:cNvSpPr>
+            <a:spLocks noGrp="1"/>
+          </p:cNvSpPr>
+          <p:nvPr>
+            <p:ph type="sldNum" sz="quarter" idx="12"/>
+          </p:nvPr>
+        </p:nvSpPr>
+        <p:spPr/>
+        <p:txBody>
+          <a:bodyPr/>
+          <a:lstStyle/>
+          <a:p>
+            <a:fld id="{266A34EE-793E-EA45-A2C1-765A5FA2B1F8}" type="slidenum">
+              <a:rPr lang="de-DE" smtClean="0"/>
+              <a:t>2</a:t>
+            </a:fld>
+            <a:endParaRPr lang="de-DE"/>
+          </a:p>
+        </p:txBody>
+      </p:sp>
     </p:spTree>
     <p:extLst>
       <p:ext uri="{BB962C8B-B14F-4D97-AF65-F5344CB8AC3E}">
@@ -9995,6 +11066,64 @@
           </a:p>
         </p:txBody>
       </p:sp>
+      <p:sp>
+        <p:nvSpPr>
+          <p:cNvPr id="4" name="Date Placeholder 3">
+            <a:extLst>
+              <a:ext uri="{FF2B5EF4-FFF2-40B4-BE49-F238E27FC236}">
+                <a16:creationId xmlns:a16="http://schemas.microsoft.com/office/drawing/2014/main" id="{FFDEC127-8DAE-42F2-BA50-AF3998F26B4C}"/>
+              </a:ext>
+            </a:extLst>
+          </p:cNvPr>
+          <p:cNvSpPr>
+            <a:spLocks noGrp="1"/>
+          </p:cNvSpPr>
+          <p:nvPr>
+            <p:ph type="dt" sz="half" idx="10"/>
+          </p:nvPr>
+        </p:nvSpPr>
+        <p:spPr/>
+        <p:txBody>
+          <a:bodyPr/>
+          <a:lstStyle/>
+          <a:p>
+            <a:fld id="{B15FDDEF-D3E5-4C66-8BF3-3F6A443F0E59}" type="datetime1">
+              <a:rPr lang="de-DE" smtClean="0"/>
+              <a:t>06.04.2020</a:t>
+            </a:fld>
+            <a:endParaRPr lang="de-DE"/>
+          </a:p>
+        </p:txBody>
+      </p:sp>
+      <p:sp>
+        <p:nvSpPr>
+          <p:cNvPr id="5" name="Slide Number Placeholder 4">
+            <a:extLst>
+              <a:ext uri="{FF2B5EF4-FFF2-40B4-BE49-F238E27FC236}">
+                <a16:creationId xmlns:a16="http://schemas.microsoft.com/office/drawing/2014/main" id="{67141AAE-75F9-4D6A-9658-E05B6B8F6BFA}"/>
+              </a:ext>
+            </a:extLst>
+          </p:cNvPr>
+          <p:cNvSpPr>
+            <a:spLocks noGrp="1"/>
+          </p:cNvSpPr>
+          <p:nvPr>
+            <p:ph type="sldNum" sz="quarter" idx="12"/>
+          </p:nvPr>
+        </p:nvSpPr>
+        <p:spPr/>
+        <p:txBody>
+          <a:bodyPr/>
+          <a:lstStyle/>
+          <a:p>
+            <a:fld id="{266A34EE-793E-EA45-A2C1-765A5FA2B1F8}" type="slidenum">
+              <a:rPr lang="de-DE" smtClean="0"/>
+              <a:t>20</a:t>
+            </a:fld>
+            <a:endParaRPr lang="de-DE"/>
+          </a:p>
+        </p:txBody>
+      </p:sp>
     </p:spTree>
     <p:extLst>
       <p:ext uri="{BB962C8B-B14F-4D97-AF65-F5344CB8AC3E}">
@@ -10331,6 +11460,64 @@
           </a:p>
         </p:txBody>
       </p:sp>
+      <p:sp>
+        <p:nvSpPr>
+          <p:cNvPr id="5" name="Date Placeholder 4">
+            <a:extLst>
+              <a:ext uri="{FF2B5EF4-FFF2-40B4-BE49-F238E27FC236}">
+                <a16:creationId xmlns:a16="http://schemas.microsoft.com/office/drawing/2014/main" id="{CA3A9B42-D82D-489C-AF83-161472A38F8B}"/>
+              </a:ext>
+            </a:extLst>
+          </p:cNvPr>
+          <p:cNvSpPr>
+            <a:spLocks noGrp="1"/>
+          </p:cNvSpPr>
+          <p:nvPr>
+            <p:ph type="dt" sz="half" idx="10"/>
+          </p:nvPr>
+        </p:nvSpPr>
+        <p:spPr/>
+        <p:txBody>
+          <a:bodyPr/>
+          <a:lstStyle/>
+          <a:p>
+            <a:fld id="{9E7666CD-D72D-4540-A656-A2A53E030B1A}" type="datetime1">
+              <a:rPr lang="de-DE" smtClean="0"/>
+              <a:t>06.04.2020</a:t>
+            </a:fld>
+            <a:endParaRPr lang="de-DE"/>
+          </a:p>
+        </p:txBody>
+      </p:sp>
+      <p:sp>
+        <p:nvSpPr>
+          <p:cNvPr id="6" name="Slide Number Placeholder 5">
+            <a:extLst>
+              <a:ext uri="{FF2B5EF4-FFF2-40B4-BE49-F238E27FC236}">
+                <a16:creationId xmlns:a16="http://schemas.microsoft.com/office/drawing/2014/main" id="{76018981-BA7C-47A6-91CF-07341BAE0A58}"/>
+              </a:ext>
+            </a:extLst>
+          </p:cNvPr>
+          <p:cNvSpPr>
+            <a:spLocks noGrp="1"/>
+          </p:cNvSpPr>
+          <p:nvPr>
+            <p:ph type="sldNum" sz="quarter" idx="12"/>
+          </p:nvPr>
+        </p:nvSpPr>
+        <p:spPr/>
+        <p:txBody>
+          <a:bodyPr/>
+          <a:lstStyle/>
+          <a:p>
+            <a:fld id="{266A34EE-793E-EA45-A2C1-765A5FA2B1F8}" type="slidenum">
+              <a:rPr lang="de-DE" smtClean="0"/>
+              <a:t>21</a:t>
+            </a:fld>
+            <a:endParaRPr lang="de-DE"/>
+          </a:p>
+        </p:txBody>
+      </p:sp>
     </p:spTree>
     <p:extLst>
       <p:ext uri="{BB962C8B-B14F-4D97-AF65-F5344CB8AC3E}">
@@ -10664,6 +11851,64 @@
           </a:p>
         </p:txBody>
       </p:sp>
+      <p:sp>
+        <p:nvSpPr>
+          <p:cNvPr id="6" name="Date Placeholder 5">
+            <a:extLst>
+              <a:ext uri="{FF2B5EF4-FFF2-40B4-BE49-F238E27FC236}">
+                <a16:creationId xmlns:a16="http://schemas.microsoft.com/office/drawing/2014/main" id="{A4FA227C-D220-4589-9634-AB9815EC6BF7}"/>
+              </a:ext>
+            </a:extLst>
+          </p:cNvPr>
+          <p:cNvSpPr>
+            <a:spLocks noGrp="1"/>
+          </p:cNvSpPr>
+          <p:nvPr>
+            <p:ph type="dt" sz="half" idx="10"/>
+          </p:nvPr>
+        </p:nvSpPr>
+        <p:spPr/>
+        <p:txBody>
+          <a:bodyPr/>
+          <a:lstStyle/>
+          <a:p>
+            <a:fld id="{D2588ADC-F69F-4499-AFB9-DEB63C1D6CCD}" type="datetime1">
+              <a:rPr lang="de-DE" smtClean="0"/>
+              <a:t>06.04.2020</a:t>
+            </a:fld>
+            <a:endParaRPr lang="de-DE"/>
+          </a:p>
+        </p:txBody>
+      </p:sp>
+      <p:sp>
+        <p:nvSpPr>
+          <p:cNvPr id="7" name="Slide Number Placeholder 6">
+            <a:extLst>
+              <a:ext uri="{FF2B5EF4-FFF2-40B4-BE49-F238E27FC236}">
+                <a16:creationId xmlns:a16="http://schemas.microsoft.com/office/drawing/2014/main" id="{9DF030B0-B68C-4CA5-A4F9-A5DA02BF30A5}"/>
+              </a:ext>
+            </a:extLst>
+          </p:cNvPr>
+          <p:cNvSpPr>
+            <a:spLocks noGrp="1"/>
+          </p:cNvSpPr>
+          <p:nvPr>
+            <p:ph type="sldNum" sz="quarter" idx="12"/>
+          </p:nvPr>
+        </p:nvSpPr>
+        <p:spPr/>
+        <p:txBody>
+          <a:bodyPr/>
+          <a:lstStyle/>
+          <a:p>
+            <a:fld id="{266A34EE-793E-EA45-A2C1-765A5FA2B1F8}" type="slidenum">
+              <a:rPr lang="de-DE" smtClean="0"/>
+              <a:t>22</a:t>
+            </a:fld>
+            <a:endParaRPr lang="de-DE"/>
+          </a:p>
+        </p:txBody>
+      </p:sp>
     </p:spTree>
     <p:extLst>
       <p:ext uri="{BB962C8B-B14F-4D97-AF65-F5344CB8AC3E}">
@@ -11799,6 +13044,64 @@
           </a:p>
         </p:txBody>
       </p:sp>
+      <p:sp>
+        <p:nvSpPr>
+          <p:cNvPr id="2" name="Date Placeholder 1">
+            <a:extLst>
+              <a:ext uri="{FF2B5EF4-FFF2-40B4-BE49-F238E27FC236}">
+                <a16:creationId xmlns:a16="http://schemas.microsoft.com/office/drawing/2014/main" id="{52818DEF-EFC7-4E71-80A1-623775813658}"/>
+              </a:ext>
+            </a:extLst>
+          </p:cNvPr>
+          <p:cNvSpPr>
+            <a:spLocks noGrp="1"/>
+          </p:cNvSpPr>
+          <p:nvPr>
+            <p:ph type="dt" sz="half" idx="10"/>
+          </p:nvPr>
+        </p:nvSpPr>
+        <p:spPr/>
+        <p:txBody>
+          <a:bodyPr/>
+          <a:lstStyle/>
+          <a:p>
+            <a:fld id="{58E90E32-198D-4FE4-BC05-6083D9D91C0E}" type="datetime1">
+              <a:rPr lang="de-DE" smtClean="0"/>
+              <a:t>06.04.2020</a:t>
+            </a:fld>
+            <a:endParaRPr lang="de-DE"/>
+          </a:p>
+        </p:txBody>
+      </p:sp>
+      <p:sp>
+        <p:nvSpPr>
+          <p:cNvPr id="5" name="Slide Number Placeholder 4">
+            <a:extLst>
+              <a:ext uri="{FF2B5EF4-FFF2-40B4-BE49-F238E27FC236}">
+                <a16:creationId xmlns:a16="http://schemas.microsoft.com/office/drawing/2014/main" id="{A67A12DA-C22B-41C4-996D-6CA47B00015F}"/>
+              </a:ext>
+            </a:extLst>
+          </p:cNvPr>
+          <p:cNvSpPr>
+            <a:spLocks noGrp="1"/>
+          </p:cNvSpPr>
+          <p:nvPr>
+            <p:ph type="sldNum" sz="quarter" idx="12"/>
+          </p:nvPr>
+        </p:nvSpPr>
+        <p:spPr/>
+        <p:txBody>
+          <a:bodyPr/>
+          <a:lstStyle/>
+          <a:p>
+            <a:fld id="{266A34EE-793E-EA45-A2C1-765A5FA2B1F8}" type="slidenum">
+              <a:rPr lang="de-DE" smtClean="0"/>
+              <a:t>3</a:t>
+            </a:fld>
+            <a:endParaRPr lang="de-DE"/>
+          </a:p>
+        </p:txBody>
+      </p:sp>
     </p:spTree>
     <p:extLst>
       <p:ext uri="{BB962C8B-B14F-4D97-AF65-F5344CB8AC3E}">
@@ -13019,6 +14322,64 @@
           </a:fontRef>
         </p:style>
       </p:cxnSp>
+      <p:sp>
+        <p:nvSpPr>
+          <p:cNvPr id="2" name="Date Placeholder 1">
+            <a:extLst>
+              <a:ext uri="{FF2B5EF4-FFF2-40B4-BE49-F238E27FC236}">
+                <a16:creationId xmlns:a16="http://schemas.microsoft.com/office/drawing/2014/main" id="{9620C3F7-1D76-4F02-A5B8-0CE1A45A9535}"/>
+              </a:ext>
+            </a:extLst>
+          </p:cNvPr>
+          <p:cNvSpPr>
+            <a:spLocks noGrp="1"/>
+          </p:cNvSpPr>
+          <p:nvPr>
+            <p:ph type="dt" sz="half" idx="10"/>
+          </p:nvPr>
+        </p:nvSpPr>
+        <p:spPr/>
+        <p:txBody>
+          <a:bodyPr/>
+          <a:lstStyle/>
+          <a:p>
+            <a:fld id="{4D30A999-A2B3-4F9D-952A-9DE7CCC90E47}" type="datetime1">
+              <a:rPr lang="de-DE" smtClean="0"/>
+              <a:t>06.04.2020</a:t>
+            </a:fld>
+            <a:endParaRPr lang="de-DE"/>
+          </a:p>
+        </p:txBody>
+      </p:sp>
+      <p:sp>
+        <p:nvSpPr>
+          <p:cNvPr id="5" name="Slide Number Placeholder 4">
+            <a:extLst>
+              <a:ext uri="{FF2B5EF4-FFF2-40B4-BE49-F238E27FC236}">
+                <a16:creationId xmlns:a16="http://schemas.microsoft.com/office/drawing/2014/main" id="{4B05827E-3735-4834-BEA9-88101E4ED67A}"/>
+              </a:ext>
+            </a:extLst>
+          </p:cNvPr>
+          <p:cNvSpPr>
+            <a:spLocks noGrp="1"/>
+          </p:cNvSpPr>
+          <p:nvPr>
+            <p:ph type="sldNum" sz="quarter" idx="12"/>
+          </p:nvPr>
+        </p:nvSpPr>
+        <p:spPr/>
+        <p:txBody>
+          <a:bodyPr/>
+          <a:lstStyle/>
+          <a:p>
+            <a:fld id="{266A34EE-793E-EA45-A2C1-765A5FA2B1F8}" type="slidenum">
+              <a:rPr lang="de-DE" smtClean="0"/>
+              <a:t>4</a:t>
+            </a:fld>
+            <a:endParaRPr lang="de-DE"/>
+          </a:p>
+        </p:txBody>
+      </p:sp>
     </p:spTree>
     <p:extLst>
       <p:ext uri="{BB962C8B-B14F-4D97-AF65-F5344CB8AC3E}">
@@ -14158,6 +15519,64 @@
           </a:p>
         </p:txBody>
       </p:sp>
+      <p:sp>
+        <p:nvSpPr>
+          <p:cNvPr id="2" name="Date Placeholder 1">
+            <a:extLst>
+              <a:ext uri="{FF2B5EF4-FFF2-40B4-BE49-F238E27FC236}">
+                <a16:creationId xmlns:a16="http://schemas.microsoft.com/office/drawing/2014/main" id="{8C447F3D-4B78-4F34-BDD8-BBA4FD1BF0E9}"/>
+              </a:ext>
+            </a:extLst>
+          </p:cNvPr>
+          <p:cNvSpPr>
+            <a:spLocks noGrp="1"/>
+          </p:cNvSpPr>
+          <p:nvPr>
+            <p:ph type="dt" sz="half" idx="10"/>
+          </p:nvPr>
+        </p:nvSpPr>
+        <p:spPr/>
+        <p:txBody>
+          <a:bodyPr/>
+          <a:lstStyle/>
+          <a:p>
+            <a:fld id="{F696BCA9-97EC-41BA-ACAB-A59AF750FD14}" type="datetime1">
+              <a:rPr lang="de-DE" smtClean="0"/>
+              <a:t>06.04.2020</a:t>
+            </a:fld>
+            <a:endParaRPr lang="de-DE"/>
+          </a:p>
+        </p:txBody>
+      </p:sp>
+      <p:sp>
+        <p:nvSpPr>
+          <p:cNvPr id="3" name="Slide Number Placeholder 2">
+            <a:extLst>
+              <a:ext uri="{FF2B5EF4-FFF2-40B4-BE49-F238E27FC236}">
+                <a16:creationId xmlns:a16="http://schemas.microsoft.com/office/drawing/2014/main" id="{75798039-DA7B-4F51-9781-6908F29767D0}"/>
+              </a:ext>
+            </a:extLst>
+          </p:cNvPr>
+          <p:cNvSpPr>
+            <a:spLocks noGrp="1"/>
+          </p:cNvSpPr>
+          <p:nvPr>
+            <p:ph type="sldNum" sz="quarter" idx="12"/>
+          </p:nvPr>
+        </p:nvSpPr>
+        <p:spPr/>
+        <p:txBody>
+          <a:bodyPr/>
+          <a:lstStyle/>
+          <a:p>
+            <a:fld id="{266A34EE-793E-EA45-A2C1-765A5FA2B1F8}" type="slidenum">
+              <a:rPr lang="de-DE" smtClean="0"/>
+              <a:t>5</a:t>
+            </a:fld>
+            <a:endParaRPr lang="de-DE"/>
+          </a:p>
+        </p:txBody>
+      </p:sp>
     </p:spTree>
     <p:extLst>
       <p:ext uri="{BB962C8B-B14F-4D97-AF65-F5344CB8AC3E}">
@@ -15758,6 +17177,64 @@
           </a:p>
         </p:txBody>
       </p:sp>
+      <p:sp>
+        <p:nvSpPr>
+          <p:cNvPr id="3" name="Date Placeholder 2">
+            <a:extLst>
+              <a:ext uri="{FF2B5EF4-FFF2-40B4-BE49-F238E27FC236}">
+                <a16:creationId xmlns:a16="http://schemas.microsoft.com/office/drawing/2014/main" id="{47934788-A9EF-42B8-BE88-5F9430A7F345}"/>
+              </a:ext>
+            </a:extLst>
+          </p:cNvPr>
+          <p:cNvSpPr>
+            <a:spLocks noGrp="1"/>
+          </p:cNvSpPr>
+          <p:nvPr>
+            <p:ph type="dt" sz="half" idx="10"/>
+          </p:nvPr>
+        </p:nvSpPr>
+        <p:spPr/>
+        <p:txBody>
+          <a:bodyPr/>
+          <a:lstStyle/>
+          <a:p>
+            <a:fld id="{A848C7AB-F83B-4FC6-9231-FA7F2809359C}" type="datetime1">
+              <a:rPr lang="de-DE" smtClean="0"/>
+              <a:t>06.04.2020</a:t>
+            </a:fld>
+            <a:endParaRPr lang="de-DE"/>
+          </a:p>
+        </p:txBody>
+      </p:sp>
+      <p:sp>
+        <p:nvSpPr>
+          <p:cNvPr id="5" name="Slide Number Placeholder 4">
+            <a:extLst>
+              <a:ext uri="{FF2B5EF4-FFF2-40B4-BE49-F238E27FC236}">
+                <a16:creationId xmlns:a16="http://schemas.microsoft.com/office/drawing/2014/main" id="{E03377BC-BEF8-4D03-A72F-AC597C4896F7}"/>
+              </a:ext>
+            </a:extLst>
+          </p:cNvPr>
+          <p:cNvSpPr>
+            <a:spLocks noGrp="1"/>
+          </p:cNvSpPr>
+          <p:nvPr>
+            <p:ph type="sldNum" sz="quarter" idx="12"/>
+          </p:nvPr>
+        </p:nvSpPr>
+        <p:spPr/>
+        <p:txBody>
+          <a:bodyPr/>
+          <a:lstStyle/>
+          <a:p>
+            <a:fld id="{266A34EE-793E-EA45-A2C1-765A5FA2B1F8}" type="slidenum">
+              <a:rPr lang="de-DE" smtClean="0"/>
+              <a:t>6</a:t>
+            </a:fld>
+            <a:endParaRPr lang="de-DE"/>
+          </a:p>
+        </p:txBody>
+      </p:sp>
     </p:spTree>
     <p:extLst>
       <p:ext uri="{BB962C8B-B14F-4D97-AF65-F5344CB8AC3E}">
@@ -17347,6 +18824,64 @@
           </a:p>
         </p:txBody>
       </p:sp>
+      <p:sp>
+        <p:nvSpPr>
+          <p:cNvPr id="5" name="Date Placeholder 4">
+            <a:extLst>
+              <a:ext uri="{FF2B5EF4-FFF2-40B4-BE49-F238E27FC236}">
+                <a16:creationId xmlns:a16="http://schemas.microsoft.com/office/drawing/2014/main" id="{23DEBEF9-9323-4EAB-9EC2-8978BE5A8DB4}"/>
+              </a:ext>
+            </a:extLst>
+          </p:cNvPr>
+          <p:cNvSpPr>
+            <a:spLocks noGrp="1"/>
+          </p:cNvSpPr>
+          <p:nvPr>
+            <p:ph type="dt" sz="half" idx="10"/>
+          </p:nvPr>
+        </p:nvSpPr>
+        <p:spPr/>
+        <p:txBody>
+          <a:bodyPr/>
+          <a:lstStyle/>
+          <a:p>
+            <a:fld id="{78389F4F-6C40-4F96-87B7-BED4E97E402E}" type="datetime1">
+              <a:rPr lang="de-DE" smtClean="0"/>
+              <a:t>06.04.2020</a:t>
+            </a:fld>
+            <a:endParaRPr lang="de-DE"/>
+          </a:p>
+        </p:txBody>
+      </p:sp>
+      <p:sp>
+        <p:nvSpPr>
+          <p:cNvPr id="6" name="Slide Number Placeholder 5">
+            <a:extLst>
+              <a:ext uri="{FF2B5EF4-FFF2-40B4-BE49-F238E27FC236}">
+                <a16:creationId xmlns:a16="http://schemas.microsoft.com/office/drawing/2014/main" id="{2D3EAC30-D0AE-46E4-B663-662175EBEC07}"/>
+              </a:ext>
+            </a:extLst>
+          </p:cNvPr>
+          <p:cNvSpPr>
+            <a:spLocks noGrp="1"/>
+          </p:cNvSpPr>
+          <p:nvPr>
+            <p:ph type="sldNum" sz="quarter" idx="12"/>
+          </p:nvPr>
+        </p:nvSpPr>
+        <p:spPr/>
+        <p:txBody>
+          <a:bodyPr/>
+          <a:lstStyle/>
+          <a:p>
+            <a:fld id="{266A34EE-793E-EA45-A2C1-765A5FA2B1F8}" type="slidenum">
+              <a:rPr lang="de-DE" smtClean="0"/>
+              <a:t>7</a:t>
+            </a:fld>
+            <a:endParaRPr lang="de-DE"/>
+          </a:p>
+        </p:txBody>
+      </p:sp>
     </p:spTree>
     <p:extLst>
       <p:ext uri="{BB962C8B-B14F-4D97-AF65-F5344CB8AC3E}">
@@ -18798,6 +20333,64 @@
           </a:p>
         </p:txBody>
       </p:sp>
+      <p:sp>
+        <p:nvSpPr>
+          <p:cNvPr id="3" name="Date Placeholder 2">
+            <a:extLst>
+              <a:ext uri="{FF2B5EF4-FFF2-40B4-BE49-F238E27FC236}">
+                <a16:creationId xmlns:a16="http://schemas.microsoft.com/office/drawing/2014/main" id="{5490DCFB-3B50-438B-9964-6CF9B83B7441}"/>
+              </a:ext>
+            </a:extLst>
+          </p:cNvPr>
+          <p:cNvSpPr>
+            <a:spLocks noGrp="1"/>
+          </p:cNvSpPr>
+          <p:nvPr>
+            <p:ph type="dt" sz="half" idx="10"/>
+          </p:nvPr>
+        </p:nvSpPr>
+        <p:spPr/>
+        <p:txBody>
+          <a:bodyPr/>
+          <a:lstStyle/>
+          <a:p>
+            <a:fld id="{BC6AA058-3889-4DB2-9948-474ED9D2A12D}" type="datetime1">
+              <a:rPr lang="de-DE" smtClean="0"/>
+              <a:t>06.04.2020</a:t>
+            </a:fld>
+            <a:endParaRPr lang="de-DE"/>
+          </a:p>
+        </p:txBody>
+      </p:sp>
+      <p:sp>
+        <p:nvSpPr>
+          <p:cNvPr id="5" name="Slide Number Placeholder 4">
+            <a:extLst>
+              <a:ext uri="{FF2B5EF4-FFF2-40B4-BE49-F238E27FC236}">
+                <a16:creationId xmlns:a16="http://schemas.microsoft.com/office/drawing/2014/main" id="{0161E838-557D-42A4-AC2C-DB91B29468DE}"/>
+              </a:ext>
+            </a:extLst>
+          </p:cNvPr>
+          <p:cNvSpPr>
+            <a:spLocks noGrp="1"/>
+          </p:cNvSpPr>
+          <p:nvPr>
+            <p:ph type="sldNum" sz="quarter" idx="12"/>
+          </p:nvPr>
+        </p:nvSpPr>
+        <p:spPr/>
+        <p:txBody>
+          <a:bodyPr/>
+          <a:lstStyle/>
+          <a:p>
+            <a:fld id="{266A34EE-793E-EA45-A2C1-765A5FA2B1F8}" type="slidenum">
+              <a:rPr lang="de-DE" smtClean="0"/>
+              <a:t>8</a:t>
+            </a:fld>
+            <a:endParaRPr lang="de-DE"/>
+          </a:p>
+        </p:txBody>
+      </p:sp>
     </p:spTree>
     <p:extLst>
       <p:ext uri="{BB962C8B-B14F-4D97-AF65-F5344CB8AC3E}">
@@ -20237,6 +21830,64 @@
               </a:rPr>
               <a:t> and server repo, i.e. namespace definition.</a:t>
             </a:r>
+          </a:p>
+        </p:txBody>
+      </p:sp>
+      <p:sp>
+        <p:nvSpPr>
+          <p:cNvPr id="3" name="Date Placeholder 2">
+            <a:extLst>
+              <a:ext uri="{FF2B5EF4-FFF2-40B4-BE49-F238E27FC236}">
+                <a16:creationId xmlns:a16="http://schemas.microsoft.com/office/drawing/2014/main" id="{09E6D522-F69F-4742-A076-5A73676EB6F7}"/>
+              </a:ext>
+            </a:extLst>
+          </p:cNvPr>
+          <p:cNvSpPr>
+            <a:spLocks noGrp="1"/>
+          </p:cNvSpPr>
+          <p:nvPr>
+            <p:ph type="dt" sz="half" idx="10"/>
+          </p:nvPr>
+        </p:nvSpPr>
+        <p:spPr/>
+        <p:txBody>
+          <a:bodyPr/>
+          <a:lstStyle/>
+          <a:p>
+            <a:fld id="{DB3A2185-C9E4-47F0-B338-5BAEE950952F}" type="datetime1">
+              <a:rPr lang="de-DE" smtClean="0"/>
+              <a:t>06.04.2020</a:t>
+            </a:fld>
+            <a:endParaRPr lang="de-DE"/>
+          </a:p>
+        </p:txBody>
+      </p:sp>
+      <p:sp>
+        <p:nvSpPr>
+          <p:cNvPr id="12" name="Slide Number Placeholder 11">
+            <a:extLst>
+              <a:ext uri="{FF2B5EF4-FFF2-40B4-BE49-F238E27FC236}">
+                <a16:creationId xmlns:a16="http://schemas.microsoft.com/office/drawing/2014/main" id="{7292FE54-B263-4D8E-B275-8560A264C0C7}"/>
+              </a:ext>
+            </a:extLst>
+          </p:cNvPr>
+          <p:cNvSpPr>
+            <a:spLocks noGrp="1"/>
+          </p:cNvSpPr>
+          <p:nvPr>
+            <p:ph type="sldNum" sz="quarter" idx="12"/>
+          </p:nvPr>
+        </p:nvSpPr>
+        <p:spPr/>
+        <p:txBody>
+          <a:bodyPr/>
+          <a:lstStyle/>
+          <a:p>
+            <a:fld id="{266A34EE-793E-EA45-A2C1-765A5FA2B1F8}" type="slidenum">
+              <a:rPr lang="de-DE" smtClean="0"/>
+              <a:t>9</a:t>
+            </a:fld>
+            <a:endParaRPr lang="de-DE"/>
           </a:p>
         </p:txBody>
       </p:sp>
@@ -20546,4 +22197,299 @@
     </a:ext>
   </a:extLst>
 </a:theme>
+</file>
+
+<file path=ppt/theme/theme2.xml><?xml version="1.0" encoding="utf-8"?>
+<a:theme xmlns:a="http://schemas.openxmlformats.org/drawingml/2006/main" name="Office Theme">
+  <a:themeElements>
+    <a:clrScheme name="Office">
+      <a:dk1>
+        <a:sysClr val="windowText" lastClr="000000"/>
+      </a:dk1>
+      <a:lt1>
+        <a:sysClr val="window" lastClr="FFFFFF"/>
+      </a:lt1>
+      <a:dk2>
+        <a:srgbClr val="44546A"/>
+      </a:dk2>
+      <a:lt2>
+        <a:srgbClr val="E7E6E6"/>
+      </a:lt2>
+      <a:accent1>
+        <a:srgbClr val="4472C4"/>
+      </a:accent1>
+      <a:accent2>
+        <a:srgbClr val="ED7D31"/>
+      </a:accent2>
+      <a:accent3>
+        <a:srgbClr val="A5A5A5"/>
+      </a:accent3>
+      <a:accent4>
+        <a:srgbClr val="FFC000"/>
+      </a:accent4>
+      <a:accent5>
+        <a:srgbClr val="5B9BD5"/>
+      </a:accent5>
+      <a:accent6>
+        <a:srgbClr val="70AD47"/>
+      </a:accent6>
+      <a:hlink>
+        <a:srgbClr val="0563C1"/>
+      </a:hlink>
+      <a:folHlink>
+        <a:srgbClr val="954F72"/>
+      </a:folHlink>
+    </a:clrScheme>
+    <a:fontScheme name="Office">
+      <a:majorFont>
+        <a:latin typeface="Calibri Light" panose="020F0302020204030204"/>
+        <a:ea typeface=""/>
+        <a:cs typeface=""/>
+        <a:font script="Jpan" typeface="游ゴシック Light"/>
+        <a:font script="Hang" typeface="맑은 고딕"/>
+        <a:font script="Hans" typeface="等线 Light"/>
+        <a:font script="Hant" typeface="新細明體"/>
+        <a:font script="Arab" typeface="Times New Roman"/>
+        <a:font script="Hebr" typeface="Times New Roman"/>
+        <a:font script="Thai" typeface="Angsana New"/>
+        <a:font script="Ethi" typeface="Nyala"/>
+        <a:font script="Beng" typeface="Vrinda"/>
+        <a:font script="Gujr" typeface="Shruti"/>
+        <a:font script="Khmr" typeface="MoolBoran"/>
+        <a:font script="Knda" typeface="Tunga"/>
+        <a:font script="Guru" typeface="Raavi"/>
+        <a:font script="Cans" typeface="Euphemia"/>
+        <a:font script="Cher" typeface="Plantagenet Cherokee"/>
+        <a:font script="Yiii" typeface="Microsoft Yi Baiti"/>
+        <a:font script="Tibt" typeface="Microsoft Himalaya"/>
+        <a:font script="Thaa" typeface="MV Boli"/>
+        <a:font script="Deva" typeface="Mangal"/>
+        <a:font script="Telu" typeface="Gautami"/>
+        <a:font script="Taml" typeface="Latha"/>
+        <a:font script="Syrc" typeface="Estrangelo Edessa"/>
+        <a:font script="Orya" typeface="Kalinga"/>
+        <a:font script="Mlym" typeface="Kartika"/>
+        <a:font script="Laoo" typeface="DokChampa"/>
+        <a:font script="Sinh" typeface="Iskoola Pota"/>
+        <a:font script="Mong" typeface="Mongolian Baiti"/>
+        <a:font script="Viet" typeface="Times New Roman"/>
+        <a:font script="Uigh" typeface="Microsoft Uighur"/>
+        <a:font script="Geor" typeface="Sylfaen"/>
+        <a:font script="Armn" typeface="Arial"/>
+        <a:font script="Bugi" typeface="Leelawadee UI"/>
+        <a:font script="Bopo" typeface="Microsoft JhengHei"/>
+        <a:font script="Java" typeface="Javanese Text"/>
+        <a:font script="Lisu" typeface="Segoe UI"/>
+        <a:font script="Mymr" typeface="Myanmar Text"/>
+        <a:font script="Nkoo" typeface="Ebrima"/>
+        <a:font script="Olck" typeface="Nirmala UI"/>
+        <a:font script="Osma" typeface="Ebrima"/>
+        <a:font script="Phag" typeface="Phagspa"/>
+        <a:font script="Syrn" typeface="Estrangelo Edessa"/>
+        <a:font script="Syrj" typeface="Estrangelo Edessa"/>
+        <a:font script="Syre" typeface="Estrangelo Edessa"/>
+        <a:font script="Sora" typeface="Nirmala UI"/>
+        <a:font script="Tale" typeface="Microsoft Tai Le"/>
+        <a:font script="Talu" typeface="Microsoft New Tai Lue"/>
+        <a:font script="Tfng" typeface="Ebrima"/>
+      </a:majorFont>
+      <a:minorFont>
+        <a:latin typeface="Calibri" panose="020F0502020204030204"/>
+        <a:ea typeface=""/>
+        <a:cs typeface=""/>
+        <a:font script="Jpan" typeface="游ゴシック"/>
+        <a:font script="Hang" typeface="맑은 고딕"/>
+        <a:font script="Hans" typeface="等线"/>
+        <a:font script="Hant" typeface="新細明體"/>
+        <a:font script="Arab" typeface="Arial"/>
+        <a:font script="Hebr" typeface="Arial"/>
+        <a:font script="Thai" typeface="Cordia New"/>
+        <a:font script="Ethi" typeface="Nyala"/>
+        <a:font script="Beng" typeface="Vrinda"/>
+        <a:font script="Gujr" typeface="Shruti"/>
+        <a:font script="Khmr" typeface="DaunPenh"/>
+        <a:font script="Knda" typeface="Tunga"/>
+        <a:font script="Guru" typeface="Raavi"/>
+        <a:font script="Cans" typeface="Euphemia"/>
+        <a:font script="Cher" typeface="Plantagenet Cherokee"/>
+        <a:font script="Yiii" typeface="Microsoft Yi Baiti"/>
+        <a:font script="Tibt" typeface="Microsoft Himalaya"/>
+        <a:font script="Thaa" typeface="MV Boli"/>
+        <a:font script="Deva" typeface="Mangal"/>
+        <a:font script="Telu" typeface="Gautami"/>
+        <a:font script="Taml" typeface="Latha"/>
+        <a:font script="Syrc" typeface="Estrangelo Edessa"/>
+        <a:font script="Orya" typeface="Kalinga"/>
+        <a:font script="Mlym" typeface="Kartika"/>
+        <a:font script="Laoo" typeface="DokChampa"/>
+        <a:font script="Sinh" typeface="Iskoola Pota"/>
+        <a:font script="Mong" typeface="Mongolian Baiti"/>
+        <a:font script="Viet" typeface="Arial"/>
+        <a:font script="Uigh" typeface="Microsoft Uighur"/>
+        <a:font script="Geor" typeface="Sylfaen"/>
+        <a:font script="Armn" typeface="Arial"/>
+        <a:font script="Bugi" typeface="Leelawadee UI"/>
+        <a:font script="Bopo" typeface="Microsoft JhengHei"/>
+        <a:font script="Java" typeface="Javanese Text"/>
+        <a:font script="Lisu" typeface="Segoe UI"/>
+        <a:font script="Mymr" typeface="Myanmar Text"/>
+        <a:font script="Nkoo" typeface="Ebrima"/>
+        <a:font script="Olck" typeface="Nirmala UI"/>
+        <a:font script="Osma" typeface="Ebrima"/>
+        <a:font script="Phag" typeface="Phagspa"/>
+        <a:font script="Syrn" typeface="Estrangelo Edessa"/>
+        <a:font script="Syrj" typeface="Estrangelo Edessa"/>
+        <a:font script="Syre" typeface="Estrangelo Edessa"/>
+        <a:font script="Sora" typeface="Nirmala UI"/>
+        <a:font script="Tale" typeface="Microsoft Tai Le"/>
+        <a:font script="Talu" typeface="Microsoft New Tai Lue"/>
+        <a:font script="Tfng" typeface="Ebrima"/>
+      </a:minorFont>
+    </a:fontScheme>
+    <a:fmtScheme name="Office">
+      <a:fillStyleLst>
+        <a:solidFill>
+          <a:schemeClr val="phClr"/>
+        </a:solidFill>
+        <a:gradFill rotWithShape="1">
+          <a:gsLst>
+            <a:gs pos="0">
+              <a:schemeClr val="phClr">
+                <a:lumMod val="110000"/>
+                <a:satMod val="105000"/>
+                <a:tint val="67000"/>
+              </a:schemeClr>
+            </a:gs>
+            <a:gs pos="50000">
+              <a:schemeClr val="phClr">
+                <a:lumMod val="105000"/>
+                <a:satMod val="103000"/>
+                <a:tint val="73000"/>
+              </a:schemeClr>
+            </a:gs>
+            <a:gs pos="100000">
+              <a:schemeClr val="phClr">
+                <a:lumMod val="105000"/>
+                <a:satMod val="109000"/>
+                <a:tint val="81000"/>
+              </a:schemeClr>
+            </a:gs>
+          </a:gsLst>
+          <a:lin ang="5400000" scaled="0"/>
+        </a:gradFill>
+        <a:gradFill rotWithShape="1">
+          <a:gsLst>
+            <a:gs pos="0">
+              <a:schemeClr val="phClr">
+                <a:satMod val="103000"/>
+                <a:lumMod val="102000"/>
+                <a:tint val="94000"/>
+              </a:schemeClr>
+            </a:gs>
+            <a:gs pos="50000">
+              <a:schemeClr val="phClr">
+                <a:satMod val="110000"/>
+                <a:lumMod val="100000"/>
+                <a:shade val="100000"/>
+              </a:schemeClr>
+            </a:gs>
+            <a:gs pos="100000">
+              <a:schemeClr val="phClr">
+                <a:lumMod val="99000"/>
+                <a:satMod val="120000"/>
+                <a:shade val="78000"/>
+              </a:schemeClr>
+            </a:gs>
+          </a:gsLst>
+          <a:lin ang="5400000" scaled="0"/>
+        </a:gradFill>
+      </a:fillStyleLst>
+      <a:lnStyleLst>
+        <a:ln w="6350" cap="flat" cmpd="sng" algn="ctr">
+          <a:solidFill>
+            <a:schemeClr val="phClr"/>
+          </a:solidFill>
+          <a:prstDash val="solid"/>
+          <a:miter lim="800000"/>
+        </a:ln>
+        <a:ln w="12700" cap="flat" cmpd="sng" algn="ctr">
+          <a:solidFill>
+            <a:schemeClr val="phClr"/>
+          </a:solidFill>
+          <a:prstDash val="solid"/>
+          <a:miter lim="800000"/>
+        </a:ln>
+        <a:ln w="19050" cap="flat" cmpd="sng" algn="ctr">
+          <a:solidFill>
+            <a:schemeClr val="phClr"/>
+          </a:solidFill>
+          <a:prstDash val="solid"/>
+          <a:miter lim="800000"/>
+        </a:ln>
+      </a:lnStyleLst>
+      <a:effectStyleLst>
+        <a:effectStyle>
+          <a:effectLst/>
+        </a:effectStyle>
+        <a:effectStyle>
+          <a:effectLst/>
+        </a:effectStyle>
+        <a:effectStyle>
+          <a:effectLst>
+            <a:outerShdw blurRad="57150" dist="19050" dir="5400000" algn="ctr" rotWithShape="0">
+              <a:srgbClr val="000000">
+                <a:alpha val="63000"/>
+              </a:srgbClr>
+            </a:outerShdw>
+          </a:effectLst>
+        </a:effectStyle>
+      </a:effectStyleLst>
+      <a:bgFillStyleLst>
+        <a:solidFill>
+          <a:schemeClr val="phClr"/>
+        </a:solidFill>
+        <a:solidFill>
+          <a:schemeClr val="phClr">
+            <a:tint val="95000"/>
+            <a:satMod val="170000"/>
+          </a:schemeClr>
+        </a:solidFill>
+        <a:gradFill rotWithShape="1">
+          <a:gsLst>
+            <a:gs pos="0">
+              <a:schemeClr val="phClr">
+                <a:tint val="93000"/>
+                <a:satMod val="150000"/>
+                <a:shade val="98000"/>
+                <a:lumMod val="102000"/>
+              </a:schemeClr>
+            </a:gs>
+            <a:gs pos="50000">
+              <a:schemeClr val="phClr">
+                <a:tint val="98000"/>
+                <a:satMod val="130000"/>
+                <a:shade val="90000"/>
+                <a:lumMod val="103000"/>
+              </a:schemeClr>
+            </a:gs>
+            <a:gs pos="100000">
+              <a:schemeClr val="phClr">
+                <a:shade val="63000"/>
+                <a:satMod val="120000"/>
+              </a:schemeClr>
+            </a:gs>
+          </a:gsLst>
+          <a:lin ang="5400000" scaled="0"/>
+        </a:gradFill>
+      </a:bgFillStyleLst>
+    </a:fmtScheme>
+  </a:themeElements>
+  <a:objectDefaults/>
+  <a:extraClrSchemeLst/>
+  <a:extLst>
+    <a:ext uri="{05A4C25C-085E-4340-85A3-A5531E510DB2}">
+      <thm15:themeFamily xmlns:thm15="http://schemas.microsoft.com/office/thememl/2012/main" name="Office Theme" id="{62F939B6-93AF-4DB8-9C6B-D6C7DFDC589F}" vid="{4A3C46E8-61CC-4603-A589-7422A47A8E4A}"/>
+    </a:ext>
+  </a:extLst>
+</a:theme>
 </file>
</xml_diff>

<commit_message>
Updated mock design presentation
Signed-off-by: Andreas Maier <andreas.r.maier@gmx.de>
</commit_message>
<xml_diff>
--- a/design/RepositoryStructure.pptx
+++ b/design/RepositoryStructure.pptx
@@ -230,7 +230,7 @@
           <a:p>
             <a:fld id="{C29F78B0-A34D-4E1F-90F0-EA59C04644F7}" type="datetimeFigureOut">
               <a:rPr lang="en-US" smtClean="0"/>
-              <a:t>4/6/20</a:t>
+              <a:t>4/29/20</a:t>
             </a:fld>
             <a:endParaRPr lang="en-US"/>
           </a:p>
@@ -646,7 +646,7 @@
           <a:p>
             <a:fld id="{15EF66EA-7CC5-477B-80F1-8AB2601F1F88}" type="datetime1">
               <a:rPr lang="de-DE" smtClean="0"/>
-              <a:t>06.04.20</a:t>
+              <a:t>29.04.20</a:t>
             </a:fld>
             <a:endParaRPr lang="de-DE"/>
           </a:p>
@@ -846,7 +846,7 @@
           <a:p>
             <a:fld id="{8094D0AD-818A-484C-988E-733D7CBF505E}" type="datetime1">
               <a:rPr lang="de-DE" smtClean="0"/>
-              <a:t>06.04.20</a:t>
+              <a:t>29.04.20</a:t>
             </a:fld>
             <a:endParaRPr lang="de-DE"/>
           </a:p>
@@ -1056,7 +1056,7 @@
           <a:p>
             <a:fld id="{6A2CDEE2-3947-4BBE-A32B-315C6EE14044}" type="datetime1">
               <a:rPr lang="de-DE" smtClean="0"/>
-              <a:t>06.04.20</a:t>
+              <a:t>29.04.20</a:t>
             </a:fld>
             <a:endParaRPr lang="de-DE"/>
           </a:p>
@@ -1256,7 +1256,7 @@
           <a:p>
             <a:fld id="{1678A154-33EF-426C-A151-2F0AD3EBCF76}" type="datetime1">
               <a:rPr lang="de-DE" smtClean="0"/>
-              <a:t>06.04.20</a:t>
+              <a:t>29.04.20</a:t>
             </a:fld>
             <a:endParaRPr lang="de-DE"/>
           </a:p>
@@ -1532,7 +1532,7 @@
           <a:p>
             <a:fld id="{CEB4F9E4-4360-499B-B36F-BA55A8609F7B}" type="datetime1">
               <a:rPr lang="de-DE" smtClean="0"/>
-              <a:t>06.04.20</a:t>
+              <a:t>29.04.20</a:t>
             </a:fld>
             <a:endParaRPr lang="de-DE"/>
           </a:p>
@@ -1800,7 +1800,7 @@
           <a:p>
             <a:fld id="{F7547C07-CFC3-4E8E-9E85-228C8B488CD1}" type="datetime1">
               <a:rPr lang="de-DE" smtClean="0"/>
-              <a:t>06.04.20</a:t>
+              <a:t>29.04.20</a:t>
             </a:fld>
             <a:endParaRPr lang="de-DE"/>
           </a:p>
@@ -2215,7 +2215,7 @@
           <a:p>
             <a:fld id="{2215A030-BE9E-4DE4-821A-774F8CE2C808}" type="datetime1">
               <a:rPr lang="de-DE" smtClean="0"/>
-              <a:t>06.04.20</a:t>
+              <a:t>29.04.20</a:t>
             </a:fld>
             <a:endParaRPr lang="de-DE"/>
           </a:p>
@@ -2357,7 +2357,7 @@
           <a:p>
             <a:fld id="{1A0D111F-BD68-4F89-8423-E603AA9DA81C}" type="datetime1">
               <a:rPr lang="de-DE" smtClean="0"/>
-              <a:t>06.04.20</a:t>
+              <a:t>29.04.20</a:t>
             </a:fld>
             <a:endParaRPr lang="de-DE"/>
           </a:p>
@@ -2470,7 +2470,7 @@
           <a:p>
             <a:fld id="{2C7F27B1-BBA1-4C27-8A2F-E01354487744}" type="datetime1">
               <a:rPr lang="de-DE" smtClean="0"/>
-              <a:t>06.04.20</a:t>
+              <a:t>29.04.20</a:t>
             </a:fld>
             <a:endParaRPr lang="de-DE"/>
           </a:p>
@@ -2783,7 +2783,7 @@
           <a:p>
             <a:fld id="{2DFEE806-30D6-4F43-9FE9-861479A06D54}" type="datetime1">
               <a:rPr lang="de-DE" smtClean="0"/>
-              <a:t>06.04.20</a:t>
+              <a:t>29.04.20</a:t>
             </a:fld>
             <a:endParaRPr lang="de-DE"/>
           </a:p>
@@ -3072,7 +3072,7 @@
           <a:p>
             <a:fld id="{A80003E5-ADE2-4F53-A13C-C278FC0E33C9}" type="datetime1">
               <a:rPr lang="de-DE" smtClean="0"/>
-              <a:t>06.04.20</a:t>
+              <a:t>29.04.20</a:t>
             </a:fld>
             <a:endParaRPr lang="de-DE"/>
           </a:p>
@@ -3315,7 +3315,7 @@
           <a:p>
             <a:fld id="{DA156BB2-7B28-4BCB-B93F-B194B319E782}" type="datetime1">
               <a:rPr lang="de-DE" smtClean="0"/>
-              <a:t>06.04.20</a:t>
+              <a:t>29.04.20</a:t>
             </a:fld>
             <a:endParaRPr lang="de-DE"/>
           </a:p>
@@ -3809,7 +3809,7 @@
           <a:p>
             <a:r>
               <a:rPr lang="en-US" dirty="0"/>
-              <a:t>Last Updated: 2020-04-06</a:t>
+              <a:t>Last Updated: 2020-04-29</a:t>
             </a:r>
           </a:p>
           <a:p>
@@ -3840,7 +3840,7 @@
           <a:p>
             <a:fld id="{78AD0F07-AB73-42FB-9EB9-C011C90D146D}" type="datetime1">
               <a:rPr lang="de-DE" smtClean="0"/>
-              <a:t>06.04.20</a:t>
+              <a:t>29.04.20</a:t>
             </a:fld>
             <a:endParaRPr lang="de-DE"/>
           </a:p>
@@ -4157,7 +4157,7 @@
           <a:p>
             <a:fld id="{813B736A-4E39-4977-A524-D0A6922AA63C}" type="datetime1">
               <a:rPr lang="de-DE" smtClean="0"/>
-              <a:t>06.04.20</a:t>
+              <a:t>29.04.20</a:t>
             </a:fld>
             <a:endParaRPr lang="de-DE"/>
           </a:p>
@@ -4387,7 +4387,7 @@
           <a:p>
             <a:fld id="{B15FDDEF-D3E5-4C66-8BF3-3F6A443F0E59}" type="datetime1">
               <a:rPr lang="de-DE" smtClean="0"/>
-              <a:t>06.04.20</a:t>
+              <a:t>29.04.20</a:t>
             </a:fld>
             <a:endParaRPr lang="de-DE"/>
           </a:p>
@@ -4781,7 +4781,7 @@
           <a:p>
             <a:fld id="{9E7666CD-D72D-4540-A656-A2A53E030B1A}" type="datetime1">
               <a:rPr lang="de-DE" smtClean="0"/>
-              <a:t>06.04.20</a:t>
+              <a:t>29.04.20</a:t>
             </a:fld>
             <a:endParaRPr lang="de-DE"/>
           </a:p>
@@ -5172,7 +5172,7 @@
           <a:p>
             <a:fld id="{D2588ADC-F69F-4499-AFB9-DEB63C1D6CCD}" type="datetime1">
               <a:rPr lang="de-DE" smtClean="0"/>
-              <a:t>06.04.20</a:t>
+              <a:t>29.04.20</a:t>
             </a:fld>
             <a:endParaRPr lang="de-DE"/>
           </a:p>
@@ -5313,7 +5313,7 @@
           <a:p>
             <a:fld id="{F7547C07-CFC3-4E8E-9E85-228C8B488CD1}" type="datetime1">
               <a:rPr lang="de-DE" smtClean="0"/>
-              <a:t>06.04.20</a:t>
+              <a:t>29.04.20</a:t>
             </a:fld>
             <a:endParaRPr lang="de-DE"/>
           </a:p>
@@ -6305,7 +6305,7 @@
           <a:p>
             <a:fld id="{C90D6DFB-C1E8-440F-9CCD-E471E1166D94}" type="datetime1">
               <a:rPr lang="de-DE" smtClean="0"/>
-              <a:t>06.04.20</a:t>
+              <a:t>29.04.20</a:t>
             </a:fld>
             <a:endParaRPr lang="de-DE"/>
           </a:p>
@@ -7498,7 +7498,7 @@
           <a:p>
             <a:fld id="{58E90E32-198D-4FE4-BC05-6083D9D91C0E}" type="datetime1">
               <a:rPr lang="de-DE" smtClean="0"/>
-              <a:t>06.04.20</a:t>
+              <a:t>29.04.20</a:t>
             </a:fld>
             <a:endParaRPr lang="de-DE"/>
           </a:p>
@@ -8776,7 +8776,7 @@
           <a:p>
             <a:fld id="{4D30A999-A2B3-4F9D-952A-9DE7CCC90E47}" type="datetime1">
               <a:rPr lang="de-DE" smtClean="0"/>
-              <a:t>06.04.20</a:t>
+              <a:t>29.04.20</a:t>
             </a:fld>
             <a:endParaRPr lang="de-DE"/>
           </a:p>
@@ -9973,7 +9973,7 @@
           <a:p>
             <a:fld id="{F696BCA9-97EC-41BA-ACAB-A59AF750FD14}" type="datetime1">
               <a:rPr lang="de-DE" smtClean="0"/>
-              <a:t>06.04.20</a:t>
+              <a:t>29.04.20</a:t>
             </a:fld>
             <a:endParaRPr lang="de-DE"/>
           </a:p>
@@ -11631,7 +11631,7 @@
           <a:p>
             <a:fld id="{A848C7AB-F83B-4FC6-9231-FA7F2809359C}" type="datetime1">
               <a:rPr lang="de-DE" smtClean="0"/>
-              <a:t>06.04.20</a:t>
+              <a:t>29.04.20</a:t>
             </a:fld>
             <a:endParaRPr lang="de-DE"/>
           </a:p>
@@ -11710,7 +11710,7 @@
         </p:nvSpPr>
         <p:spPr>
           <a:xfrm>
-            <a:off x="1683522" y="6057513"/>
+            <a:off x="1683522" y="6273475"/>
             <a:ext cx="2240276" cy="328185"/>
           </a:xfrm>
           <a:prstGeom prst="rect">
@@ -11780,7 +11780,7 @@
         </p:nvSpPr>
         <p:spPr>
           <a:xfrm>
-            <a:off x="4603391" y="6057513"/>
+            <a:off x="4254070" y="6273474"/>
             <a:ext cx="2407839" cy="328186"/>
           </a:xfrm>
           <a:prstGeom prst="rect">
@@ -11915,8 +11915,8 @@
         </p:nvSpPr>
         <p:spPr>
           <a:xfrm>
-            <a:off x="460696" y="1700838"/>
-            <a:ext cx="7672021" cy="821950"/>
+            <a:off x="460696" y="1347716"/>
+            <a:ext cx="7672021" cy="750946"/>
           </a:xfrm>
           <a:prstGeom prst="rect">
             <a:avLst/>
@@ -11972,7 +11972,7 @@
                   <a:schemeClr val="tx1"/>
                 </a:solidFill>
               </a:rPr>
-              <a:t>Defines</a:t>
+              <a:t>Creates</a:t>
             </a:r>
             <a:r>
               <a:rPr lang="de-DE" sz="1200" dirty="0">
@@ -11996,7 +11996,7 @@
                   <a:schemeClr val="tx1"/>
                 </a:solidFill>
               </a:rPr>
-              <a:t> type </a:t>
+              <a:t>, </a:t>
             </a:r>
             <a:r>
               <a:rPr lang="de-DE" sz="1200" dirty="0" err="1">
@@ -12004,7 +12004,7 @@
                   <a:schemeClr val="tx1"/>
                 </a:solidFill>
               </a:rPr>
-              <a:t>and</a:t>
+              <a:t>registers</a:t>
             </a:r>
             <a:r>
               <a:rPr lang="de-DE" sz="1200" dirty="0">
@@ -12012,6 +12012,22 @@
                   <a:schemeClr val="tx1"/>
                 </a:solidFill>
               </a:rPr>
+              <a:t> providers, </a:t>
+            </a:r>
+            <a:r>
+              <a:rPr lang="de-DE" sz="1200" dirty="0" err="1">
+                <a:solidFill>
+                  <a:schemeClr val="tx1"/>
+                </a:solidFill>
+              </a:rPr>
+              <a:t>manages</a:t>
+            </a:r>
+            <a:r>
+              <a:rPr lang="de-DE" sz="1200" dirty="0">
+                <a:solidFill>
+                  <a:schemeClr val="tx1"/>
+                </a:solidFill>
+              </a:rPr>
               <a:t> </a:t>
             </a:r>
             <a:r>
@@ -12020,7 +12036,7 @@
                   <a:schemeClr val="tx1"/>
                 </a:solidFill>
               </a:rPr>
-              <a:t>for</a:t>
+              <a:t>namespaces</a:t>
             </a:r>
             <a:r>
               <a:rPr lang="de-DE" sz="1200" dirty="0">
@@ -12028,6 +12044,54 @@
                   <a:schemeClr val="tx1"/>
                 </a:solidFill>
               </a:rPr>
+              <a:t>, </a:t>
+            </a:r>
+            <a:r>
+              <a:rPr lang="de-DE" sz="1200" dirty="0" err="1">
+                <a:solidFill>
+                  <a:schemeClr val="tx1"/>
+                </a:solidFill>
+              </a:rPr>
+              <a:t>adds</a:t>
+            </a:r>
+            <a:r>
+              <a:rPr lang="de-DE" sz="1200" dirty="0">
+                <a:solidFill>
+                  <a:schemeClr val="tx1"/>
+                </a:solidFill>
+              </a:rPr>
+              <a:t> objects, </a:t>
+            </a:r>
+            <a:r>
+              <a:rPr lang="de-DE" sz="1200" dirty="0" err="1">
+                <a:solidFill>
+                  <a:schemeClr val="tx1"/>
+                </a:solidFill>
+              </a:rPr>
+              <a:t>compiles</a:t>
+            </a:r>
+            <a:r>
+              <a:rPr lang="de-DE" sz="1200" dirty="0">
+                <a:solidFill>
+                  <a:schemeClr val="tx1"/>
+                </a:solidFill>
+              </a:rPr>
+              <a:t> MOF, </a:t>
+            </a:r>
+            <a:r>
+              <a:rPr lang="de-DE" sz="1200" dirty="0" err="1">
+                <a:solidFill>
+                  <a:schemeClr val="tx1"/>
+                </a:solidFill>
+              </a:rPr>
+              <a:t>displays</a:t>
+            </a:r>
+            <a:r>
+              <a:rPr lang="de-DE" sz="1200" dirty="0">
+                <a:solidFill>
+                  <a:schemeClr val="tx1"/>
+                </a:solidFill>
+              </a:rPr>
               <a:t> </a:t>
             </a:r>
             <a:r>
@@ -12036,7 +12100,7 @@
                   <a:schemeClr val="tx1"/>
                 </a:solidFill>
               </a:rPr>
-              <a:t>file</a:t>
+              <a:t>repository</a:t>
             </a:r>
             <a:r>
               <a:rPr lang="de-DE" sz="1200" dirty="0">
@@ -12044,6 +12108,22 @@
                   <a:schemeClr val="tx1"/>
                 </a:solidFill>
               </a:rPr>
+              <a:t>, </a:t>
+            </a:r>
+            <a:r>
+              <a:rPr lang="de-DE" sz="1200" dirty="0" err="1">
+                <a:solidFill>
+                  <a:schemeClr val="tx1"/>
+                </a:solidFill>
+              </a:rPr>
+              <a:t>defines</a:t>
+            </a:r>
+            <a:r>
+              <a:rPr lang="de-DE" sz="1200" dirty="0">
+                <a:solidFill>
+                  <a:schemeClr val="tx1"/>
+                </a:solidFill>
+              </a:rPr>
               <a:t> </a:t>
             </a:r>
             <a:r>
@@ -12052,7 +12132,7 @@
                   <a:schemeClr val="tx1"/>
                 </a:solidFill>
               </a:rPr>
-              <a:t>system</a:t>
+              <a:t>default</a:t>
             </a:r>
             <a:r>
               <a:rPr lang="de-DE" sz="1200" dirty="0">
@@ -12068,7 +12148,7 @@
                   <a:schemeClr val="tx1"/>
                 </a:solidFill>
               </a:rPr>
-              <a:t>repo</a:t>
+              <a:t>namespace</a:t>
             </a:r>
             <a:r>
               <a:rPr lang="de-DE" sz="1200" dirty="0">
@@ -12076,6 +12156,38 @@
                   <a:schemeClr val="tx1"/>
                 </a:solidFill>
               </a:rPr>
+              <a:t>, </a:t>
+            </a:r>
+            <a:r>
+              <a:rPr lang="de-DE" sz="1200" dirty="0" err="1">
+                <a:solidFill>
+                  <a:schemeClr val="tx1"/>
+                </a:solidFill>
+              </a:rPr>
+              <a:t>directs</a:t>
+            </a:r>
+            <a:r>
+              <a:rPr lang="de-DE" sz="1200" dirty="0">
+                <a:solidFill>
+                  <a:schemeClr val="tx1"/>
+                </a:solidFill>
+              </a:rPr>
+              <a:t> all </a:t>
+            </a:r>
+            <a:r>
+              <a:rPr lang="de-DE" sz="1200" dirty="0" err="1">
+                <a:solidFill>
+                  <a:schemeClr val="tx1"/>
+                </a:solidFill>
+              </a:rPr>
+              <a:t>client</a:t>
+            </a:r>
+            <a:r>
+              <a:rPr lang="de-DE" sz="1200" dirty="0">
+                <a:solidFill>
+                  <a:schemeClr val="tx1"/>
+                </a:solidFill>
+              </a:rPr>
               <a:t> </a:t>
             </a:r>
             <a:r>
@@ -12084,7 +12196,7 @@
                   <a:schemeClr val="tx1"/>
                 </a:solidFill>
               </a:rPr>
-              <a:t>the</a:t>
+              <a:t>ops</a:t>
             </a:r>
             <a:r>
               <a:rPr lang="de-DE" sz="1200" dirty="0">
@@ -12100,7 +12212,7 @@
                   <a:schemeClr val="tx1"/>
                 </a:solidFill>
               </a:rPr>
-              <a:t>repo</a:t>
+              <a:t>to</a:t>
             </a:r>
             <a:r>
               <a:rPr lang="de-DE" sz="1200" dirty="0">
@@ -12116,7 +12228,7 @@
                   <a:schemeClr val="tx1"/>
                 </a:solidFill>
               </a:rPr>
-              <a:t>root</a:t>
+              <a:t>provider</a:t>
             </a:r>
             <a:r>
               <a:rPr lang="de-DE" sz="1200" dirty="0">
@@ -12132,272 +12244,13 @@
                   <a:schemeClr val="tx1"/>
                 </a:solidFill>
               </a:rPr>
-              <a:t>directory</a:t>
-            </a:r>
-            <a:r>
-              <a:rPr lang="de-DE" sz="1200" dirty="0">
-                <a:solidFill>
-                  <a:schemeClr val="tx1"/>
-                </a:solidFill>
-              </a:rPr>
-              <a:t>, </a:t>
-            </a:r>
-            <a:r>
-              <a:rPr lang="de-DE" sz="1200" dirty="0" err="1">
-                <a:solidFill>
-                  <a:schemeClr val="tx1"/>
-                </a:solidFill>
-              </a:rPr>
-              <a:t>registers</a:t>
-            </a:r>
-            <a:r>
-              <a:rPr lang="de-DE" sz="1200" dirty="0">
-                <a:solidFill>
-                  <a:schemeClr val="tx1"/>
-                </a:solidFill>
-              </a:rPr>
-              <a:t> providers, </a:t>
-            </a:r>
-            <a:r>
-              <a:rPr lang="de-DE" sz="1200" dirty="0" err="1">
-                <a:solidFill>
-                  <a:schemeClr val="tx1"/>
-                </a:solidFill>
-              </a:rPr>
-              <a:t>manages</a:t>
-            </a:r>
-            <a:r>
-              <a:rPr lang="de-DE" sz="1200" dirty="0">
-                <a:solidFill>
-                  <a:schemeClr val="tx1"/>
-                </a:solidFill>
-              </a:rPr>
-              <a:t> </a:t>
-            </a:r>
-            <a:r>
-              <a:rPr lang="de-DE" sz="1200" dirty="0" err="1">
-                <a:solidFill>
-                  <a:schemeClr val="tx1"/>
-                </a:solidFill>
-              </a:rPr>
-              <a:t>namespaces</a:t>
-            </a:r>
-            <a:r>
-              <a:rPr lang="de-DE" sz="1200" dirty="0">
-                <a:solidFill>
-                  <a:schemeClr val="tx1"/>
-                </a:solidFill>
-              </a:rPr>
-              <a:t>, </a:t>
-            </a:r>
-            <a:r>
-              <a:rPr lang="de-DE" sz="1200" dirty="0" err="1">
-                <a:solidFill>
-                  <a:schemeClr val="tx1"/>
-                </a:solidFill>
-              </a:rPr>
-              <a:t>adds</a:t>
-            </a:r>
-            <a:r>
-              <a:rPr lang="de-DE" sz="1200" dirty="0">
-                <a:solidFill>
-                  <a:schemeClr val="tx1"/>
-                </a:solidFill>
-              </a:rPr>
-              <a:t> objects, </a:t>
-            </a:r>
-            <a:r>
-              <a:rPr lang="de-DE" sz="1200" dirty="0" err="1">
-                <a:solidFill>
-                  <a:schemeClr val="tx1"/>
-                </a:solidFill>
-              </a:rPr>
-              <a:t>compiles</a:t>
-            </a:r>
-            <a:r>
-              <a:rPr lang="de-DE" sz="1200" dirty="0">
-                <a:solidFill>
-                  <a:schemeClr val="tx1"/>
-                </a:solidFill>
-              </a:rPr>
-              <a:t> MOF, </a:t>
-            </a:r>
-            <a:r>
-              <a:rPr lang="de-DE" sz="1200" dirty="0" err="1">
-                <a:solidFill>
-                  <a:schemeClr val="tx1"/>
-                </a:solidFill>
-              </a:rPr>
-              <a:t>displays</a:t>
-            </a:r>
-            <a:r>
-              <a:rPr lang="de-DE" sz="1200" dirty="0">
-                <a:solidFill>
-                  <a:schemeClr val="tx1"/>
-                </a:solidFill>
-              </a:rPr>
-              <a:t> </a:t>
-            </a:r>
-            <a:r>
-              <a:rPr lang="de-DE" sz="1200" dirty="0" err="1">
-                <a:solidFill>
-                  <a:schemeClr val="tx1"/>
-                </a:solidFill>
-              </a:rPr>
-              <a:t>repository</a:t>
-            </a:r>
-            <a:r>
-              <a:rPr lang="de-DE" sz="1200" dirty="0">
-                <a:solidFill>
-                  <a:schemeClr val="tx1"/>
-                </a:solidFill>
-              </a:rPr>
-              <a:t>, </a:t>
-            </a:r>
-            <a:r>
-              <a:rPr lang="de-DE" sz="1200" dirty="0" err="1">
-                <a:solidFill>
-                  <a:schemeClr val="tx1"/>
-                </a:solidFill>
-              </a:rPr>
-              <a:t>defines</a:t>
-            </a:r>
-            <a:r>
-              <a:rPr lang="de-DE" sz="1200" dirty="0">
-                <a:solidFill>
-                  <a:schemeClr val="tx1"/>
-                </a:solidFill>
-              </a:rPr>
-              <a:t> </a:t>
-            </a:r>
-            <a:r>
-              <a:rPr lang="de-DE" sz="1200" dirty="0" err="1">
-                <a:solidFill>
-                  <a:schemeClr val="tx1"/>
-                </a:solidFill>
-              </a:rPr>
-              <a:t>default</a:t>
-            </a:r>
-            <a:r>
-              <a:rPr lang="de-DE" sz="1200" dirty="0">
-                <a:solidFill>
-                  <a:schemeClr val="tx1"/>
-                </a:solidFill>
-              </a:rPr>
-              <a:t> </a:t>
-            </a:r>
-            <a:r>
-              <a:rPr lang="de-DE" sz="1200" dirty="0" err="1">
-                <a:solidFill>
-                  <a:schemeClr val="tx1"/>
-                </a:solidFill>
-              </a:rPr>
-              <a:t>namespace</a:t>
-            </a:r>
-            <a:r>
-              <a:rPr lang="de-DE" sz="1200" dirty="0">
-                <a:solidFill>
-                  <a:schemeClr val="tx1"/>
-                </a:solidFill>
-              </a:rPr>
-              <a:t>, </a:t>
-            </a:r>
-            <a:r>
-              <a:rPr lang="de-DE" sz="1200" dirty="0" err="1">
-                <a:solidFill>
-                  <a:schemeClr val="tx1"/>
-                </a:solidFill>
-              </a:rPr>
-              <a:t>translates</a:t>
-            </a:r>
-            <a:r>
-              <a:rPr lang="de-DE" sz="1200" dirty="0">
-                <a:solidFill>
-                  <a:schemeClr val="tx1"/>
-                </a:solidFill>
-              </a:rPr>
-              <a:t> </a:t>
-            </a:r>
-            <a:r>
-              <a:rPr lang="de-DE" sz="1200" dirty="0" err="1">
-                <a:solidFill>
-                  <a:schemeClr val="tx1"/>
-                </a:solidFill>
-              </a:rPr>
-              <a:t>client</a:t>
-            </a:r>
-            <a:r>
-              <a:rPr lang="de-DE" sz="1200" dirty="0">
-                <a:solidFill>
-                  <a:schemeClr val="tx1"/>
-                </a:solidFill>
-              </a:rPr>
-              <a:t> </a:t>
-            </a:r>
-            <a:r>
-              <a:rPr lang="de-DE" sz="1200" dirty="0" err="1">
-                <a:solidFill>
-                  <a:schemeClr val="tx1"/>
-                </a:solidFill>
-              </a:rPr>
-              <a:t>ops</a:t>
-            </a:r>
-            <a:r>
-              <a:rPr lang="de-DE" sz="1200" dirty="0">
-                <a:solidFill>
-                  <a:schemeClr val="tx1"/>
-                </a:solidFill>
-              </a:rPr>
-              <a:t> </a:t>
-            </a:r>
-            <a:r>
-              <a:rPr lang="de-DE" sz="1200" dirty="0" err="1">
-                <a:solidFill>
-                  <a:schemeClr val="tx1"/>
-                </a:solidFill>
-              </a:rPr>
-              <a:t>into</a:t>
-            </a:r>
-            <a:r>
-              <a:rPr lang="de-DE" sz="1200" dirty="0">
-                <a:solidFill>
-                  <a:schemeClr val="tx1"/>
-                </a:solidFill>
-              </a:rPr>
-              <a:t> </a:t>
-            </a:r>
-            <a:r>
-              <a:rPr lang="de-DE" sz="1200" dirty="0" err="1">
-                <a:solidFill>
-                  <a:schemeClr val="tx1"/>
-                </a:solidFill>
-              </a:rPr>
-              <a:t>provider</a:t>
-            </a:r>
-            <a:r>
-              <a:rPr lang="de-DE" sz="1200" dirty="0">
-                <a:solidFill>
-                  <a:schemeClr val="tx1"/>
-                </a:solidFill>
-              </a:rPr>
-              <a:t> </a:t>
-            </a:r>
-            <a:r>
-              <a:rPr lang="de-DE" sz="1200" dirty="0" err="1">
-                <a:solidFill>
-                  <a:schemeClr val="tx1"/>
-                </a:solidFill>
-              </a:rPr>
-              <a:t>calls</a:t>
-            </a:r>
-            <a:r>
-              <a:rPr lang="de-DE" sz="1200" dirty="0">
-                <a:solidFill>
-                  <a:schemeClr val="tx1"/>
-                </a:solidFill>
-              </a:rPr>
-              <a:t> (CIMOM)</a:t>
-            </a:r>
+              <a:t>dispatcher</a:t>
+            </a:r>
+            <a:endParaRPr lang="de-DE" sz="1200" dirty="0">
+              <a:solidFill>
+                <a:schemeClr val="tx1"/>
+              </a:solidFill>
+            </a:endParaRPr>
           </a:p>
         </p:txBody>
       </p:sp>
@@ -12415,7 +12268,7 @@
         </p:nvSpPr>
         <p:spPr>
           <a:xfrm>
-            <a:off x="8794777" y="1700181"/>
+            <a:off x="8794777" y="1638537"/>
             <a:ext cx="2914814" cy="972222"/>
           </a:xfrm>
           <a:prstGeom prst="rect">
@@ -12524,8 +12377,8 @@
         </p:nvSpPr>
         <p:spPr>
           <a:xfrm>
-            <a:off x="10157726" y="2322514"/>
-            <a:ext cx="1551857" cy="349888"/>
+            <a:off x="8794778" y="2779293"/>
+            <a:ext cx="2912290" cy="349888"/>
           </a:xfrm>
           <a:prstGeom prst="rect">
             <a:avLst/>
@@ -12565,13 +12418,34 @@
           <a:p>
             <a:pPr algn="ctr"/>
             <a:r>
-              <a:rPr lang="de-DE" dirty="0">
-                <a:solidFill>
-                  <a:schemeClr val="tx1"/>
-                </a:solidFill>
-              </a:rPr>
-              <a:t>CIM-XML</a:t>
-            </a:r>
+              <a:rPr lang="de-DE" dirty="0" err="1">
+                <a:solidFill>
+                  <a:schemeClr val="tx1"/>
+                </a:solidFill>
+              </a:rPr>
+              <a:t>cim_xml</a:t>
+            </a:r>
+            <a:r>
+              <a:rPr lang="de-DE" dirty="0">
+                <a:solidFill>
+                  <a:schemeClr val="tx1"/>
+                </a:solidFill>
+              </a:rPr>
+              <a:t> / </a:t>
+            </a:r>
+            <a:r>
+              <a:rPr lang="de-DE" dirty="0" err="1">
+                <a:solidFill>
+                  <a:schemeClr val="tx1"/>
+                </a:solidFill>
+              </a:rPr>
+              <a:t>tupleparse</a:t>
+            </a:r>
+            <a:endParaRPr lang="de-DE" dirty="0">
+              <a:solidFill>
+                <a:schemeClr val="tx1"/>
+              </a:solidFill>
+            </a:endParaRPr>
           </a:p>
         </p:txBody>
       </p:sp>
@@ -12589,8 +12463,8 @@
         </p:nvSpPr>
         <p:spPr>
           <a:xfrm>
-            <a:off x="4839632" y="3927382"/>
-            <a:ext cx="3293071" cy="755129"/>
+            <a:off x="4538312" y="4750078"/>
+            <a:ext cx="1489248" cy="272826"/>
           </a:xfrm>
           <a:prstGeom prst="rect">
             <a:avLst/>
@@ -12630,135 +12504,12 @@
           <a:p>
             <a:pPr algn="ctr"/>
             <a:r>
-              <a:rPr lang="de-DE" dirty="0">
+              <a:rPr lang="de-DE" sz="1400" dirty="0">
                 <a:solidFill>
                   <a:schemeClr val="tx1"/>
                 </a:solidFill>
               </a:rPr>
               <a:t>&lt;User Provider&gt;</a:t>
-            </a:r>
-          </a:p>
-          <a:p>
-            <a:pPr algn="ctr"/>
-            <a:r>
-              <a:rPr lang="de-DE" sz="1200" dirty="0" err="1">
-                <a:solidFill>
-                  <a:schemeClr val="tx1"/>
-                </a:solidFill>
-              </a:rPr>
-              <a:t>Specific</a:t>
-            </a:r>
-            <a:r>
-              <a:rPr lang="de-DE" sz="1200" dirty="0">
-                <a:solidFill>
-                  <a:schemeClr val="tx1"/>
-                </a:solidFill>
-              </a:rPr>
-              <a:t> </a:t>
-            </a:r>
-            <a:r>
-              <a:rPr lang="de-DE" sz="1200" dirty="0" err="1">
-                <a:solidFill>
-                  <a:schemeClr val="tx1"/>
-                </a:solidFill>
-              </a:rPr>
-              <a:t>implementation</a:t>
-            </a:r>
-            <a:r>
-              <a:rPr lang="de-DE" sz="1200" dirty="0">
-                <a:solidFill>
-                  <a:schemeClr val="tx1"/>
-                </a:solidFill>
-              </a:rPr>
-              <a:t> </a:t>
-            </a:r>
-            <a:r>
-              <a:rPr lang="de-DE" sz="1200" dirty="0" err="1">
-                <a:solidFill>
-                  <a:schemeClr val="tx1"/>
-                </a:solidFill>
-              </a:rPr>
-              <a:t>of</a:t>
-            </a:r>
-            <a:r>
-              <a:rPr lang="de-DE" sz="1200" dirty="0">
-                <a:solidFill>
-                  <a:schemeClr val="tx1"/>
-                </a:solidFill>
-              </a:rPr>
-              <a:t> </a:t>
-            </a:r>
-            <a:r>
-              <a:rPr lang="en-US" sz="1200" dirty="0">
-                <a:solidFill>
-                  <a:schemeClr val="tx1"/>
-                </a:solidFill>
-              </a:rPr>
-              <a:t>create, delete, modify, </a:t>
-            </a:r>
-            <a:r>
-              <a:rPr lang="en-US" sz="1200" dirty="0" err="1">
-                <a:solidFill>
-                  <a:schemeClr val="tx1"/>
-                </a:solidFill>
-              </a:rPr>
-              <a:t>invokemethod</a:t>
-            </a:r>
-            <a:r>
-              <a:rPr lang="en-US" sz="1200" dirty="0">
-                <a:solidFill>
-                  <a:schemeClr val="tx1"/>
-                </a:solidFill>
-              </a:rPr>
-              <a:t> </a:t>
-            </a:r>
-            <a:r>
-              <a:rPr lang="de-DE" sz="1200" dirty="0" err="1">
-                <a:solidFill>
-                  <a:schemeClr val="tx1"/>
-                </a:solidFill>
-              </a:rPr>
-              <a:t>ops</a:t>
-            </a:r>
-            <a:r>
-              <a:rPr lang="de-DE" sz="1200" dirty="0">
-                <a:solidFill>
-                  <a:schemeClr val="tx1"/>
-                </a:solidFill>
-              </a:rPr>
-              <a:t> </a:t>
-            </a:r>
-            <a:r>
-              <a:rPr lang="de-DE" sz="1200" dirty="0" err="1">
-                <a:solidFill>
-                  <a:schemeClr val="tx1"/>
-                </a:solidFill>
-              </a:rPr>
-              <a:t>for</a:t>
-            </a:r>
-            <a:r>
-              <a:rPr lang="de-DE" sz="1200" dirty="0">
-                <a:solidFill>
-                  <a:schemeClr val="tx1"/>
-                </a:solidFill>
-              </a:rPr>
-              <a:t> a registered </a:t>
-            </a:r>
-            <a:r>
-              <a:rPr lang="de-DE" sz="1200" dirty="0" err="1">
-                <a:solidFill>
-                  <a:schemeClr val="tx1"/>
-                </a:solidFill>
-              </a:rPr>
-              <a:t>class</a:t>
-            </a:r>
-            <a:r>
-              <a:rPr lang="de-DE" sz="1200" dirty="0">
-                <a:solidFill>
-                  <a:schemeClr val="tx1"/>
-                </a:solidFill>
-              </a:rPr>
-              <a:t> </a:t>
             </a:r>
           </a:p>
         </p:txBody>
@@ -12777,8 +12528,8 @@
         </p:nvSpPr>
         <p:spPr>
           <a:xfrm>
-            <a:off x="3716422" y="2848032"/>
-            <a:ext cx="4416286" cy="755129"/>
+            <a:off x="2904053" y="3744878"/>
+            <a:ext cx="3123507" cy="756954"/>
           </a:xfrm>
           <a:prstGeom prst="rect">
             <a:avLst/>
@@ -12818,12 +12569,20 @@
           <a:p>
             <a:pPr algn="ctr"/>
             <a:r>
-              <a:rPr lang="de-DE" dirty="0">
-                <a:solidFill>
-                  <a:schemeClr val="tx1"/>
-                </a:solidFill>
-              </a:rPr>
-              <a:t>BaseInstanceProvider </a:t>
+              <a:rPr lang="de-DE" dirty="0" err="1">
+                <a:solidFill>
+                  <a:schemeClr val="tx1"/>
+                </a:solidFill>
+              </a:rPr>
+              <a:t>InstanceWriteProvider</a:t>
+            </a:r>
+            <a:r>
+              <a:rPr lang="de-DE" dirty="0">
+                <a:solidFill>
+                  <a:schemeClr val="tx1"/>
+                </a:solidFill>
+              </a:rPr>
+              <a:t> </a:t>
             </a:r>
           </a:p>
           <a:p>
@@ -12858,7 +12617,7 @@
                   <a:schemeClr val="tx1"/>
                 </a:solidFill>
               </a:rPr>
-              <a:t>of</a:t>
+              <a:t>and</a:t>
             </a:r>
             <a:r>
               <a:rPr lang="de-DE" sz="1200" dirty="0">
@@ -12874,6 +12633,102 @@
                   <a:schemeClr val="tx1"/>
                 </a:solidFill>
               </a:rPr>
+              <a:t>base</a:t>
+            </a:r>
+            <a:r>
+              <a:rPr lang="de-DE" sz="1200" dirty="0">
+                <a:solidFill>
+                  <a:schemeClr val="tx1"/>
+                </a:solidFill>
+              </a:rPr>
+              <a:t> </a:t>
+            </a:r>
+            <a:r>
+              <a:rPr lang="de-DE" sz="1200" dirty="0" err="1">
+                <a:solidFill>
+                  <a:schemeClr val="tx1"/>
+                </a:solidFill>
+              </a:rPr>
+              <a:t>class</a:t>
+            </a:r>
+            <a:r>
+              <a:rPr lang="de-DE" sz="1200" dirty="0">
+                <a:solidFill>
+                  <a:schemeClr val="tx1"/>
+                </a:solidFill>
+              </a:rPr>
+              <a:t> </a:t>
+            </a:r>
+            <a:r>
+              <a:rPr lang="de-DE" sz="1200" dirty="0" err="1">
+                <a:solidFill>
+                  <a:schemeClr val="tx1"/>
+                </a:solidFill>
+              </a:rPr>
+              <a:t>for</a:t>
+            </a:r>
+            <a:r>
+              <a:rPr lang="de-DE" sz="1200" dirty="0">
+                <a:solidFill>
+                  <a:schemeClr val="tx1"/>
+                </a:solidFill>
+              </a:rPr>
+              <a:t> </a:t>
+            </a:r>
+            <a:r>
+              <a:rPr lang="de-DE" sz="1200" dirty="0" err="1">
+                <a:solidFill>
+                  <a:schemeClr val="tx1"/>
+                </a:solidFill>
+              </a:rPr>
+              <a:t>user</a:t>
+            </a:r>
+            <a:r>
+              <a:rPr lang="de-DE" sz="1200" dirty="0">
+                <a:solidFill>
+                  <a:schemeClr val="tx1"/>
+                </a:solidFill>
+              </a:rPr>
+              <a:t> </a:t>
+            </a:r>
+            <a:r>
+              <a:rPr lang="de-DE" sz="1200" dirty="0" err="1">
+                <a:solidFill>
+                  <a:schemeClr val="tx1"/>
+                </a:solidFill>
+              </a:rPr>
+              <a:t>providers</a:t>
+            </a:r>
+            <a:r>
+              <a:rPr lang="de-DE" sz="1200" dirty="0">
+                <a:solidFill>
+                  <a:schemeClr val="tx1"/>
+                </a:solidFill>
+              </a:rPr>
+              <a:t> </a:t>
+            </a:r>
+            <a:r>
+              <a:rPr lang="de-DE" sz="1200" dirty="0" err="1">
+                <a:solidFill>
+                  <a:schemeClr val="tx1"/>
+                </a:solidFill>
+              </a:rPr>
+              <a:t>for</a:t>
+            </a:r>
+            <a:r>
+              <a:rPr lang="de-DE" sz="1200" dirty="0">
+                <a:solidFill>
+                  <a:schemeClr val="tx1"/>
+                </a:solidFill>
+              </a:rPr>
+              <a:t> </a:t>
+            </a:r>
+            <a:r>
+              <a:rPr lang="de-DE" sz="1200" dirty="0" err="1">
+                <a:solidFill>
+                  <a:schemeClr val="tx1"/>
+                </a:solidFill>
+              </a:rPr>
               <a:t>instance</a:t>
             </a:r>
             <a:r>
@@ -12914,85 +12769,8 @@
                   <a:schemeClr val="tx1"/>
                 </a:solidFill>
               </a:rPr>
-              <a:t>, </a:t>
-            </a:r>
-            <a:r>
-              <a:rPr lang="de-DE" sz="1200" dirty="0" err="1">
-                <a:solidFill>
-                  <a:schemeClr val="tx1"/>
-                </a:solidFill>
-              </a:rPr>
-              <a:t>invokemethod</a:t>
-            </a:r>
-            <a:r>
-              <a:rPr lang="de-DE" sz="1200" dirty="0">
-                <a:solidFill>
-                  <a:schemeClr val="tx1"/>
-                </a:solidFill>
-              </a:rPr>
               <a:t> </a:t>
             </a:r>
-            <a:r>
-              <a:rPr lang="de-DE" sz="1200" dirty="0" err="1">
-                <a:solidFill>
-                  <a:schemeClr val="tx1"/>
-                </a:solidFill>
-              </a:rPr>
-              <a:t>ops</a:t>
-            </a:r>
-            <a:r>
-              <a:rPr lang="de-DE" sz="1200" dirty="0">
-                <a:solidFill>
-                  <a:schemeClr val="tx1"/>
-                </a:solidFill>
-              </a:rPr>
-              <a:t>, </a:t>
-            </a:r>
-            <a:r>
-              <a:rPr lang="de-DE" sz="1200" dirty="0" err="1">
-                <a:solidFill>
-                  <a:schemeClr val="tx1"/>
-                </a:solidFill>
-              </a:rPr>
-              <a:t>generic</a:t>
-            </a:r>
-            <a:r>
-              <a:rPr lang="de-DE" sz="1200" dirty="0">
-                <a:solidFill>
-                  <a:schemeClr val="tx1"/>
-                </a:solidFill>
-              </a:rPr>
-              <a:t> </a:t>
-            </a:r>
-            <a:r>
-              <a:rPr lang="de-DE" sz="1200" dirty="0" err="1">
-                <a:solidFill>
-                  <a:schemeClr val="tx1"/>
-                </a:solidFill>
-              </a:rPr>
-              <a:t>for</a:t>
-            </a:r>
-            <a:r>
-              <a:rPr lang="de-DE" sz="1200" dirty="0">
-                <a:solidFill>
-                  <a:schemeClr val="tx1"/>
-                </a:solidFill>
-              </a:rPr>
-              <a:t> all </a:t>
-            </a:r>
-            <a:r>
-              <a:rPr lang="de-DE" sz="1200" dirty="0" err="1">
-                <a:solidFill>
-                  <a:schemeClr val="tx1"/>
-                </a:solidFill>
-              </a:rPr>
-              <a:t>classes</a:t>
-            </a:r>
-            <a:endParaRPr lang="de-DE" sz="1200" dirty="0">
-              <a:solidFill>
-                <a:schemeClr val="tx1"/>
-              </a:solidFill>
-            </a:endParaRPr>
           </a:p>
         </p:txBody>
       </p:sp>
@@ -13010,8 +12788,8 @@
         </p:nvSpPr>
         <p:spPr>
           <a:xfrm>
-            <a:off x="527602" y="243887"/>
-            <a:ext cx="2350323" cy="369332"/>
+            <a:off x="309985" y="202917"/>
+            <a:ext cx="2467342" cy="369332"/>
           </a:xfrm>
           <a:prstGeom prst="rect">
             <a:avLst/>
@@ -13025,8 +12803,12 @@
           <a:lstStyle/>
           <a:p>
             <a:r>
+              <a:rPr lang="de-DE" dirty="0" err="1"/>
+              <a:t>Discussion</a:t>
+            </a:r>
+            <a:r>
               <a:rPr lang="de-DE" dirty="0"/>
-              <a:t>Discussion 5 April 2020</a:t>
+              <a:t> 29 April 2020</a:t>
             </a:r>
           </a:p>
         </p:txBody>
@@ -13045,8 +12827,8 @@
         </p:nvSpPr>
         <p:spPr>
           <a:xfrm>
-            <a:off x="8365839" y="4185598"/>
-            <a:ext cx="3690177" cy="830997"/>
+            <a:off x="8486215" y="4185598"/>
+            <a:ext cx="3705785" cy="830997"/>
           </a:xfrm>
           <a:prstGeom prst="rect">
             <a:avLst/>
@@ -13054,7 +12836,7 @@
           <a:noFill/>
         </p:spPr>
         <p:txBody>
-          <a:bodyPr wrap="none" rtlCol="0">
+          <a:bodyPr wrap="square" rtlCol="0">
             <a:spAutoFit/>
           </a:bodyPr>
           <a:lstStyle/>
@@ -13110,13 +12892,13 @@
         </p:nvSpPr>
         <p:spPr>
           <a:xfrm>
-            <a:off x="2927977" y="707152"/>
+            <a:off x="2901589" y="371917"/>
             <a:ext cx="2704961" cy="518098"/>
           </a:xfrm>
           <a:prstGeom prst="wedgeRoundRectCallout">
             <a:avLst>
-              <a:gd name="adj1" fmla="val 65249"/>
-              <a:gd name="adj2" fmla="val 109184"/>
+              <a:gd name="adj1" fmla="val 67908"/>
+              <a:gd name="adj2" fmla="val 140259"/>
               <a:gd name="adj3" fmla="val 16667"/>
             </a:avLst>
           </a:prstGeom>
@@ -13172,8 +12954,8 @@
         </p:nvSpPr>
         <p:spPr>
           <a:xfrm>
-            <a:off x="460696" y="2846207"/>
-            <a:ext cx="3040751" cy="756954"/>
+            <a:off x="460697" y="3744877"/>
+            <a:ext cx="2342964" cy="756954"/>
           </a:xfrm>
           <a:prstGeom prst="rect">
             <a:avLst/>
@@ -13329,23 +13111,22 @@
       </p:sp>
       <p:cxnSp>
         <p:nvCxnSpPr>
-          <p:cNvPr id="37" name="Straight Arrow Connector 36">
-            <a:extLst>
-              <a:ext uri="{FF2B5EF4-FFF2-40B4-BE49-F238E27FC236}">
-                <a16:creationId xmlns:a16="http://schemas.microsoft.com/office/drawing/2014/main" id="{B7FAA196-D655-4C4A-A0EE-1527313FA31B}"/>
+          <p:cNvPr id="39" name="Straight Arrow Connector 38">
+            <a:extLst>
+              <a:ext uri="{FF2B5EF4-FFF2-40B4-BE49-F238E27FC236}">
+                <a16:creationId xmlns:a16="http://schemas.microsoft.com/office/drawing/2014/main" id="{AEE343A2-E45D-40D5-BC8C-8E8F9B0CE8DE}"/>
               </a:ext>
             </a:extLst>
           </p:cNvPr>
           <p:cNvCxnSpPr>
             <a:cxnSpLocks/>
-            <a:endCxn id="25" idx="0"/>
           </p:cNvCxnSpPr>
           <p:nvPr/>
         </p:nvCxnSpPr>
         <p:spPr>
           <a:xfrm>
-            <a:off x="1981072" y="2522788"/>
-            <a:ext cx="0" cy="323419"/>
+            <a:off x="4329663" y="2866322"/>
+            <a:ext cx="0" cy="213817"/>
           </a:xfrm>
           <a:prstGeom prst="straightConnector1">
             <a:avLst/>
@@ -13374,23 +13155,22 @@
       </p:cxnSp>
       <p:cxnSp>
         <p:nvCxnSpPr>
-          <p:cNvPr id="39" name="Straight Arrow Connector 38">
-            <a:extLst>
-              <a:ext uri="{FF2B5EF4-FFF2-40B4-BE49-F238E27FC236}">
-                <a16:creationId xmlns:a16="http://schemas.microsoft.com/office/drawing/2014/main" id="{AEE343A2-E45D-40D5-BC8C-8E8F9B0CE8DE}"/>
+          <p:cNvPr id="44" name="Straight Arrow Connector 43">
+            <a:extLst>
+              <a:ext uri="{FF2B5EF4-FFF2-40B4-BE49-F238E27FC236}">
+                <a16:creationId xmlns:a16="http://schemas.microsoft.com/office/drawing/2014/main" id="{F9603B37-26AA-49AB-A362-509AB90999AA}"/>
               </a:ext>
             </a:extLst>
           </p:cNvPr>
           <p:cNvCxnSpPr>
             <a:cxnSpLocks/>
-            <a:endCxn id="19" idx="0"/>
           </p:cNvCxnSpPr>
           <p:nvPr/>
         </p:nvCxnSpPr>
         <p:spPr>
           <a:xfrm>
-            <a:off x="5924565" y="2522788"/>
-            <a:ext cx="0" cy="325244"/>
+            <a:off x="3698696" y="4495824"/>
+            <a:ext cx="0" cy="761235"/>
           </a:xfrm>
           <a:prstGeom prst="straightConnector1">
             <a:avLst/>
@@ -13417,96 +13197,6 @@
           </a:fontRef>
         </p:style>
       </p:cxnSp>
-      <p:cxnSp>
-        <p:nvCxnSpPr>
-          <p:cNvPr id="42" name="Straight Arrow Connector 41">
-            <a:extLst>
-              <a:ext uri="{FF2B5EF4-FFF2-40B4-BE49-F238E27FC236}">
-                <a16:creationId xmlns:a16="http://schemas.microsoft.com/office/drawing/2014/main" id="{F741E4DF-D753-446A-87BF-1C306BF096FC}"/>
-              </a:ext>
-            </a:extLst>
-          </p:cNvPr>
-          <p:cNvCxnSpPr>
-            <a:cxnSpLocks/>
-            <a:stCxn id="25" idx="2"/>
-          </p:cNvCxnSpPr>
-          <p:nvPr/>
-        </p:nvCxnSpPr>
-        <p:spPr>
-          <a:xfrm flipH="1">
-            <a:off x="1981071" y="3603161"/>
-            <a:ext cx="1" cy="1392216"/>
-          </a:xfrm>
-          <a:prstGeom prst="straightConnector1">
-            <a:avLst/>
-          </a:prstGeom>
-          <a:ln>
-            <a:solidFill>
-              <a:schemeClr val="tx1"/>
-            </a:solidFill>
-            <a:tailEnd type="stealth" w="med" len="lg"/>
-          </a:ln>
-        </p:spPr>
-        <p:style>
-          <a:lnRef idx="1">
-            <a:schemeClr val="accent1"/>
-          </a:lnRef>
-          <a:fillRef idx="0">
-            <a:schemeClr val="accent1"/>
-          </a:fillRef>
-          <a:effectRef idx="0">
-            <a:schemeClr val="accent1"/>
-          </a:effectRef>
-          <a:fontRef idx="minor">
-            <a:schemeClr val="tx1"/>
-          </a:fontRef>
-        </p:style>
-      </p:cxnSp>
-      <p:cxnSp>
-        <p:nvCxnSpPr>
-          <p:cNvPr id="44" name="Straight Arrow Connector 43">
-            <a:extLst>
-              <a:ext uri="{FF2B5EF4-FFF2-40B4-BE49-F238E27FC236}">
-                <a16:creationId xmlns:a16="http://schemas.microsoft.com/office/drawing/2014/main" id="{F9603B37-26AA-49AB-A362-509AB90999AA}"/>
-              </a:ext>
-            </a:extLst>
-          </p:cNvPr>
-          <p:cNvCxnSpPr>
-            <a:cxnSpLocks/>
-            <a:endCxn id="50" idx="0"/>
-          </p:cNvCxnSpPr>
-          <p:nvPr/>
-        </p:nvCxnSpPr>
-        <p:spPr>
-          <a:xfrm>
-            <a:off x="4296697" y="3603161"/>
-            <a:ext cx="0" cy="1392216"/>
-          </a:xfrm>
-          <a:prstGeom prst="straightConnector1">
-            <a:avLst/>
-          </a:prstGeom>
-          <a:ln>
-            <a:solidFill>
-              <a:schemeClr val="tx1"/>
-            </a:solidFill>
-            <a:tailEnd type="stealth" w="med" len="lg"/>
-          </a:ln>
-        </p:spPr>
-        <p:style>
-          <a:lnRef idx="1">
-            <a:schemeClr val="accent1"/>
-          </a:lnRef>
-          <a:fillRef idx="0">
-            <a:schemeClr val="accent1"/>
-          </a:fillRef>
-          <a:effectRef idx="0">
-            <a:schemeClr val="accent1"/>
-          </a:effectRef>
-          <a:fontRef idx="minor">
-            <a:schemeClr val="tx1"/>
-          </a:fontRef>
-        </p:style>
-      </p:cxnSp>
       <p:sp>
         <p:nvSpPr>
           <p:cNvPr id="3" name="Date Placeholder 2">
@@ -13523,16 +13213,21 @@
             <p:ph type="dt" sz="half" idx="10"/>
           </p:nvPr>
         </p:nvSpPr>
-        <p:spPr/>
+        <p:spPr>
+          <a:xfrm>
+            <a:off x="326617" y="6377125"/>
+            <a:ext cx="2743200" cy="365125"/>
+          </a:xfrm>
+        </p:spPr>
         <p:txBody>
           <a:bodyPr/>
           <a:lstStyle/>
           <a:p>
             <a:fld id="{8BA880BD-A575-42CB-9D5B-E3294FC391E7}" type="datetime1">
               <a:rPr lang="de-DE" smtClean="0"/>
-              <a:t>06.04.20</a:t>
+              <a:t>29.04.20</a:t>
             </a:fld>
-            <a:endParaRPr lang="de-DE"/>
+            <a:endParaRPr lang="de-DE" dirty="0"/>
           </a:p>
         </p:txBody>
       </p:sp>
@@ -13584,7 +13279,7 @@
         </p:nvSpPr>
         <p:spPr>
           <a:xfrm>
-            <a:off x="460695" y="4995377"/>
+            <a:off x="460695" y="5257059"/>
             <a:ext cx="7672003" cy="756954"/>
           </a:xfrm>
           <a:prstGeom prst="rect">
@@ -13880,8 +13575,8 @@
         </p:nvCxnSpPr>
         <p:spPr>
           <a:xfrm flipV="1">
-            <a:off x="2803660" y="5752331"/>
-            <a:ext cx="0" cy="305182"/>
+            <a:off x="2803660" y="6014013"/>
+            <a:ext cx="0" cy="259462"/>
           </a:xfrm>
           <a:prstGeom prst="straightConnector1">
             <a:avLst/>
@@ -13925,8 +13620,8 @@
         </p:nvCxnSpPr>
         <p:spPr>
           <a:xfrm>
-            <a:off x="6486168" y="4682511"/>
-            <a:ext cx="0" cy="335168"/>
+            <a:off x="5282936" y="5022904"/>
+            <a:ext cx="0" cy="255373"/>
           </a:xfrm>
           <a:prstGeom prst="straightConnector1">
             <a:avLst/>
@@ -13969,9 +13664,9 @@
           <p:nvPr/>
         </p:nvCxnSpPr>
         <p:spPr>
-          <a:xfrm flipV="1">
-            <a:off x="5807311" y="5752331"/>
-            <a:ext cx="0" cy="305182"/>
+          <a:xfrm flipH="1" flipV="1">
+            <a:off x="5457989" y="6014013"/>
+            <a:ext cx="1" cy="259461"/>
           </a:xfrm>
           <a:prstGeom prst="straightConnector1">
             <a:avLst/>
@@ -14015,8 +13710,8 @@
         </p:nvCxnSpPr>
         <p:spPr>
           <a:xfrm flipV="1">
-            <a:off x="6486168" y="3603161"/>
-            <a:ext cx="0" cy="324221"/>
+            <a:off x="5282936" y="4495824"/>
+            <a:ext cx="0" cy="254254"/>
           </a:xfrm>
           <a:prstGeom prst="straightConnector1">
             <a:avLst/>
@@ -14061,7 +13756,7 @@
         <p:spPr>
           <a:xfrm>
             <a:off x="10732828" y="1370595"/>
-            <a:ext cx="0" cy="328326"/>
+            <a:ext cx="0" cy="267942"/>
           </a:xfrm>
           <a:prstGeom prst="straightConnector1">
             <a:avLst/>
@@ -14266,51 +13961,6 @@
       </p:sp>
       <p:cxnSp>
         <p:nvCxnSpPr>
-          <p:cNvPr id="102" name="Straight Arrow Connector 101">
-            <a:extLst>
-              <a:ext uri="{FF2B5EF4-FFF2-40B4-BE49-F238E27FC236}">
-                <a16:creationId xmlns:a16="http://schemas.microsoft.com/office/drawing/2014/main" id="{2CBDC088-01B0-C14A-AC19-D7A7273655C8}"/>
-              </a:ext>
-            </a:extLst>
-          </p:cNvPr>
-          <p:cNvCxnSpPr>
-            <a:cxnSpLocks/>
-            <a:stCxn id="101" idx="2"/>
-          </p:cNvCxnSpPr>
-          <p:nvPr/>
-        </p:nvCxnSpPr>
-        <p:spPr>
-          <a:xfrm>
-            <a:off x="6959607" y="749662"/>
-            <a:ext cx="7392" cy="980797"/>
-          </a:xfrm>
-          <a:prstGeom prst="straightConnector1">
-            <a:avLst/>
-          </a:prstGeom>
-          <a:ln>
-            <a:solidFill>
-              <a:schemeClr val="tx1"/>
-            </a:solidFill>
-            <a:tailEnd type="stealth" w="med" len="lg"/>
-          </a:ln>
-        </p:spPr>
-        <p:style>
-          <a:lnRef idx="1">
-            <a:schemeClr val="accent1"/>
-          </a:lnRef>
-          <a:fillRef idx="0">
-            <a:schemeClr val="accent1"/>
-          </a:fillRef>
-          <a:effectRef idx="0">
-            <a:schemeClr val="accent1"/>
-          </a:effectRef>
-          <a:fontRef idx="minor">
-            <a:schemeClr val="tx1"/>
-          </a:fontRef>
-        </p:style>
-      </p:cxnSp>
-      <p:cxnSp>
-        <p:nvCxnSpPr>
           <p:cNvPr id="105" name="Straight Arrow Connector 104">
             <a:extLst>
               <a:ext uri="{FF2B5EF4-FFF2-40B4-BE49-F238E27FC236}">
@@ -14327,52 +13977,7 @@
         <p:spPr>
           <a:xfrm>
             <a:off x="8786124" y="755656"/>
-            <a:ext cx="673262" cy="939188"/>
-          </a:xfrm>
-          <a:prstGeom prst="straightConnector1">
-            <a:avLst/>
-          </a:prstGeom>
-          <a:ln>
-            <a:solidFill>
-              <a:schemeClr val="tx1"/>
-            </a:solidFill>
-            <a:tailEnd type="stealth" w="med" len="lg"/>
-          </a:ln>
-        </p:spPr>
-        <p:style>
-          <a:lnRef idx="1">
-            <a:schemeClr val="accent1"/>
-          </a:lnRef>
-          <a:fillRef idx="0">
-            <a:schemeClr val="accent1"/>
-          </a:fillRef>
-          <a:effectRef idx="0">
-            <a:schemeClr val="accent1"/>
-          </a:effectRef>
-          <a:fontRef idx="minor">
-            <a:schemeClr val="tx1"/>
-          </a:fontRef>
-        </p:style>
-      </p:cxnSp>
-      <p:cxnSp>
-        <p:nvCxnSpPr>
-          <p:cNvPr id="116" name="Straight Arrow Connector 115">
-            <a:extLst>
-              <a:ext uri="{FF2B5EF4-FFF2-40B4-BE49-F238E27FC236}">
-                <a16:creationId xmlns:a16="http://schemas.microsoft.com/office/drawing/2014/main" id="{A115013E-4416-0C4B-82AA-4E31FD3A7E37}"/>
-              </a:ext>
-            </a:extLst>
-          </p:cNvPr>
-          <p:cNvCxnSpPr>
-            <a:cxnSpLocks/>
-            <a:stCxn id="11" idx="2"/>
-          </p:cNvCxnSpPr>
-          <p:nvPr/>
-        </p:nvCxnSpPr>
-        <p:spPr>
-          <a:xfrm flipH="1">
-            <a:off x="7689496" y="1370595"/>
-            <a:ext cx="3043332" cy="329585"/>
+            <a:ext cx="598624" cy="882881"/>
           </a:xfrm>
           <a:prstGeom prst="straightConnector1">
             <a:avLst/>
@@ -14461,23 +14066,23 @@
       </p:sp>
       <p:cxnSp>
         <p:nvCxnSpPr>
-          <p:cNvPr id="164" name="Straight Arrow Connector 163">
-            <a:extLst>
-              <a:ext uri="{FF2B5EF4-FFF2-40B4-BE49-F238E27FC236}">
-                <a16:creationId xmlns:a16="http://schemas.microsoft.com/office/drawing/2014/main" id="{A572ED0C-BC4D-5746-8E80-C357C81339A8}"/>
+          <p:cNvPr id="167" name="Straight Arrow Connector 166">
+            <a:extLst>
+              <a:ext uri="{FF2B5EF4-FFF2-40B4-BE49-F238E27FC236}">
+                <a16:creationId xmlns:a16="http://schemas.microsoft.com/office/drawing/2014/main" id="{BB4286E7-9A9E-9E4E-A5B6-F31710DB405C}"/>
               </a:ext>
             </a:extLst>
           </p:cNvPr>
           <p:cNvCxnSpPr>
             <a:cxnSpLocks/>
-            <a:stCxn id="154" idx="2"/>
+            <a:stCxn id="101" idx="2"/>
           </p:cNvCxnSpPr>
           <p:nvPr/>
         </p:nvCxnSpPr>
         <p:spPr>
-          <a:xfrm flipH="1">
-            <a:off x="7292441" y="755656"/>
-            <a:ext cx="1493683" cy="951176"/>
+          <a:xfrm>
+            <a:off x="6959607" y="749662"/>
+            <a:ext cx="2149866" cy="882881"/>
           </a:xfrm>
           <a:prstGeom prst="straightConnector1">
             <a:avLst/>
@@ -14506,69 +14111,22 @@
       </p:cxnSp>
       <p:cxnSp>
         <p:nvCxnSpPr>
-          <p:cNvPr id="167" name="Straight Arrow Connector 166">
-            <a:extLst>
-              <a:ext uri="{FF2B5EF4-FFF2-40B4-BE49-F238E27FC236}">
-                <a16:creationId xmlns:a16="http://schemas.microsoft.com/office/drawing/2014/main" id="{BB4286E7-9A9E-9E4E-A5B6-F31710DB405C}"/>
+          <p:cNvPr id="179" name="Straight Arrow Connector 178">
+            <a:extLst>
+              <a:ext uri="{FF2B5EF4-FFF2-40B4-BE49-F238E27FC236}">
+                <a16:creationId xmlns:a16="http://schemas.microsoft.com/office/drawing/2014/main" id="{5076A7BF-B6CF-E14F-B614-D3C8B240309D}"/>
               </a:ext>
             </a:extLst>
           </p:cNvPr>
           <p:cNvCxnSpPr>
             <a:cxnSpLocks/>
-            <a:stCxn id="101" idx="2"/>
           </p:cNvCxnSpPr>
           <p:nvPr/>
         </p:nvCxnSpPr>
         <p:spPr>
-          <a:xfrm>
-            <a:off x="6959607" y="749662"/>
-            <a:ext cx="2194680" cy="949259"/>
-          </a:xfrm>
-          <a:prstGeom prst="straightConnector1">
-            <a:avLst/>
-          </a:prstGeom>
-          <a:ln>
-            <a:solidFill>
-              <a:schemeClr val="tx1"/>
-            </a:solidFill>
-            <a:tailEnd type="stealth" w="med" len="lg"/>
-          </a:ln>
-        </p:spPr>
-        <p:style>
-          <a:lnRef idx="1">
-            <a:schemeClr val="accent1"/>
-          </a:lnRef>
-          <a:fillRef idx="0">
-            <a:schemeClr val="accent1"/>
-          </a:fillRef>
-          <a:effectRef idx="0">
-            <a:schemeClr val="accent1"/>
-          </a:effectRef>
-          <a:fontRef idx="minor">
-            <a:schemeClr val="tx1"/>
-          </a:fontRef>
-        </p:style>
-      </p:cxnSp>
-      <p:cxnSp>
-        <p:nvCxnSpPr>
-          <p:cNvPr id="179" name="Straight Arrow Connector 178">
-            <a:extLst>
-              <a:ext uri="{FF2B5EF4-FFF2-40B4-BE49-F238E27FC236}">
-                <a16:creationId xmlns:a16="http://schemas.microsoft.com/office/drawing/2014/main" id="{5076A7BF-B6CF-E14F-B614-D3C8B240309D}"/>
-              </a:ext>
-            </a:extLst>
-          </p:cNvPr>
-          <p:cNvCxnSpPr>
-            <a:cxnSpLocks/>
-            <a:stCxn id="12" idx="3"/>
-            <a:endCxn id="14" idx="1"/>
-          </p:cNvCxnSpPr>
-          <p:nvPr/>
-        </p:nvCxnSpPr>
-        <p:spPr>
-          <a:xfrm>
-            <a:off x="8132717" y="2111813"/>
-            <a:ext cx="662060" cy="74479"/>
+          <a:xfrm flipV="1">
+            <a:off x="8132717" y="1960762"/>
+            <a:ext cx="662060" cy="1652"/>
           </a:xfrm>
           <a:prstGeom prst="straightConnector1">
             <a:avLst/>
@@ -14609,8 +14167,8 @@
         </p:nvSpPr>
         <p:spPr>
           <a:xfrm>
-            <a:off x="309985" y="1524087"/>
-            <a:ext cx="8039356" cy="5197388"/>
+            <a:off x="309985" y="1225250"/>
+            <a:ext cx="8039356" cy="5496225"/>
           </a:xfrm>
           <a:prstGeom prst="rect">
             <a:avLst/>
@@ -14667,7 +14225,7 @@
         <p:spPr>
           <a:xfrm>
             <a:off x="8564316" y="890015"/>
-            <a:ext cx="3317623" cy="2538985"/>
+            <a:ext cx="3317623" cy="2680644"/>
           </a:xfrm>
           <a:prstGeom prst="rect">
             <a:avLst/>
@@ -14709,6 +14267,970 @@
           </a:p>
         </p:txBody>
       </p:sp>
+      <p:sp>
+        <p:nvSpPr>
+          <p:cNvPr id="45" name="Rectangle 44">
+            <a:extLst>
+              <a:ext uri="{FF2B5EF4-FFF2-40B4-BE49-F238E27FC236}">
+                <a16:creationId xmlns:a16="http://schemas.microsoft.com/office/drawing/2014/main" id="{D6FA118D-46B4-8745-95AA-6A32C6AD0627}"/>
+              </a:ext>
+            </a:extLst>
+          </p:cNvPr>
+          <p:cNvSpPr/>
+          <p:nvPr/>
+        </p:nvSpPr>
+        <p:spPr>
+          <a:xfrm>
+            <a:off x="6164434" y="3744877"/>
+            <a:ext cx="1967664" cy="750947"/>
+          </a:xfrm>
+          <a:prstGeom prst="rect">
+            <a:avLst/>
+          </a:prstGeom>
+          <a:solidFill>
+            <a:schemeClr val="accent1">
+              <a:lumMod val="20000"/>
+              <a:lumOff val="80000"/>
+            </a:schemeClr>
+          </a:solidFill>
+          <a:ln>
+            <a:solidFill>
+              <a:schemeClr val="tx1"/>
+            </a:solidFill>
+          </a:ln>
+          <a:effectLst/>
+        </p:spPr>
+        <p:style>
+          <a:lnRef idx="2">
+            <a:schemeClr val="accent1">
+              <a:shade val="50000"/>
+            </a:schemeClr>
+          </a:lnRef>
+          <a:fillRef idx="1">
+            <a:schemeClr val="accent1"/>
+          </a:fillRef>
+          <a:effectRef idx="0">
+            <a:schemeClr val="accent1"/>
+          </a:effectRef>
+          <a:fontRef idx="minor">
+            <a:schemeClr val="lt1"/>
+          </a:fontRef>
+        </p:style>
+        <p:txBody>
+          <a:bodyPr rtlCol="0" anchor="ctr"/>
+          <a:lstStyle/>
+          <a:p>
+            <a:pPr algn="ctr"/>
+            <a:r>
+              <a:rPr lang="de-DE" dirty="0" err="1">
+                <a:solidFill>
+                  <a:schemeClr val="tx1"/>
+                </a:solidFill>
+              </a:rPr>
+              <a:t>MethodProvider</a:t>
+            </a:r>
+            <a:r>
+              <a:rPr lang="de-DE" dirty="0">
+                <a:solidFill>
+                  <a:schemeClr val="tx1"/>
+                </a:solidFill>
+              </a:rPr>
+              <a:t> </a:t>
+            </a:r>
+          </a:p>
+          <a:p>
+            <a:pPr algn="ctr"/>
+            <a:r>
+              <a:rPr lang="de-DE" sz="1200" dirty="0">
+                <a:solidFill>
+                  <a:schemeClr val="tx1"/>
+                </a:solidFill>
+              </a:rPr>
+              <a:t>Base </a:t>
+            </a:r>
+            <a:r>
+              <a:rPr lang="de-DE" sz="1200" dirty="0" err="1">
+                <a:solidFill>
+                  <a:schemeClr val="tx1"/>
+                </a:solidFill>
+              </a:rPr>
+              <a:t>class</a:t>
+            </a:r>
+            <a:r>
+              <a:rPr lang="de-DE" sz="1200" dirty="0">
+                <a:solidFill>
+                  <a:schemeClr val="tx1"/>
+                </a:solidFill>
+              </a:rPr>
+              <a:t> </a:t>
+            </a:r>
+            <a:r>
+              <a:rPr lang="de-DE" sz="1200" dirty="0" err="1">
+                <a:solidFill>
+                  <a:schemeClr val="tx1"/>
+                </a:solidFill>
+              </a:rPr>
+              <a:t>for</a:t>
+            </a:r>
+            <a:r>
+              <a:rPr lang="de-DE" sz="1200" dirty="0">
+                <a:solidFill>
+                  <a:schemeClr val="tx1"/>
+                </a:solidFill>
+              </a:rPr>
+              <a:t> </a:t>
+            </a:r>
+            <a:r>
+              <a:rPr lang="de-DE" sz="1200" dirty="0" err="1">
+                <a:solidFill>
+                  <a:schemeClr val="tx1"/>
+                </a:solidFill>
+              </a:rPr>
+              <a:t>user</a:t>
+            </a:r>
+            <a:r>
+              <a:rPr lang="de-DE" sz="1200" dirty="0">
+                <a:solidFill>
+                  <a:schemeClr val="tx1"/>
+                </a:solidFill>
+              </a:rPr>
+              <a:t> </a:t>
+            </a:r>
+            <a:r>
+              <a:rPr lang="de-DE" sz="1200" dirty="0" err="1">
+                <a:solidFill>
+                  <a:schemeClr val="tx1"/>
+                </a:solidFill>
+              </a:rPr>
+              <a:t>providers</a:t>
+            </a:r>
+            <a:r>
+              <a:rPr lang="de-DE" sz="1200" dirty="0">
+                <a:solidFill>
+                  <a:schemeClr val="tx1"/>
+                </a:solidFill>
+              </a:rPr>
+              <a:t> </a:t>
+            </a:r>
+            <a:r>
+              <a:rPr lang="de-DE" sz="1200" dirty="0" err="1">
+                <a:solidFill>
+                  <a:schemeClr val="tx1"/>
+                </a:solidFill>
+              </a:rPr>
+              <a:t>for</a:t>
+            </a:r>
+            <a:r>
+              <a:rPr lang="de-DE" sz="1200" dirty="0">
+                <a:solidFill>
+                  <a:schemeClr val="tx1"/>
+                </a:solidFill>
+              </a:rPr>
+              <a:t> </a:t>
+            </a:r>
+            <a:r>
+              <a:rPr lang="de-DE" sz="1200" dirty="0" err="1">
+                <a:solidFill>
+                  <a:schemeClr val="tx1"/>
+                </a:solidFill>
+              </a:rPr>
+              <a:t>invoke</a:t>
+            </a:r>
+            <a:r>
+              <a:rPr lang="de-DE" sz="1200" dirty="0">
+                <a:solidFill>
+                  <a:schemeClr val="tx1"/>
+                </a:solidFill>
+              </a:rPr>
+              <a:t> </a:t>
+            </a:r>
+            <a:r>
+              <a:rPr lang="de-DE" sz="1200" dirty="0" err="1">
+                <a:solidFill>
+                  <a:schemeClr val="tx1"/>
+                </a:solidFill>
+              </a:rPr>
+              <a:t>method</a:t>
+            </a:r>
+            <a:endParaRPr lang="de-DE" sz="1200" dirty="0">
+              <a:solidFill>
+                <a:schemeClr val="tx1"/>
+              </a:solidFill>
+            </a:endParaRPr>
+          </a:p>
+        </p:txBody>
+      </p:sp>
+      <p:sp>
+        <p:nvSpPr>
+          <p:cNvPr id="68" name="Rectangle 67">
+            <a:extLst>
+              <a:ext uri="{FF2B5EF4-FFF2-40B4-BE49-F238E27FC236}">
+                <a16:creationId xmlns:a16="http://schemas.microsoft.com/office/drawing/2014/main" id="{1DFA5020-366F-2E4B-A19D-F65CFEDBB984}"/>
+              </a:ext>
+            </a:extLst>
+          </p:cNvPr>
+          <p:cNvSpPr/>
+          <p:nvPr/>
+        </p:nvSpPr>
+        <p:spPr>
+          <a:xfrm>
+            <a:off x="6637658" y="4750078"/>
+            <a:ext cx="1489248" cy="272826"/>
+          </a:xfrm>
+          <a:prstGeom prst="rect">
+            <a:avLst/>
+          </a:prstGeom>
+          <a:solidFill>
+            <a:schemeClr val="accent4">
+              <a:lumMod val="40000"/>
+              <a:lumOff val="60000"/>
+            </a:schemeClr>
+          </a:solidFill>
+          <a:ln>
+            <a:solidFill>
+              <a:schemeClr val="tx1"/>
+            </a:solidFill>
+          </a:ln>
+          <a:effectLst/>
+        </p:spPr>
+        <p:style>
+          <a:lnRef idx="2">
+            <a:schemeClr val="accent1">
+              <a:shade val="50000"/>
+            </a:schemeClr>
+          </a:lnRef>
+          <a:fillRef idx="1">
+            <a:schemeClr val="accent1"/>
+          </a:fillRef>
+          <a:effectRef idx="0">
+            <a:schemeClr val="accent1"/>
+          </a:effectRef>
+          <a:fontRef idx="minor">
+            <a:schemeClr val="lt1"/>
+          </a:fontRef>
+        </p:style>
+        <p:txBody>
+          <a:bodyPr rtlCol="0" anchor="ctr"/>
+          <a:lstStyle/>
+          <a:p>
+            <a:pPr algn="ctr"/>
+            <a:r>
+              <a:rPr lang="de-DE" sz="1400" dirty="0">
+                <a:solidFill>
+                  <a:schemeClr val="tx1"/>
+                </a:solidFill>
+              </a:rPr>
+              <a:t>&lt;User Provider&gt;</a:t>
+            </a:r>
+          </a:p>
+        </p:txBody>
+      </p:sp>
+      <p:cxnSp>
+        <p:nvCxnSpPr>
+          <p:cNvPr id="69" name="Straight Arrow Connector 68">
+            <a:extLst>
+              <a:ext uri="{FF2B5EF4-FFF2-40B4-BE49-F238E27FC236}">
+                <a16:creationId xmlns:a16="http://schemas.microsoft.com/office/drawing/2014/main" id="{5FE82714-236A-9541-9A38-B823755D638D}"/>
+              </a:ext>
+            </a:extLst>
+          </p:cNvPr>
+          <p:cNvCxnSpPr>
+            <a:cxnSpLocks/>
+            <a:stCxn id="68" idx="0"/>
+          </p:cNvCxnSpPr>
+          <p:nvPr/>
+        </p:nvCxnSpPr>
+        <p:spPr>
+          <a:xfrm flipV="1">
+            <a:off x="7382282" y="4495824"/>
+            <a:ext cx="0" cy="254254"/>
+          </a:xfrm>
+          <a:prstGeom prst="straightConnector1">
+            <a:avLst/>
+          </a:prstGeom>
+          <a:ln w="19050">
+            <a:solidFill>
+              <a:schemeClr val="tx1"/>
+            </a:solidFill>
+            <a:tailEnd type="triangle" w="lg" len="lg"/>
+          </a:ln>
+        </p:spPr>
+        <p:style>
+          <a:lnRef idx="1">
+            <a:schemeClr val="accent1"/>
+          </a:lnRef>
+          <a:fillRef idx="0">
+            <a:schemeClr val="accent1"/>
+          </a:fillRef>
+          <a:effectRef idx="0">
+            <a:schemeClr val="accent1"/>
+          </a:effectRef>
+          <a:fontRef idx="minor">
+            <a:schemeClr val="tx1"/>
+          </a:fontRef>
+        </p:style>
+      </p:cxnSp>
+      <p:cxnSp>
+        <p:nvCxnSpPr>
+          <p:cNvPr id="72" name="Straight Arrow Connector 71">
+            <a:extLst>
+              <a:ext uri="{FF2B5EF4-FFF2-40B4-BE49-F238E27FC236}">
+                <a16:creationId xmlns:a16="http://schemas.microsoft.com/office/drawing/2014/main" id="{0B7B56A3-654F-5D49-840A-57B915E194B5}"/>
+              </a:ext>
+            </a:extLst>
+          </p:cNvPr>
+          <p:cNvCxnSpPr>
+            <a:cxnSpLocks/>
+            <a:stCxn id="68" idx="2"/>
+          </p:cNvCxnSpPr>
+          <p:nvPr/>
+        </p:nvCxnSpPr>
+        <p:spPr>
+          <a:xfrm>
+            <a:off x="7382282" y="5022904"/>
+            <a:ext cx="0" cy="255373"/>
+          </a:xfrm>
+          <a:prstGeom prst="straightConnector1">
+            <a:avLst/>
+          </a:prstGeom>
+          <a:ln>
+            <a:solidFill>
+              <a:schemeClr val="tx1"/>
+            </a:solidFill>
+            <a:tailEnd type="stealth" w="med" len="lg"/>
+          </a:ln>
+        </p:spPr>
+        <p:style>
+          <a:lnRef idx="1">
+            <a:schemeClr val="accent1"/>
+          </a:lnRef>
+          <a:fillRef idx="0">
+            <a:schemeClr val="accent1"/>
+          </a:fillRef>
+          <a:effectRef idx="0">
+            <a:schemeClr val="accent1"/>
+          </a:effectRef>
+          <a:fontRef idx="minor">
+            <a:schemeClr val="tx1"/>
+          </a:fontRef>
+        </p:style>
+      </p:cxnSp>
+      <p:sp>
+        <p:nvSpPr>
+          <p:cNvPr id="89" name="Rectangle 88">
+            <a:extLst>
+              <a:ext uri="{FF2B5EF4-FFF2-40B4-BE49-F238E27FC236}">
+                <a16:creationId xmlns:a16="http://schemas.microsoft.com/office/drawing/2014/main" id="{287CCC9F-7DB7-F442-A038-67BE490EA189}"/>
+              </a:ext>
+            </a:extLst>
+          </p:cNvPr>
+          <p:cNvSpPr/>
+          <p:nvPr/>
+        </p:nvSpPr>
+        <p:spPr>
+          <a:xfrm>
+            <a:off x="461343" y="2313426"/>
+            <a:ext cx="7672021" cy="552896"/>
+          </a:xfrm>
+          <a:prstGeom prst="rect">
+            <a:avLst/>
+          </a:prstGeom>
+          <a:solidFill>
+            <a:schemeClr val="accent1">
+              <a:lumMod val="20000"/>
+              <a:lumOff val="80000"/>
+            </a:schemeClr>
+          </a:solidFill>
+          <a:ln>
+            <a:solidFill>
+              <a:schemeClr val="tx1"/>
+            </a:solidFill>
+          </a:ln>
+          <a:effectLst/>
+        </p:spPr>
+        <p:style>
+          <a:lnRef idx="2">
+            <a:schemeClr val="accent1">
+              <a:shade val="50000"/>
+            </a:schemeClr>
+          </a:lnRef>
+          <a:fillRef idx="1">
+            <a:schemeClr val="accent1"/>
+          </a:fillRef>
+          <a:effectRef idx="0">
+            <a:schemeClr val="accent1"/>
+          </a:effectRef>
+          <a:fontRef idx="minor">
+            <a:schemeClr val="lt1"/>
+          </a:fontRef>
+        </p:style>
+        <p:txBody>
+          <a:bodyPr rtlCol="0" anchor="ctr"/>
+          <a:lstStyle/>
+          <a:p>
+            <a:pPr algn="ctr"/>
+            <a:r>
+              <a:rPr lang="de-DE" dirty="0" err="1">
+                <a:solidFill>
+                  <a:schemeClr val="tx1"/>
+                </a:solidFill>
+              </a:rPr>
+              <a:t>ProviderDispatcher</a:t>
+            </a:r>
+            <a:endParaRPr lang="de-DE" dirty="0">
+              <a:solidFill>
+                <a:schemeClr val="tx1"/>
+              </a:solidFill>
+            </a:endParaRPr>
+          </a:p>
+          <a:p>
+            <a:pPr algn="ctr"/>
+            <a:r>
+              <a:rPr lang="de-DE" sz="1200" dirty="0" err="1">
+                <a:solidFill>
+                  <a:schemeClr val="tx1"/>
+                </a:solidFill>
+              </a:rPr>
+              <a:t>Has</a:t>
+            </a:r>
+            <a:r>
+              <a:rPr lang="de-DE" sz="1200" dirty="0">
+                <a:solidFill>
+                  <a:schemeClr val="tx1"/>
+                </a:solidFill>
+              </a:rPr>
+              <a:t> </a:t>
+            </a:r>
+            <a:r>
+              <a:rPr lang="de-DE" sz="1200" dirty="0" err="1">
+                <a:solidFill>
+                  <a:schemeClr val="tx1"/>
+                </a:solidFill>
+              </a:rPr>
+              <a:t>provider</a:t>
+            </a:r>
+            <a:r>
+              <a:rPr lang="de-DE" sz="1200" dirty="0">
+                <a:solidFill>
+                  <a:schemeClr val="tx1"/>
+                </a:solidFill>
+              </a:rPr>
+              <a:t> </a:t>
+            </a:r>
+            <a:r>
+              <a:rPr lang="de-DE" sz="1200" dirty="0" err="1">
+                <a:solidFill>
+                  <a:schemeClr val="tx1"/>
+                </a:solidFill>
+              </a:rPr>
+              <a:t>registry</a:t>
+            </a:r>
+            <a:r>
+              <a:rPr lang="de-DE" sz="1200" dirty="0">
+                <a:solidFill>
+                  <a:schemeClr val="tx1"/>
+                </a:solidFill>
+              </a:rPr>
+              <a:t>, </a:t>
+            </a:r>
+            <a:r>
+              <a:rPr lang="de-DE" sz="1200" dirty="0" err="1">
+                <a:solidFill>
+                  <a:schemeClr val="tx1"/>
+                </a:solidFill>
+              </a:rPr>
+              <a:t>calls</a:t>
+            </a:r>
+            <a:r>
+              <a:rPr lang="de-DE" sz="1200" dirty="0">
+                <a:solidFill>
+                  <a:schemeClr val="tx1"/>
+                </a:solidFill>
+              </a:rPr>
+              <a:t> </a:t>
+            </a:r>
+            <a:r>
+              <a:rPr lang="de-DE" sz="1200" dirty="0" err="1">
+                <a:solidFill>
+                  <a:schemeClr val="tx1"/>
+                </a:solidFill>
+              </a:rPr>
+              <a:t>providers</a:t>
+            </a:r>
+            <a:r>
+              <a:rPr lang="de-DE" sz="1200" dirty="0">
+                <a:solidFill>
+                  <a:schemeClr val="tx1"/>
+                </a:solidFill>
+              </a:rPr>
+              <a:t>, </a:t>
+            </a:r>
+            <a:r>
+              <a:rPr lang="de-DE" sz="1200" dirty="0" err="1">
+                <a:solidFill>
+                  <a:schemeClr val="tx1"/>
+                </a:solidFill>
+              </a:rPr>
+              <a:t>translates</a:t>
+            </a:r>
+            <a:r>
+              <a:rPr lang="de-DE" sz="1200" dirty="0">
+                <a:solidFill>
+                  <a:schemeClr val="tx1"/>
+                </a:solidFill>
+              </a:rPr>
+              <a:t> </a:t>
+            </a:r>
+            <a:r>
+              <a:rPr lang="de-DE" sz="1200" dirty="0" err="1">
+                <a:solidFill>
+                  <a:schemeClr val="tx1"/>
+                </a:solidFill>
+              </a:rPr>
+              <a:t>client</a:t>
+            </a:r>
+            <a:r>
+              <a:rPr lang="de-DE" sz="1200" dirty="0">
+                <a:solidFill>
+                  <a:schemeClr val="tx1"/>
+                </a:solidFill>
+              </a:rPr>
+              <a:t> </a:t>
+            </a:r>
+            <a:r>
+              <a:rPr lang="de-DE" sz="1200" dirty="0" err="1">
+                <a:solidFill>
+                  <a:schemeClr val="tx1"/>
+                </a:solidFill>
+              </a:rPr>
+              <a:t>ops</a:t>
+            </a:r>
+            <a:r>
+              <a:rPr lang="de-DE" sz="1200" dirty="0">
+                <a:solidFill>
+                  <a:schemeClr val="tx1"/>
+                </a:solidFill>
+              </a:rPr>
+              <a:t> </a:t>
+            </a:r>
+            <a:r>
+              <a:rPr lang="de-DE" sz="1200" dirty="0" err="1">
+                <a:solidFill>
+                  <a:schemeClr val="tx1"/>
+                </a:solidFill>
+              </a:rPr>
+              <a:t>into</a:t>
+            </a:r>
+            <a:r>
+              <a:rPr lang="de-DE" sz="1200" dirty="0">
+                <a:solidFill>
+                  <a:schemeClr val="tx1"/>
+                </a:solidFill>
+              </a:rPr>
+              <a:t> </a:t>
+            </a:r>
+            <a:r>
+              <a:rPr lang="de-DE" sz="1200" dirty="0" err="1">
+                <a:solidFill>
+                  <a:schemeClr val="tx1"/>
+                </a:solidFill>
+              </a:rPr>
+              <a:t>provider</a:t>
+            </a:r>
+            <a:r>
+              <a:rPr lang="de-DE" sz="1200" dirty="0">
+                <a:solidFill>
+                  <a:schemeClr val="tx1"/>
+                </a:solidFill>
+              </a:rPr>
+              <a:t> </a:t>
+            </a:r>
+            <a:r>
+              <a:rPr lang="de-DE" sz="1200" dirty="0" err="1">
+                <a:solidFill>
+                  <a:schemeClr val="tx1"/>
+                </a:solidFill>
+              </a:rPr>
+              <a:t>calls</a:t>
+            </a:r>
+            <a:r>
+              <a:rPr lang="de-DE" sz="1200" dirty="0">
+                <a:solidFill>
+                  <a:schemeClr val="tx1"/>
+                </a:solidFill>
+              </a:rPr>
+              <a:t> (CIMOM)</a:t>
+            </a:r>
+          </a:p>
+        </p:txBody>
+      </p:sp>
+      <p:cxnSp>
+        <p:nvCxnSpPr>
+          <p:cNvPr id="94" name="Straight Arrow Connector 93">
+            <a:extLst>
+              <a:ext uri="{FF2B5EF4-FFF2-40B4-BE49-F238E27FC236}">
+                <a16:creationId xmlns:a16="http://schemas.microsoft.com/office/drawing/2014/main" id="{8AEC6DFA-1FAD-9F42-B651-2A5FCB8DDF42}"/>
+              </a:ext>
+            </a:extLst>
+          </p:cNvPr>
+          <p:cNvCxnSpPr>
+            <a:cxnSpLocks/>
+            <a:stCxn id="12" idx="2"/>
+            <a:endCxn id="89" idx="0"/>
+          </p:cNvCxnSpPr>
+          <p:nvPr/>
+        </p:nvCxnSpPr>
+        <p:spPr>
+          <a:xfrm>
+            <a:off x="4296707" y="2098662"/>
+            <a:ext cx="647" cy="214764"/>
+          </a:xfrm>
+          <a:prstGeom prst="straightConnector1">
+            <a:avLst/>
+          </a:prstGeom>
+          <a:ln>
+            <a:solidFill>
+              <a:schemeClr val="tx1"/>
+            </a:solidFill>
+            <a:tailEnd type="stealth" w="med" len="lg"/>
+          </a:ln>
+        </p:spPr>
+        <p:style>
+          <a:lnRef idx="1">
+            <a:schemeClr val="accent1"/>
+          </a:lnRef>
+          <a:fillRef idx="0">
+            <a:schemeClr val="accent1"/>
+          </a:fillRef>
+          <a:effectRef idx="0">
+            <a:schemeClr val="accent1"/>
+          </a:effectRef>
+          <a:fontRef idx="minor">
+            <a:schemeClr val="tx1"/>
+          </a:fontRef>
+        </p:style>
+      </p:cxnSp>
+      <p:cxnSp>
+        <p:nvCxnSpPr>
+          <p:cNvPr id="42" name="Straight Arrow Connector 41">
+            <a:extLst>
+              <a:ext uri="{FF2B5EF4-FFF2-40B4-BE49-F238E27FC236}">
+                <a16:creationId xmlns:a16="http://schemas.microsoft.com/office/drawing/2014/main" id="{F741E4DF-D753-446A-87BF-1C306BF096FC}"/>
+              </a:ext>
+            </a:extLst>
+          </p:cNvPr>
+          <p:cNvCxnSpPr>
+            <a:cxnSpLocks/>
+            <a:stCxn id="25" idx="2"/>
+          </p:cNvCxnSpPr>
+          <p:nvPr/>
+        </p:nvCxnSpPr>
+        <p:spPr>
+          <a:xfrm>
+            <a:off x="1632179" y="4501831"/>
+            <a:ext cx="0" cy="755228"/>
+          </a:xfrm>
+          <a:prstGeom prst="straightConnector1">
+            <a:avLst/>
+          </a:prstGeom>
+          <a:ln>
+            <a:solidFill>
+              <a:schemeClr val="tx1"/>
+            </a:solidFill>
+            <a:tailEnd type="stealth" w="med" len="lg"/>
+          </a:ln>
+        </p:spPr>
+        <p:style>
+          <a:lnRef idx="1">
+            <a:schemeClr val="accent1"/>
+          </a:lnRef>
+          <a:fillRef idx="0">
+            <a:schemeClr val="accent1"/>
+          </a:fillRef>
+          <a:effectRef idx="0">
+            <a:schemeClr val="accent1"/>
+          </a:effectRef>
+          <a:fontRef idx="minor">
+            <a:schemeClr val="tx1"/>
+          </a:fontRef>
+        </p:style>
+      </p:cxnSp>
+      <p:cxnSp>
+        <p:nvCxnSpPr>
+          <p:cNvPr id="117" name="Straight Arrow Connector 116">
+            <a:extLst>
+              <a:ext uri="{FF2B5EF4-FFF2-40B4-BE49-F238E27FC236}">
+                <a16:creationId xmlns:a16="http://schemas.microsoft.com/office/drawing/2014/main" id="{A8CEB4FE-14D8-E240-A2EA-9D82341FEC1E}"/>
+              </a:ext>
+            </a:extLst>
+          </p:cNvPr>
+          <p:cNvCxnSpPr>
+            <a:cxnSpLocks/>
+            <a:endCxn id="11" idx="1"/>
+          </p:cNvCxnSpPr>
+          <p:nvPr/>
+        </p:nvCxnSpPr>
+        <p:spPr>
+          <a:xfrm flipV="1">
+            <a:off x="8141370" y="1185929"/>
+            <a:ext cx="1614702" cy="612049"/>
+          </a:xfrm>
+          <a:prstGeom prst="bentConnector3">
+            <a:avLst>
+              <a:gd name="adj1" fmla="val 19458"/>
+            </a:avLst>
+          </a:prstGeom>
+          <a:ln>
+            <a:solidFill>
+              <a:schemeClr val="tx1"/>
+            </a:solidFill>
+            <a:tailEnd type="stealth" w="med" len="lg"/>
+          </a:ln>
+        </p:spPr>
+        <p:style>
+          <a:lnRef idx="1">
+            <a:schemeClr val="accent1"/>
+          </a:lnRef>
+          <a:fillRef idx="0">
+            <a:schemeClr val="accent1"/>
+          </a:fillRef>
+          <a:effectRef idx="0">
+            <a:schemeClr val="accent1"/>
+          </a:effectRef>
+          <a:fontRef idx="minor">
+            <a:schemeClr val="tx1"/>
+          </a:fontRef>
+        </p:style>
+      </p:cxnSp>
+      <p:sp>
+        <p:nvSpPr>
+          <p:cNvPr id="46" name="Rectangle 45">
+            <a:extLst>
+              <a:ext uri="{FF2B5EF4-FFF2-40B4-BE49-F238E27FC236}">
+                <a16:creationId xmlns:a16="http://schemas.microsoft.com/office/drawing/2014/main" id="{0F40ED0C-A69B-304D-A1E1-9A0185857D12}"/>
+              </a:ext>
+            </a:extLst>
+          </p:cNvPr>
+          <p:cNvSpPr/>
+          <p:nvPr/>
+        </p:nvSpPr>
+        <p:spPr>
+          <a:xfrm>
+            <a:off x="444446" y="3059920"/>
+            <a:ext cx="7672021" cy="471141"/>
+          </a:xfrm>
+          <a:prstGeom prst="rect">
+            <a:avLst/>
+          </a:prstGeom>
+          <a:solidFill>
+            <a:schemeClr val="accent1">
+              <a:lumMod val="20000"/>
+              <a:lumOff val="80000"/>
+            </a:schemeClr>
+          </a:solidFill>
+          <a:ln>
+            <a:solidFill>
+              <a:schemeClr val="tx1"/>
+            </a:solidFill>
+          </a:ln>
+          <a:effectLst/>
+        </p:spPr>
+        <p:style>
+          <a:lnRef idx="2">
+            <a:schemeClr val="accent1">
+              <a:shade val="50000"/>
+            </a:schemeClr>
+          </a:lnRef>
+          <a:fillRef idx="1">
+            <a:schemeClr val="accent1"/>
+          </a:fillRef>
+          <a:effectRef idx="0">
+            <a:schemeClr val="accent1"/>
+          </a:effectRef>
+          <a:fontRef idx="minor">
+            <a:schemeClr val="lt1"/>
+          </a:fontRef>
+        </p:style>
+        <p:txBody>
+          <a:bodyPr rtlCol="0" anchor="ctr"/>
+          <a:lstStyle/>
+          <a:p>
+            <a:pPr algn="ctr"/>
+            <a:r>
+              <a:rPr lang="de-DE" i="1" dirty="0" err="1">
+                <a:solidFill>
+                  <a:schemeClr val="tx1"/>
+                </a:solidFill>
+              </a:rPr>
+              <a:t>BaseProvider</a:t>
+            </a:r>
+            <a:endParaRPr lang="de-DE" i="1" dirty="0">
+              <a:solidFill>
+                <a:schemeClr val="tx1"/>
+              </a:solidFill>
+            </a:endParaRPr>
+          </a:p>
+          <a:p>
+            <a:pPr algn="ctr"/>
+            <a:r>
+              <a:rPr lang="de-DE" sz="1200" dirty="0">
+                <a:solidFill>
+                  <a:schemeClr val="tx1"/>
+                </a:solidFill>
+              </a:rPr>
+              <a:t>Common </a:t>
+            </a:r>
+            <a:r>
+              <a:rPr lang="de-DE" sz="1200" dirty="0" err="1">
+                <a:solidFill>
+                  <a:schemeClr val="tx1"/>
+                </a:solidFill>
+              </a:rPr>
+              <a:t>methods</a:t>
+            </a:r>
+            <a:endParaRPr lang="de-DE" sz="1200" dirty="0">
+              <a:solidFill>
+                <a:schemeClr val="tx1"/>
+              </a:solidFill>
+            </a:endParaRPr>
+          </a:p>
+        </p:txBody>
+      </p:sp>
+      <p:cxnSp>
+        <p:nvCxnSpPr>
+          <p:cNvPr id="47" name="Straight Arrow Connector 46">
+            <a:extLst>
+              <a:ext uri="{FF2B5EF4-FFF2-40B4-BE49-F238E27FC236}">
+                <a16:creationId xmlns:a16="http://schemas.microsoft.com/office/drawing/2014/main" id="{BF2B0254-5732-664A-8390-049868D79E37}"/>
+              </a:ext>
+            </a:extLst>
+          </p:cNvPr>
+          <p:cNvCxnSpPr>
+            <a:cxnSpLocks/>
+            <a:stCxn id="45" idx="0"/>
+          </p:cNvCxnSpPr>
+          <p:nvPr/>
+        </p:nvCxnSpPr>
+        <p:spPr>
+          <a:xfrm flipV="1">
+            <a:off x="7148266" y="3531061"/>
+            <a:ext cx="0" cy="213816"/>
+          </a:xfrm>
+          <a:prstGeom prst="straightConnector1">
+            <a:avLst/>
+          </a:prstGeom>
+          <a:ln w="19050">
+            <a:solidFill>
+              <a:schemeClr val="tx1"/>
+            </a:solidFill>
+            <a:tailEnd type="triangle" w="lg" len="lg"/>
+          </a:ln>
+        </p:spPr>
+        <p:style>
+          <a:lnRef idx="1">
+            <a:schemeClr val="accent1"/>
+          </a:lnRef>
+          <a:fillRef idx="0">
+            <a:schemeClr val="accent1"/>
+          </a:fillRef>
+          <a:effectRef idx="0">
+            <a:schemeClr val="accent1"/>
+          </a:effectRef>
+          <a:fontRef idx="minor">
+            <a:schemeClr val="tx1"/>
+          </a:fontRef>
+        </p:style>
+      </p:cxnSp>
+      <p:cxnSp>
+        <p:nvCxnSpPr>
+          <p:cNvPr id="53" name="Straight Arrow Connector 52">
+            <a:extLst>
+              <a:ext uri="{FF2B5EF4-FFF2-40B4-BE49-F238E27FC236}">
+                <a16:creationId xmlns:a16="http://schemas.microsoft.com/office/drawing/2014/main" id="{4B069F8D-4958-D74F-A99F-315C302BC362}"/>
+              </a:ext>
+            </a:extLst>
+          </p:cNvPr>
+          <p:cNvCxnSpPr>
+            <a:cxnSpLocks/>
+            <a:stCxn id="19" idx="0"/>
+          </p:cNvCxnSpPr>
+          <p:nvPr/>
+        </p:nvCxnSpPr>
+        <p:spPr>
+          <a:xfrm flipH="1" flipV="1">
+            <a:off x="4465806" y="3531061"/>
+            <a:ext cx="1" cy="213817"/>
+          </a:xfrm>
+          <a:prstGeom prst="straightConnector1">
+            <a:avLst/>
+          </a:prstGeom>
+          <a:ln w="19050">
+            <a:solidFill>
+              <a:schemeClr val="tx1"/>
+            </a:solidFill>
+            <a:tailEnd type="triangle" w="lg" len="lg"/>
+          </a:ln>
+        </p:spPr>
+        <p:style>
+          <a:lnRef idx="1">
+            <a:schemeClr val="accent1"/>
+          </a:lnRef>
+          <a:fillRef idx="0">
+            <a:schemeClr val="accent1"/>
+          </a:fillRef>
+          <a:effectRef idx="0">
+            <a:schemeClr val="accent1"/>
+          </a:effectRef>
+          <a:fontRef idx="minor">
+            <a:schemeClr val="tx1"/>
+          </a:fontRef>
+        </p:style>
+      </p:cxnSp>
+      <p:cxnSp>
+        <p:nvCxnSpPr>
+          <p:cNvPr id="55" name="Straight Arrow Connector 54">
+            <a:extLst>
+              <a:ext uri="{FF2B5EF4-FFF2-40B4-BE49-F238E27FC236}">
+                <a16:creationId xmlns:a16="http://schemas.microsoft.com/office/drawing/2014/main" id="{E8CBDC50-41F3-5041-B009-71E1BAAEEC18}"/>
+              </a:ext>
+            </a:extLst>
+          </p:cNvPr>
+          <p:cNvCxnSpPr>
+            <a:cxnSpLocks/>
+            <a:stCxn id="25" idx="0"/>
+          </p:cNvCxnSpPr>
+          <p:nvPr/>
+        </p:nvCxnSpPr>
+        <p:spPr>
+          <a:xfrm flipV="1">
+            <a:off x="1632179" y="3531061"/>
+            <a:ext cx="0" cy="213816"/>
+          </a:xfrm>
+          <a:prstGeom prst="straightConnector1">
+            <a:avLst/>
+          </a:prstGeom>
+          <a:ln w="19050">
+            <a:solidFill>
+              <a:schemeClr val="tx1"/>
+            </a:solidFill>
+            <a:tailEnd type="triangle" w="lg" len="lg"/>
+          </a:ln>
+        </p:spPr>
+        <p:style>
+          <a:lnRef idx="1">
+            <a:schemeClr val="accent1"/>
+          </a:lnRef>
+          <a:fillRef idx="0">
+            <a:schemeClr val="accent1"/>
+          </a:fillRef>
+          <a:effectRef idx="0">
+            <a:schemeClr val="accent1"/>
+          </a:effectRef>
+          <a:fontRef idx="minor">
+            <a:schemeClr val="tx1"/>
+          </a:fontRef>
+        </p:style>
+      </p:cxnSp>
     </p:spTree>
     <p:extLst>
       <p:ext uri="{BB962C8B-B14F-4D97-AF65-F5344CB8AC3E}">
@@ -16321,7 +16843,7 @@
           <a:p>
             <a:fld id="{78389F4F-6C40-4F96-87B7-BED4E97E402E}" type="datetime1">
               <a:rPr lang="de-DE" smtClean="0"/>
-              <a:t>06.04.20</a:t>
+              <a:t>29.04.20</a:t>
             </a:fld>
             <a:endParaRPr lang="de-DE"/>
           </a:p>
@@ -17830,7 +18352,7 @@
           <a:p>
             <a:fld id="{BC6AA058-3889-4DB2-9948-474ED9D2A12D}" type="datetime1">
               <a:rPr lang="de-DE" smtClean="0"/>
-              <a:t>06.04.20</a:t>
+              <a:t>29.04.20</a:t>
             </a:fld>
             <a:endParaRPr lang="de-DE"/>
           </a:p>
@@ -19330,7 +19852,7 @@
           <a:p>
             <a:fld id="{DB3A2185-C9E4-47F0-B338-5BAEE950952F}" type="datetime1">
               <a:rPr lang="de-DE" smtClean="0"/>
-              <a:t>06.04.20</a:t>
+              <a:t>29.04.20</a:t>
             </a:fld>
             <a:endParaRPr lang="de-DE"/>
           </a:p>
@@ -20956,7 +21478,7 @@
           <a:p>
             <a:fld id="{798672D8-65DF-499B-A842-51542A7E172D}" type="datetime1">
               <a:rPr lang="de-DE" smtClean="0"/>
-              <a:t>06.04.20</a:t>
+              <a:t>29.04.20</a:t>
             </a:fld>
             <a:endParaRPr lang="de-DE"/>
           </a:p>
@@ -21255,7 +21777,7 @@
           <a:p>
             <a:fld id="{94E6E5F9-FA2C-486F-B41C-DBCB0089CD52}" type="datetime1">
               <a:rPr lang="de-DE" smtClean="0"/>
-              <a:t>06.04.20</a:t>
+              <a:t>29.04.20</a:t>
             </a:fld>
             <a:endParaRPr lang="de-DE"/>
           </a:p>
@@ -21576,7 +22098,7 @@
           <a:p>
             <a:fld id="{85740ED1-8AA2-4092-B43C-438AE914F9A2}" type="datetime1">
               <a:rPr lang="de-DE" smtClean="0"/>
-              <a:t>06.04.20</a:t>
+              <a:t>29.04.20</a:t>
             </a:fld>
             <a:endParaRPr lang="de-DE"/>
           </a:p>
@@ -21760,7 +22282,7 @@
           <a:p>
             <a:fld id="{FAA3CCC0-E02E-4FC1-BAC8-67AF25AE7EDE}" type="datetime1">
               <a:rPr lang="de-DE" smtClean="0"/>
-              <a:t>06.04.20</a:t>
+              <a:t>29.04.20</a:t>
             </a:fld>
             <a:endParaRPr lang="de-DE"/>
           </a:p>
@@ -22241,7 +22763,7 @@
           <a:p>
             <a:fld id="{9AAF2DF6-6D7F-4302-BF40-84F958537A75}" type="datetime1">
               <a:rPr lang="de-DE" smtClean="0"/>
-              <a:t>06.04.20</a:t>
+              <a:t>29.04.20</a:t>
             </a:fld>
             <a:endParaRPr lang="de-DE"/>
           </a:p>
@@ -22588,7 +23110,7 @@
           <a:p>
             <a:fld id="{C626F4F1-8903-476E-BAA6-D8F2BAFA8AB3}" type="datetime1">
               <a:rPr lang="de-DE" smtClean="0"/>
-              <a:t>06.04.20</a:t>
+              <a:t>29.04.20</a:t>
             </a:fld>
             <a:endParaRPr lang="de-DE"/>
           </a:p>
@@ -23090,7 +23612,7 @@
           <a:p>
             <a:fld id="{F8E8CA9D-7C99-4CD8-BBEB-B81CE0B4E5CB}" type="datetime1">
               <a:rPr lang="de-DE" smtClean="0"/>
-              <a:t>06.04.20</a:t>
+              <a:t>29.04.20</a:t>
             </a:fld>
             <a:endParaRPr lang="de-DE"/>
           </a:p>
@@ -23375,7 +23897,7 @@
           <a:p>
             <a:fld id="{38351A54-3C04-4A7D-A7C6-1B9B9491F3FA}" type="datetime1">
               <a:rPr lang="de-DE" smtClean="0"/>
-              <a:t>06.04.20</a:t>
+              <a:t>29.04.20</a:t>
             </a:fld>
             <a:endParaRPr lang="de-DE"/>
           </a:p>

</xml_diff>